<commit_message>
update week 6 review ppt with new multiplayer links
</commit_message>
<xml_diff>
--- a/Week06/HtmlCssReviewActivity.pptx
+++ b/Week06/HtmlCssReviewActivity.pptx
@@ -222,7 +222,7 @@
           <a:p>
             <a:fld id="{19104133-B5B0-4351-8158-4F0E5EB1E2BF}" type="datetimeFigureOut">
               <a:rPr lang="en-US" smtClean="0"/>
-              <a:t>3/22/2021</a:t>
+              <a:t>4/3/2022</a:t>
             </a:fld>
             <a:endParaRPr lang="en-US"/>
           </a:p>
@@ -763,7 +763,7 @@
             <a:fld id="{1C2D31DE-C454-491C-B5C3-F097855E3DF7}" type="datetime4">
               <a:rPr lang="en-US" smtClean="0"/>
               <a:pPr/>
-              <a:t>March 22, 2021</a:t>
+              <a:t>April 3, 2022</a:t>
             </a:fld>
             <a:endParaRPr lang="en-US" dirty="0"/>
           </a:p>
@@ -4155,7 +4155,7 @@
           <a:p>
             <a:fld id="{5958763E-B898-436D-883D-03711491D54A}" type="datetimeFigureOut">
               <a:rPr lang="en-US" smtClean="0"/>
-              <a:t>3/22/2021</a:t>
+              <a:t>4/3/2022</a:t>
             </a:fld>
             <a:endParaRPr lang="en-US"/>
           </a:p>
@@ -4348,7 +4348,7 @@
           <a:p>
             <a:fld id="{5958763E-B898-436D-883D-03711491D54A}" type="datetimeFigureOut">
               <a:rPr lang="en-US" smtClean="0"/>
-              <a:t>3/22/2021</a:t>
+              <a:t>4/3/2022</a:t>
             </a:fld>
             <a:endParaRPr lang="en-US"/>
           </a:p>
@@ -4598,7 +4598,7 @@
           <a:p>
             <a:fld id="{5958763E-B898-436D-883D-03711491D54A}" type="datetimeFigureOut">
               <a:rPr lang="en-US" smtClean="0"/>
-              <a:t>3/22/2021</a:t>
+              <a:t>4/3/2022</a:t>
             </a:fld>
             <a:endParaRPr lang="en-US"/>
           </a:p>
@@ -4946,7 +4946,7 @@
           <a:p>
             <a:fld id="{5958763E-B898-436D-883D-03711491D54A}" type="datetimeFigureOut">
               <a:rPr lang="en-US" smtClean="0"/>
-              <a:t>3/22/2021</a:t>
+              <a:t>4/3/2022</a:t>
             </a:fld>
             <a:endParaRPr lang="en-US"/>
           </a:p>
@@ -5362,7 +5362,7 @@
           <a:p>
             <a:fld id="{5958763E-B898-436D-883D-03711491D54A}" type="datetimeFigureOut">
               <a:rPr lang="en-US" smtClean="0"/>
-              <a:t>3/22/2021</a:t>
+              <a:t>4/3/2022</a:t>
             </a:fld>
             <a:endParaRPr lang="en-US"/>
           </a:p>
@@ -5863,7 +5863,7 @@
           <a:p>
             <a:fld id="{5958763E-B898-436D-883D-03711491D54A}" type="datetimeFigureOut">
               <a:rPr lang="en-US" smtClean="0"/>
-              <a:t>3/22/2021</a:t>
+              <a:t>4/3/2022</a:t>
             </a:fld>
             <a:endParaRPr lang="en-US"/>
           </a:p>
@@ -6314,7 +6314,7 @@
           <a:p>
             <a:fld id="{5958763E-B898-436D-883D-03711491D54A}" type="datetimeFigureOut">
               <a:rPr lang="en-US" smtClean="0"/>
-              <a:t>3/22/2021</a:t>
+              <a:t>4/3/2022</a:t>
             </a:fld>
             <a:endParaRPr lang="en-US"/>
           </a:p>
@@ -6925,7 +6925,7 @@
           <a:p>
             <a:fld id="{5958763E-B898-436D-883D-03711491D54A}" type="datetimeFigureOut">
               <a:rPr lang="en-US" smtClean="0"/>
-              <a:t>3/22/2021</a:t>
+              <a:t>4/3/2022</a:t>
             </a:fld>
             <a:endParaRPr lang="en-US"/>
           </a:p>
@@ -7696,7 +7696,7 @@
           <a:p>
             <a:fld id="{5958763E-B898-436D-883D-03711491D54A}" type="datetimeFigureOut">
               <a:rPr lang="en-US" smtClean="0"/>
-              <a:t>3/22/2021</a:t>
+              <a:t>4/3/2022</a:t>
             </a:fld>
             <a:endParaRPr lang="en-US"/>
           </a:p>
@@ -7800,7 +7800,7 @@
           <a:p>
             <a:fld id="{5958763E-B898-436D-883D-03711491D54A}" type="datetimeFigureOut">
               <a:rPr lang="en-US" smtClean="0"/>
-              <a:t>3/22/2021</a:t>
+              <a:t>4/3/2022</a:t>
             </a:fld>
             <a:endParaRPr lang="en-US"/>
           </a:p>
@@ -8127,7 +8127,7 @@
             <a:fld id="{1C2D31DE-C454-491C-B5C3-F097855E3DF7}" type="datetime4">
               <a:rPr lang="en-US" smtClean="0"/>
               <a:pPr/>
-              <a:t>March 22, 2021</a:t>
+              <a:t>April 3, 2022</a:t>
             </a:fld>
             <a:endParaRPr lang="en-US" dirty="0"/>
           </a:p>
@@ -11279,7 +11279,7 @@
           <a:p>
             <a:fld id="{5958763E-B898-436D-883D-03711491D54A}" type="datetimeFigureOut">
               <a:rPr lang="en-US" smtClean="0"/>
-              <a:t>3/22/2021</a:t>
+              <a:t>4/3/2022</a:t>
             </a:fld>
             <a:endParaRPr lang="en-US"/>
           </a:p>
@@ -11403,7 +11403,7 @@
           <a:p>
             <a:fld id="{5958763E-B898-436D-883D-03711491D54A}" type="datetimeFigureOut">
               <a:rPr lang="en-US" smtClean="0"/>
-              <a:t>3/22/2021</a:t>
+              <a:t>4/3/2022</a:t>
             </a:fld>
             <a:endParaRPr lang="en-US"/>
           </a:p>
@@ -11527,7 +11527,7 @@
           <a:p>
             <a:fld id="{5958763E-B898-436D-883D-03711491D54A}" type="datetimeFigureOut">
               <a:rPr lang="en-US" smtClean="0"/>
-              <a:t>3/22/2021</a:t>
+              <a:t>4/3/2022</a:t>
             </a:fld>
             <a:endParaRPr lang="en-US"/>
           </a:p>
@@ -11651,7 +11651,7 @@
           <a:p>
             <a:fld id="{5958763E-B898-436D-883D-03711491D54A}" type="datetimeFigureOut">
               <a:rPr lang="en-US" smtClean="0"/>
-              <a:t>3/22/2021</a:t>
+              <a:t>4/3/2022</a:t>
             </a:fld>
             <a:endParaRPr lang="en-US"/>
           </a:p>
@@ -11775,7 +11775,7 @@
           <a:p>
             <a:fld id="{5958763E-B898-436D-883D-03711491D54A}" type="datetimeFigureOut">
               <a:rPr lang="en-US" smtClean="0"/>
-              <a:t>3/22/2021</a:t>
+              <a:t>4/3/2022</a:t>
             </a:fld>
             <a:endParaRPr lang="en-US"/>
           </a:p>
@@ -11899,7 +11899,7 @@
           <a:p>
             <a:fld id="{5958763E-B898-436D-883D-03711491D54A}" type="datetimeFigureOut">
               <a:rPr lang="en-US" smtClean="0"/>
-              <a:t>3/22/2021</a:t>
+              <a:t>4/3/2022</a:t>
             </a:fld>
             <a:endParaRPr lang="en-US"/>
           </a:p>
@@ -12023,7 +12023,7 @@
           <a:p>
             <a:fld id="{5958763E-B898-436D-883D-03711491D54A}" type="datetimeFigureOut">
               <a:rPr lang="en-US" smtClean="0"/>
-              <a:t>3/22/2021</a:t>
+              <a:t>4/3/2022</a:t>
             </a:fld>
             <a:endParaRPr lang="en-US"/>
           </a:p>
@@ -12147,7 +12147,7 @@
           <a:p>
             <a:fld id="{5958763E-B898-436D-883D-03711491D54A}" type="datetimeFigureOut">
               <a:rPr lang="en-US" smtClean="0"/>
-              <a:t>3/22/2021</a:t>
+              <a:t>4/3/2022</a:t>
             </a:fld>
             <a:endParaRPr lang="en-US"/>
           </a:p>
@@ -12280,7 +12280,7 @@
           <a:p>
             <a:fld id="{5958763E-B898-436D-883D-03711491D54A}" type="datetimeFigureOut">
               <a:rPr lang="en-US" smtClean="0"/>
-              <a:t>3/22/2021</a:t>
+              <a:t>4/3/2022</a:t>
             </a:fld>
             <a:endParaRPr lang="en-US"/>
           </a:p>
@@ -15619,7 +15619,7 @@
             <a:fld id="{1C2D31DE-C454-491C-B5C3-F097855E3DF7}" type="datetime4">
               <a:rPr lang="en-US" smtClean="0"/>
               <a:pPr/>
-              <a:t>March 22, 2021</a:t>
+              <a:t>April 3, 2022</a:t>
             </a:fld>
             <a:endParaRPr lang="en-US" dirty="0"/>
           </a:p>
@@ -27855,7 +27855,7 @@
           <a:p>
             <a:fld id="{5958763E-B898-436D-883D-03711491D54A}" type="datetimeFigureOut">
               <a:rPr lang="en-US" smtClean="0"/>
-              <a:t>3/22/2021</a:t>
+              <a:t>4/3/2022</a:t>
             </a:fld>
             <a:endParaRPr lang="en-US"/>
           </a:p>
@@ -28257,7 +28257,7 @@
           <a:p>
             <a:fld id="{5958763E-B898-436D-883D-03711491D54A}" type="datetimeFigureOut">
               <a:rPr lang="en-US" smtClean="0"/>
-              <a:t>3/22/2021</a:t>
+              <a:t>4/3/2022</a:t>
             </a:fld>
             <a:endParaRPr lang="en-US"/>
           </a:p>
@@ -28551,7 +28551,7 @@
           <a:p>
             <a:fld id="{5958763E-B898-436D-883D-03711491D54A}" type="datetimeFigureOut">
               <a:rPr lang="en-US" smtClean="0"/>
-              <a:t>3/22/2021</a:t>
+              <a:t>4/3/2022</a:t>
             </a:fld>
             <a:endParaRPr lang="en-US"/>
           </a:p>
@@ -28752,7 +28752,7 @@
           <a:p>
             <a:fld id="{5958763E-B898-436D-883D-03711491D54A}" type="datetimeFigureOut">
               <a:rPr lang="en-US" smtClean="0"/>
-              <a:t>3/22/2021</a:t>
+              <a:t>4/3/2022</a:t>
             </a:fld>
             <a:endParaRPr lang="en-US"/>
           </a:p>
@@ -29013,7 +29013,7 @@
           <a:p>
             <a:fld id="{5958763E-B898-436D-883D-03711491D54A}" type="datetimeFigureOut">
               <a:rPr lang="en-US" smtClean="0"/>
-              <a:t>3/22/2021</a:t>
+              <a:t>4/3/2022</a:t>
             </a:fld>
             <a:endParaRPr lang="en-US"/>
           </a:p>
@@ -29521,7 +29521,7 @@
           <a:p>
             <a:fld id="{5958763E-B898-436D-883D-03711491D54A}" type="datetimeFigureOut">
               <a:rPr lang="en-US" smtClean="0"/>
-              <a:t>3/22/2021</a:t>
+              <a:t>4/3/2022</a:t>
             </a:fld>
             <a:endParaRPr lang="en-US"/>
           </a:p>
@@ -30000,7 +30000,7 @@
           <a:p>
             <a:fld id="{5958763E-B898-436D-883D-03711491D54A}" type="datetimeFigureOut">
               <a:rPr lang="en-US" smtClean="0"/>
-              <a:t>3/22/2021</a:t>
+              <a:t>4/3/2022</a:t>
             </a:fld>
             <a:endParaRPr lang="en-US"/>
           </a:p>
@@ -30819,7 +30819,7 @@
           <a:p>
             <a:fld id="{5958763E-B898-436D-883D-03711491D54A}" type="datetimeFigureOut">
               <a:rPr lang="en-US" smtClean="0"/>
-              <a:t>3/22/2021</a:t>
+              <a:t>4/3/2022</a:t>
             </a:fld>
             <a:endParaRPr lang="en-US"/>
           </a:p>
@@ -31020,7 +31020,7 @@
           <a:p>
             <a:fld id="{5958763E-B898-436D-883D-03711491D54A}" type="datetimeFigureOut">
               <a:rPr lang="en-US" smtClean="0"/>
-              <a:t>3/22/2021</a:t>
+              <a:t>4/3/2022</a:t>
             </a:fld>
             <a:endParaRPr lang="en-US"/>
           </a:p>
@@ -31355,7 +31355,7 @@
           <a:p>
             <a:fld id="{5958763E-B898-436D-883D-03711491D54A}" type="datetimeFigureOut">
               <a:rPr lang="en-US" smtClean="0"/>
-              <a:t>3/22/2021</a:t>
+              <a:t>4/3/2022</a:t>
             </a:fld>
             <a:endParaRPr lang="en-US"/>
           </a:p>
@@ -31585,7 +31585,7 @@
           <a:p>
             <a:fld id="{5958763E-B898-436D-883D-03711491D54A}" type="datetimeFigureOut">
               <a:rPr lang="en-US" smtClean="0"/>
-              <a:t>3/22/2021</a:t>
+              <a:t>4/3/2022</a:t>
             </a:fld>
             <a:endParaRPr lang="en-US"/>
           </a:p>
@@ -31829,7 +31829,7 @@
           <a:p>
             <a:fld id="{5958763E-B898-436D-883D-03711491D54A}" type="datetimeFigureOut">
               <a:rPr lang="en-US" smtClean="0"/>
-              <a:t>3/22/2021</a:t>
+              <a:t>4/3/2022</a:t>
             </a:fld>
             <a:endParaRPr lang="en-US"/>
           </a:p>
@@ -32388,17 +32388,35 @@
           </a:p>
           <a:p>
             <a:r>
-              <a:rPr lang="en-US" dirty="0">
+              <a:rPr lang="en-US" sz="2800" dirty="0">
                 <a:hlinkClick r:id="rId2"/>
               </a:rPr>
-              <a:t>https://replit.com/join/wvzndelw-josephmaxwell</a:t>
+              <a:t>https://replit.com/join/qmaefwjwmp-hylandoutreach</a:t>
             </a:r>
-            <a:endParaRPr lang="en-US" dirty="0"/>
+            <a:endParaRPr lang="en-US" sz="2800" dirty="0"/>
           </a:p>
           <a:p>
             <a:r>
               <a:rPr lang="en-US" dirty="0"/>
-              <a:t>Student 1</a:t>
+              <a:t>Student1</a:t>
+            </a:r>
+          </a:p>
+          <a:p>
+            <a:r>
+              <a:rPr lang="en-US" dirty="0"/>
+              <a:t>Student2</a:t>
+            </a:r>
+          </a:p>
+          <a:p>
+            <a:r>
+              <a:rPr lang="en-US" dirty="0"/>
+              <a:t>Student3</a:t>
+            </a:r>
+          </a:p>
+          <a:p>
+            <a:r>
+              <a:rPr lang="en-US" dirty="0"/>
+              <a:t>Student4</a:t>
             </a:r>
           </a:p>
           <a:p>
@@ -32437,18 +32455,39 @@
           </a:p>
           <a:p>
             <a:r>
-              <a:rPr lang="en-US" dirty="0">
+              <a:rPr lang="en-US" sz="2800" dirty="0">
                 <a:hlinkClick r:id="rId3"/>
               </a:rPr>
-              <a:t>https://replit.com/join/wxqxdqpg-josephmaxwell</a:t>
+              <a:t>https://replit.com/join/ywjiowgvnx-hylandoutreach</a:t>
             </a:r>
-            <a:endParaRPr lang="en-US" dirty="0"/>
+            <a:endParaRPr lang="en-US" sz="2800" dirty="0"/>
           </a:p>
           <a:p>
             <a:r>
               <a:rPr lang="en-US" dirty="0"/>
-              <a:t>Student 1</a:t>
+              <a:t>Student1</a:t>
             </a:r>
+          </a:p>
+          <a:p>
+            <a:r>
+              <a:rPr lang="en-US" dirty="0"/>
+              <a:t>Student2</a:t>
+            </a:r>
+          </a:p>
+          <a:p>
+            <a:r>
+              <a:rPr lang="en-US" dirty="0"/>
+              <a:t>Student3</a:t>
+            </a:r>
+          </a:p>
+          <a:p>
+            <a:r>
+              <a:rPr lang="en-US" dirty="0"/>
+              <a:t>Student4</a:t>
+            </a:r>
+          </a:p>
+          <a:p>
+            <a:endParaRPr lang="en-US" dirty="0"/>
           </a:p>
           <a:p>
             <a:endParaRPr lang="en-US" dirty="0"/>
@@ -32486,23 +32525,35 @@
           </a:p>
           <a:p>
             <a:r>
-              <a:rPr lang="en-US">
-                <a:hlinkClick r:id="rId2"/>
+              <a:rPr lang="en-US" sz="2800" dirty="0">
+                <a:hlinkClick r:id="rId4"/>
               </a:rPr>
-              <a:t>https</a:t>
+              <a:t>https://replit.com/join/clfsjzajqs-hylandoutreach</a:t>
             </a:r>
-            <a:r>
-              <a:rPr lang="en-US" dirty="0">
-                <a:hlinkClick r:id="rId2"/>
-              </a:rPr>
-              <a:t>://replit.com/join/wvzndelw-josephmaxwell</a:t>
-            </a:r>
-            <a:endParaRPr lang="en-US" dirty="0"/>
+            <a:endParaRPr lang="en-US" sz="2800" dirty="0"/>
           </a:p>
           <a:p>
             <a:r>
               <a:rPr lang="en-US" dirty="0"/>
-              <a:t>Student 1</a:t>
+              <a:t>Student1</a:t>
+            </a:r>
+          </a:p>
+          <a:p>
+            <a:r>
+              <a:rPr lang="en-US" dirty="0"/>
+              <a:t>Student2</a:t>
+            </a:r>
+          </a:p>
+          <a:p>
+            <a:r>
+              <a:rPr lang="en-US" dirty="0"/>
+              <a:t>Student3</a:t>
+            </a:r>
+          </a:p>
+          <a:p>
+            <a:r>
+              <a:rPr lang="en-US" dirty="0"/>
+              <a:t>Student4</a:t>
             </a:r>
           </a:p>
         </p:txBody>

</xml_diff>

<commit_message>
Update gitbook 2022-04-03 05:25:59
</commit_message>
<xml_diff>
--- a/Week06/HtmlCssReviewActivity.pptx
+++ b/Week06/HtmlCssReviewActivity.pptx
@@ -222,7 +222,7 @@
           <a:p>
             <a:fld id="{19104133-B5B0-4351-8158-4F0E5EB1E2BF}" type="datetimeFigureOut">
               <a:rPr lang="en-US" smtClean="0"/>
-              <a:t>3/22/2021</a:t>
+              <a:t>4/3/2022</a:t>
             </a:fld>
             <a:endParaRPr lang="en-US"/>
           </a:p>
@@ -763,7 +763,7 @@
             <a:fld id="{1C2D31DE-C454-491C-B5C3-F097855E3DF7}" type="datetime4">
               <a:rPr lang="en-US" smtClean="0"/>
               <a:pPr/>
-              <a:t>March 22, 2021</a:t>
+              <a:t>April 3, 2022</a:t>
             </a:fld>
             <a:endParaRPr lang="en-US" dirty="0"/>
           </a:p>
@@ -4155,7 +4155,7 @@
           <a:p>
             <a:fld id="{5958763E-B898-436D-883D-03711491D54A}" type="datetimeFigureOut">
               <a:rPr lang="en-US" smtClean="0"/>
-              <a:t>3/22/2021</a:t>
+              <a:t>4/3/2022</a:t>
             </a:fld>
             <a:endParaRPr lang="en-US"/>
           </a:p>
@@ -4348,7 +4348,7 @@
           <a:p>
             <a:fld id="{5958763E-B898-436D-883D-03711491D54A}" type="datetimeFigureOut">
               <a:rPr lang="en-US" smtClean="0"/>
-              <a:t>3/22/2021</a:t>
+              <a:t>4/3/2022</a:t>
             </a:fld>
             <a:endParaRPr lang="en-US"/>
           </a:p>
@@ -4598,7 +4598,7 @@
           <a:p>
             <a:fld id="{5958763E-B898-436D-883D-03711491D54A}" type="datetimeFigureOut">
               <a:rPr lang="en-US" smtClean="0"/>
-              <a:t>3/22/2021</a:t>
+              <a:t>4/3/2022</a:t>
             </a:fld>
             <a:endParaRPr lang="en-US"/>
           </a:p>
@@ -4946,7 +4946,7 @@
           <a:p>
             <a:fld id="{5958763E-B898-436D-883D-03711491D54A}" type="datetimeFigureOut">
               <a:rPr lang="en-US" smtClean="0"/>
-              <a:t>3/22/2021</a:t>
+              <a:t>4/3/2022</a:t>
             </a:fld>
             <a:endParaRPr lang="en-US"/>
           </a:p>
@@ -5362,7 +5362,7 @@
           <a:p>
             <a:fld id="{5958763E-B898-436D-883D-03711491D54A}" type="datetimeFigureOut">
               <a:rPr lang="en-US" smtClean="0"/>
-              <a:t>3/22/2021</a:t>
+              <a:t>4/3/2022</a:t>
             </a:fld>
             <a:endParaRPr lang="en-US"/>
           </a:p>
@@ -5863,7 +5863,7 @@
           <a:p>
             <a:fld id="{5958763E-B898-436D-883D-03711491D54A}" type="datetimeFigureOut">
               <a:rPr lang="en-US" smtClean="0"/>
-              <a:t>3/22/2021</a:t>
+              <a:t>4/3/2022</a:t>
             </a:fld>
             <a:endParaRPr lang="en-US"/>
           </a:p>
@@ -6314,7 +6314,7 @@
           <a:p>
             <a:fld id="{5958763E-B898-436D-883D-03711491D54A}" type="datetimeFigureOut">
               <a:rPr lang="en-US" smtClean="0"/>
-              <a:t>3/22/2021</a:t>
+              <a:t>4/3/2022</a:t>
             </a:fld>
             <a:endParaRPr lang="en-US"/>
           </a:p>
@@ -6925,7 +6925,7 @@
           <a:p>
             <a:fld id="{5958763E-B898-436D-883D-03711491D54A}" type="datetimeFigureOut">
               <a:rPr lang="en-US" smtClean="0"/>
-              <a:t>3/22/2021</a:t>
+              <a:t>4/3/2022</a:t>
             </a:fld>
             <a:endParaRPr lang="en-US"/>
           </a:p>
@@ -7696,7 +7696,7 @@
           <a:p>
             <a:fld id="{5958763E-B898-436D-883D-03711491D54A}" type="datetimeFigureOut">
               <a:rPr lang="en-US" smtClean="0"/>
-              <a:t>3/22/2021</a:t>
+              <a:t>4/3/2022</a:t>
             </a:fld>
             <a:endParaRPr lang="en-US"/>
           </a:p>
@@ -7800,7 +7800,7 @@
           <a:p>
             <a:fld id="{5958763E-B898-436D-883D-03711491D54A}" type="datetimeFigureOut">
               <a:rPr lang="en-US" smtClean="0"/>
-              <a:t>3/22/2021</a:t>
+              <a:t>4/3/2022</a:t>
             </a:fld>
             <a:endParaRPr lang="en-US"/>
           </a:p>
@@ -8127,7 +8127,7 @@
             <a:fld id="{1C2D31DE-C454-491C-B5C3-F097855E3DF7}" type="datetime4">
               <a:rPr lang="en-US" smtClean="0"/>
               <a:pPr/>
-              <a:t>March 22, 2021</a:t>
+              <a:t>April 3, 2022</a:t>
             </a:fld>
             <a:endParaRPr lang="en-US" dirty="0"/>
           </a:p>
@@ -11279,7 +11279,7 @@
           <a:p>
             <a:fld id="{5958763E-B898-436D-883D-03711491D54A}" type="datetimeFigureOut">
               <a:rPr lang="en-US" smtClean="0"/>
-              <a:t>3/22/2021</a:t>
+              <a:t>4/3/2022</a:t>
             </a:fld>
             <a:endParaRPr lang="en-US"/>
           </a:p>
@@ -11403,7 +11403,7 @@
           <a:p>
             <a:fld id="{5958763E-B898-436D-883D-03711491D54A}" type="datetimeFigureOut">
               <a:rPr lang="en-US" smtClean="0"/>
-              <a:t>3/22/2021</a:t>
+              <a:t>4/3/2022</a:t>
             </a:fld>
             <a:endParaRPr lang="en-US"/>
           </a:p>
@@ -11527,7 +11527,7 @@
           <a:p>
             <a:fld id="{5958763E-B898-436D-883D-03711491D54A}" type="datetimeFigureOut">
               <a:rPr lang="en-US" smtClean="0"/>
-              <a:t>3/22/2021</a:t>
+              <a:t>4/3/2022</a:t>
             </a:fld>
             <a:endParaRPr lang="en-US"/>
           </a:p>
@@ -11651,7 +11651,7 @@
           <a:p>
             <a:fld id="{5958763E-B898-436D-883D-03711491D54A}" type="datetimeFigureOut">
               <a:rPr lang="en-US" smtClean="0"/>
-              <a:t>3/22/2021</a:t>
+              <a:t>4/3/2022</a:t>
             </a:fld>
             <a:endParaRPr lang="en-US"/>
           </a:p>
@@ -11775,7 +11775,7 @@
           <a:p>
             <a:fld id="{5958763E-B898-436D-883D-03711491D54A}" type="datetimeFigureOut">
               <a:rPr lang="en-US" smtClean="0"/>
-              <a:t>3/22/2021</a:t>
+              <a:t>4/3/2022</a:t>
             </a:fld>
             <a:endParaRPr lang="en-US"/>
           </a:p>
@@ -11899,7 +11899,7 @@
           <a:p>
             <a:fld id="{5958763E-B898-436D-883D-03711491D54A}" type="datetimeFigureOut">
               <a:rPr lang="en-US" smtClean="0"/>
-              <a:t>3/22/2021</a:t>
+              <a:t>4/3/2022</a:t>
             </a:fld>
             <a:endParaRPr lang="en-US"/>
           </a:p>
@@ -12023,7 +12023,7 @@
           <a:p>
             <a:fld id="{5958763E-B898-436D-883D-03711491D54A}" type="datetimeFigureOut">
               <a:rPr lang="en-US" smtClean="0"/>
-              <a:t>3/22/2021</a:t>
+              <a:t>4/3/2022</a:t>
             </a:fld>
             <a:endParaRPr lang="en-US"/>
           </a:p>
@@ -12147,7 +12147,7 @@
           <a:p>
             <a:fld id="{5958763E-B898-436D-883D-03711491D54A}" type="datetimeFigureOut">
               <a:rPr lang="en-US" smtClean="0"/>
-              <a:t>3/22/2021</a:t>
+              <a:t>4/3/2022</a:t>
             </a:fld>
             <a:endParaRPr lang="en-US"/>
           </a:p>
@@ -12280,7 +12280,7 @@
           <a:p>
             <a:fld id="{5958763E-B898-436D-883D-03711491D54A}" type="datetimeFigureOut">
               <a:rPr lang="en-US" smtClean="0"/>
-              <a:t>3/22/2021</a:t>
+              <a:t>4/3/2022</a:t>
             </a:fld>
             <a:endParaRPr lang="en-US"/>
           </a:p>
@@ -15619,7 +15619,7 @@
             <a:fld id="{1C2D31DE-C454-491C-B5C3-F097855E3DF7}" type="datetime4">
               <a:rPr lang="en-US" smtClean="0"/>
               <a:pPr/>
-              <a:t>March 22, 2021</a:t>
+              <a:t>April 3, 2022</a:t>
             </a:fld>
             <a:endParaRPr lang="en-US" dirty="0"/>
           </a:p>
@@ -27855,7 +27855,7 @@
           <a:p>
             <a:fld id="{5958763E-B898-436D-883D-03711491D54A}" type="datetimeFigureOut">
               <a:rPr lang="en-US" smtClean="0"/>
-              <a:t>3/22/2021</a:t>
+              <a:t>4/3/2022</a:t>
             </a:fld>
             <a:endParaRPr lang="en-US"/>
           </a:p>
@@ -28257,7 +28257,7 @@
           <a:p>
             <a:fld id="{5958763E-B898-436D-883D-03711491D54A}" type="datetimeFigureOut">
               <a:rPr lang="en-US" smtClean="0"/>
-              <a:t>3/22/2021</a:t>
+              <a:t>4/3/2022</a:t>
             </a:fld>
             <a:endParaRPr lang="en-US"/>
           </a:p>
@@ -28551,7 +28551,7 @@
           <a:p>
             <a:fld id="{5958763E-B898-436D-883D-03711491D54A}" type="datetimeFigureOut">
               <a:rPr lang="en-US" smtClean="0"/>
-              <a:t>3/22/2021</a:t>
+              <a:t>4/3/2022</a:t>
             </a:fld>
             <a:endParaRPr lang="en-US"/>
           </a:p>
@@ -28752,7 +28752,7 @@
           <a:p>
             <a:fld id="{5958763E-B898-436D-883D-03711491D54A}" type="datetimeFigureOut">
               <a:rPr lang="en-US" smtClean="0"/>
-              <a:t>3/22/2021</a:t>
+              <a:t>4/3/2022</a:t>
             </a:fld>
             <a:endParaRPr lang="en-US"/>
           </a:p>
@@ -29013,7 +29013,7 @@
           <a:p>
             <a:fld id="{5958763E-B898-436D-883D-03711491D54A}" type="datetimeFigureOut">
               <a:rPr lang="en-US" smtClean="0"/>
-              <a:t>3/22/2021</a:t>
+              <a:t>4/3/2022</a:t>
             </a:fld>
             <a:endParaRPr lang="en-US"/>
           </a:p>
@@ -29521,7 +29521,7 @@
           <a:p>
             <a:fld id="{5958763E-B898-436D-883D-03711491D54A}" type="datetimeFigureOut">
               <a:rPr lang="en-US" smtClean="0"/>
-              <a:t>3/22/2021</a:t>
+              <a:t>4/3/2022</a:t>
             </a:fld>
             <a:endParaRPr lang="en-US"/>
           </a:p>
@@ -30000,7 +30000,7 @@
           <a:p>
             <a:fld id="{5958763E-B898-436D-883D-03711491D54A}" type="datetimeFigureOut">
               <a:rPr lang="en-US" smtClean="0"/>
-              <a:t>3/22/2021</a:t>
+              <a:t>4/3/2022</a:t>
             </a:fld>
             <a:endParaRPr lang="en-US"/>
           </a:p>
@@ -30819,7 +30819,7 @@
           <a:p>
             <a:fld id="{5958763E-B898-436D-883D-03711491D54A}" type="datetimeFigureOut">
               <a:rPr lang="en-US" smtClean="0"/>
-              <a:t>3/22/2021</a:t>
+              <a:t>4/3/2022</a:t>
             </a:fld>
             <a:endParaRPr lang="en-US"/>
           </a:p>
@@ -31020,7 +31020,7 @@
           <a:p>
             <a:fld id="{5958763E-B898-436D-883D-03711491D54A}" type="datetimeFigureOut">
               <a:rPr lang="en-US" smtClean="0"/>
-              <a:t>3/22/2021</a:t>
+              <a:t>4/3/2022</a:t>
             </a:fld>
             <a:endParaRPr lang="en-US"/>
           </a:p>
@@ -31355,7 +31355,7 @@
           <a:p>
             <a:fld id="{5958763E-B898-436D-883D-03711491D54A}" type="datetimeFigureOut">
               <a:rPr lang="en-US" smtClean="0"/>
-              <a:t>3/22/2021</a:t>
+              <a:t>4/3/2022</a:t>
             </a:fld>
             <a:endParaRPr lang="en-US"/>
           </a:p>
@@ -31585,7 +31585,7 @@
           <a:p>
             <a:fld id="{5958763E-B898-436D-883D-03711491D54A}" type="datetimeFigureOut">
               <a:rPr lang="en-US" smtClean="0"/>
-              <a:t>3/22/2021</a:t>
+              <a:t>4/3/2022</a:t>
             </a:fld>
             <a:endParaRPr lang="en-US"/>
           </a:p>
@@ -31829,7 +31829,7 @@
           <a:p>
             <a:fld id="{5958763E-B898-436D-883D-03711491D54A}" type="datetimeFigureOut">
               <a:rPr lang="en-US" smtClean="0"/>
-              <a:t>3/22/2021</a:t>
+              <a:t>4/3/2022</a:t>
             </a:fld>
             <a:endParaRPr lang="en-US"/>
           </a:p>
@@ -32388,17 +32388,35 @@
           </a:p>
           <a:p>
             <a:r>
-              <a:rPr lang="en-US" dirty="0">
+              <a:rPr lang="en-US" sz="2800" dirty="0">
                 <a:hlinkClick r:id="rId2"/>
               </a:rPr>
-              <a:t>https://replit.com/join/wvzndelw-josephmaxwell</a:t>
+              <a:t>https://replit.com/join/qmaefwjwmp-hylandoutreach</a:t>
             </a:r>
-            <a:endParaRPr lang="en-US" dirty="0"/>
+            <a:endParaRPr lang="en-US" sz="2800" dirty="0"/>
           </a:p>
           <a:p>
             <a:r>
               <a:rPr lang="en-US" dirty="0"/>
-              <a:t>Student 1</a:t>
+              <a:t>Student1</a:t>
+            </a:r>
+          </a:p>
+          <a:p>
+            <a:r>
+              <a:rPr lang="en-US" dirty="0"/>
+              <a:t>Student2</a:t>
+            </a:r>
+          </a:p>
+          <a:p>
+            <a:r>
+              <a:rPr lang="en-US" dirty="0"/>
+              <a:t>Student3</a:t>
+            </a:r>
+          </a:p>
+          <a:p>
+            <a:r>
+              <a:rPr lang="en-US" dirty="0"/>
+              <a:t>Student4</a:t>
             </a:r>
           </a:p>
           <a:p>
@@ -32437,18 +32455,39 @@
           </a:p>
           <a:p>
             <a:r>
-              <a:rPr lang="en-US" dirty="0">
+              <a:rPr lang="en-US" sz="2800" dirty="0">
                 <a:hlinkClick r:id="rId3"/>
               </a:rPr>
-              <a:t>https://replit.com/join/wxqxdqpg-josephmaxwell</a:t>
+              <a:t>https://replit.com/join/ywjiowgvnx-hylandoutreach</a:t>
             </a:r>
-            <a:endParaRPr lang="en-US" dirty="0"/>
+            <a:endParaRPr lang="en-US" sz="2800" dirty="0"/>
           </a:p>
           <a:p>
             <a:r>
               <a:rPr lang="en-US" dirty="0"/>
-              <a:t>Student 1</a:t>
+              <a:t>Student1</a:t>
             </a:r>
+          </a:p>
+          <a:p>
+            <a:r>
+              <a:rPr lang="en-US" dirty="0"/>
+              <a:t>Student2</a:t>
+            </a:r>
+          </a:p>
+          <a:p>
+            <a:r>
+              <a:rPr lang="en-US" dirty="0"/>
+              <a:t>Student3</a:t>
+            </a:r>
+          </a:p>
+          <a:p>
+            <a:r>
+              <a:rPr lang="en-US" dirty="0"/>
+              <a:t>Student4</a:t>
+            </a:r>
+          </a:p>
+          <a:p>
+            <a:endParaRPr lang="en-US" dirty="0"/>
           </a:p>
           <a:p>
             <a:endParaRPr lang="en-US" dirty="0"/>
@@ -32486,23 +32525,35 @@
           </a:p>
           <a:p>
             <a:r>
-              <a:rPr lang="en-US">
-                <a:hlinkClick r:id="rId2"/>
+              <a:rPr lang="en-US" sz="2800" dirty="0">
+                <a:hlinkClick r:id="rId4"/>
               </a:rPr>
-              <a:t>https</a:t>
+              <a:t>https://replit.com/join/clfsjzajqs-hylandoutreach</a:t>
             </a:r>
-            <a:r>
-              <a:rPr lang="en-US" dirty="0">
-                <a:hlinkClick r:id="rId2"/>
-              </a:rPr>
-              <a:t>://replit.com/join/wvzndelw-josephmaxwell</a:t>
-            </a:r>
-            <a:endParaRPr lang="en-US" dirty="0"/>
+            <a:endParaRPr lang="en-US" sz="2800" dirty="0"/>
           </a:p>
           <a:p>
             <a:r>
               <a:rPr lang="en-US" dirty="0"/>
-              <a:t>Student 1</a:t>
+              <a:t>Student1</a:t>
+            </a:r>
+          </a:p>
+          <a:p>
+            <a:r>
+              <a:rPr lang="en-US" dirty="0"/>
+              <a:t>Student2</a:t>
+            </a:r>
+          </a:p>
+          <a:p>
+            <a:r>
+              <a:rPr lang="en-US" dirty="0"/>
+              <a:t>Student3</a:t>
+            </a:r>
+          </a:p>
+          <a:p>
+            <a:r>
+              <a:rPr lang="en-US" dirty="0"/>
+              <a:t>Student4</a:t>
             </a:r>
           </a:p>
         </p:txBody>

</xml_diff>

<commit_message>
wk 6 review new multiplayer links
</commit_message>
<xml_diff>
--- a/Week06/HtmlCssReviewActivity.pptx
+++ b/Week06/HtmlCssReviewActivity.pptx
@@ -5,24 +5,25 @@
     <p:sldMasterId id="2147483648" r:id="rId1"/>
   </p:sldMasterIdLst>
   <p:notesMasterIdLst>
-    <p:notesMasterId r:id="rId17"/>
+    <p:notesMasterId r:id="rId18"/>
   </p:notesMasterIdLst>
   <p:sldIdLst>
-    <p:sldId id="272" r:id="rId2"/>
-    <p:sldId id="258" r:id="rId3"/>
-    <p:sldId id="259" r:id="rId4"/>
-    <p:sldId id="260" r:id="rId5"/>
-    <p:sldId id="261" r:id="rId6"/>
-    <p:sldId id="262" r:id="rId7"/>
-    <p:sldId id="263" r:id="rId8"/>
-    <p:sldId id="264" r:id="rId9"/>
-    <p:sldId id="265" r:id="rId10"/>
-    <p:sldId id="266" r:id="rId11"/>
-    <p:sldId id="267" r:id="rId12"/>
-    <p:sldId id="268" r:id="rId13"/>
-    <p:sldId id="269" r:id="rId14"/>
-    <p:sldId id="271" r:id="rId15"/>
-    <p:sldId id="270" r:id="rId16"/>
+    <p:sldId id="273" r:id="rId2"/>
+    <p:sldId id="272" r:id="rId3"/>
+    <p:sldId id="258" r:id="rId4"/>
+    <p:sldId id="259" r:id="rId5"/>
+    <p:sldId id="260" r:id="rId6"/>
+    <p:sldId id="261" r:id="rId7"/>
+    <p:sldId id="262" r:id="rId8"/>
+    <p:sldId id="263" r:id="rId9"/>
+    <p:sldId id="264" r:id="rId10"/>
+    <p:sldId id="265" r:id="rId11"/>
+    <p:sldId id="266" r:id="rId12"/>
+    <p:sldId id="267" r:id="rId13"/>
+    <p:sldId id="268" r:id="rId14"/>
+    <p:sldId id="269" r:id="rId15"/>
+    <p:sldId id="271" r:id="rId16"/>
+    <p:sldId id="270" r:id="rId17"/>
   </p:sldIdLst>
   <p:sldSz cx="12192000" cy="6858000"/>
   <p:notesSz cx="6858000" cy="9144000"/>
@@ -222,7 +223,7 @@
           <a:p>
             <a:fld id="{19104133-B5B0-4351-8158-4F0E5EB1E2BF}" type="datetimeFigureOut">
               <a:rPr lang="en-US" smtClean="0"/>
-              <a:t>4/3/2022</a:t>
+              <a:t>10/24/2022</a:t>
             </a:fld>
             <a:endParaRPr lang="en-US"/>
           </a:p>
@@ -562,7 +563,7 @@
           <a:p>
             <a:fld id="{DEC8F7F9-57EC-49CF-9FCD-2B781E4B449F}" type="slidenum">
               <a:rPr lang="en-US" smtClean="0"/>
-              <a:t>2</a:t>
+              <a:t>3</a:t>
             </a:fld>
             <a:endParaRPr lang="en-US"/>
           </a:p>
@@ -763,7 +764,7 @@
             <a:fld id="{1C2D31DE-C454-491C-B5C3-F097855E3DF7}" type="datetime4">
               <a:rPr lang="en-US" smtClean="0"/>
               <a:pPr/>
-              <a:t>April 3, 2022</a:t>
+              <a:t>October 24, 2022</a:t>
             </a:fld>
             <a:endParaRPr lang="en-US" dirty="0"/>
           </a:p>
@@ -4155,7 +4156,7 @@
           <a:p>
             <a:fld id="{5958763E-B898-436D-883D-03711491D54A}" type="datetimeFigureOut">
               <a:rPr lang="en-US" smtClean="0"/>
-              <a:t>4/3/2022</a:t>
+              <a:t>10/24/2022</a:t>
             </a:fld>
             <a:endParaRPr lang="en-US"/>
           </a:p>
@@ -4348,7 +4349,7 @@
           <a:p>
             <a:fld id="{5958763E-B898-436D-883D-03711491D54A}" type="datetimeFigureOut">
               <a:rPr lang="en-US" smtClean="0"/>
-              <a:t>4/3/2022</a:t>
+              <a:t>10/24/2022</a:t>
             </a:fld>
             <a:endParaRPr lang="en-US"/>
           </a:p>
@@ -4598,7 +4599,7 @@
           <a:p>
             <a:fld id="{5958763E-B898-436D-883D-03711491D54A}" type="datetimeFigureOut">
               <a:rPr lang="en-US" smtClean="0"/>
-              <a:t>4/3/2022</a:t>
+              <a:t>10/24/2022</a:t>
             </a:fld>
             <a:endParaRPr lang="en-US"/>
           </a:p>
@@ -4946,7 +4947,7 @@
           <a:p>
             <a:fld id="{5958763E-B898-436D-883D-03711491D54A}" type="datetimeFigureOut">
               <a:rPr lang="en-US" smtClean="0"/>
-              <a:t>4/3/2022</a:t>
+              <a:t>10/24/2022</a:t>
             </a:fld>
             <a:endParaRPr lang="en-US"/>
           </a:p>
@@ -5362,7 +5363,7 @@
           <a:p>
             <a:fld id="{5958763E-B898-436D-883D-03711491D54A}" type="datetimeFigureOut">
               <a:rPr lang="en-US" smtClean="0"/>
-              <a:t>4/3/2022</a:t>
+              <a:t>10/24/2022</a:t>
             </a:fld>
             <a:endParaRPr lang="en-US"/>
           </a:p>
@@ -5863,7 +5864,7 @@
           <a:p>
             <a:fld id="{5958763E-B898-436D-883D-03711491D54A}" type="datetimeFigureOut">
               <a:rPr lang="en-US" smtClean="0"/>
-              <a:t>4/3/2022</a:t>
+              <a:t>10/24/2022</a:t>
             </a:fld>
             <a:endParaRPr lang="en-US"/>
           </a:p>
@@ -6314,7 +6315,7 @@
           <a:p>
             <a:fld id="{5958763E-B898-436D-883D-03711491D54A}" type="datetimeFigureOut">
               <a:rPr lang="en-US" smtClean="0"/>
-              <a:t>4/3/2022</a:t>
+              <a:t>10/24/2022</a:t>
             </a:fld>
             <a:endParaRPr lang="en-US"/>
           </a:p>
@@ -6925,7 +6926,7 @@
           <a:p>
             <a:fld id="{5958763E-B898-436D-883D-03711491D54A}" type="datetimeFigureOut">
               <a:rPr lang="en-US" smtClean="0"/>
-              <a:t>4/3/2022</a:t>
+              <a:t>10/24/2022</a:t>
             </a:fld>
             <a:endParaRPr lang="en-US"/>
           </a:p>
@@ -7696,7 +7697,7 @@
           <a:p>
             <a:fld id="{5958763E-B898-436D-883D-03711491D54A}" type="datetimeFigureOut">
               <a:rPr lang="en-US" smtClean="0"/>
-              <a:t>4/3/2022</a:t>
+              <a:t>10/24/2022</a:t>
             </a:fld>
             <a:endParaRPr lang="en-US"/>
           </a:p>
@@ -7800,7 +7801,7 @@
           <a:p>
             <a:fld id="{5958763E-B898-436D-883D-03711491D54A}" type="datetimeFigureOut">
               <a:rPr lang="en-US" smtClean="0"/>
-              <a:t>4/3/2022</a:t>
+              <a:t>10/24/2022</a:t>
             </a:fld>
             <a:endParaRPr lang="en-US"/>
           </a:p>
@@ -8127,7 +8128,7 @@
             <a:fld id="{1C2D31DE-C454-491C-B5C3-F097855E3DF7}" type="datetime4">
               <a:rPr lang="en-US" smtClean="0"/>
               <a:pPr/>
-              <a:t>April 3, 2022</a:t>
+              <a:t>October 24, 2022</a:t>
             </a:fld>
             <a:endParaRPr lang="en-US" dirty="0"/>
           </a:p>
@@ -11279,7 +11280,7 @@
           <a:p>
             <a:fld id="{5958763E-B898-436D-883D-03711491D54A}" type="datetimeFigureOut">
               <a:rPr lang="en-US" smtClean="0"/>
-              <a:t>4/3/2022</a:t>
+              <a:t>10/24/2022</a:t>
             </a:fld>
             <a:endParaRPr lang="en-US"/>
           </a:p>
@@ -11403,7 +11404,7 @@
           <a:p>
             <a:fld id="{5958763E-B898-436D-883D-03711491D54A}" type="datetimeFigureOut">
               <a:rPr lang="en-US" smtClean="0"/>
-              <a:t>4/3/2022</a:t>
+              <a:t>10/24/2022</a:t>
             </a:fld>
             <a:endParaRPr lang="en-US"/>
           </a:p>
@@ -11527,7 +11528,7 @@
           <a:p>
             <a:fld id="{5958763E-B898-436D-883D-03711491D54A}" type="datetimeFigureOut">
               <a:rPr lang="en-US" smtClean="0"/>
-              <a:t>4/3/2022</a:t>
+              <a:t>10/24/2022</a:t>
             </a:fld>
             <a:endParaRPr lang="en-US"/>
           </a:p>
@@ -11651,7 +11652,7 @@
           <a:p>
             <a:fld id="{5958763E-B898-436D-883D-03711491D54A}" type="datetimeFigureOut">
               <a:rPr lang="en-US" smtClean="0"/>
-              <a:t>4/3/2022</a:t>
+              <a:t>10/24/2022</a:t>
             </a:fld>
             <a:endParaRPr lang="en-US"/>
           </a:p>
@@ -11775,7 +11776,7 @@
           <a:p>
             <a:fld id="{5958763E-B898-436D-883D-03711491D54A}" type="datetimeFigureOut">
               <a:rPr lang="en-US" smtClean="0"/>
-              <a:t>4/3/2022</a:t>
+              <a:t>10/24/2022</a:t>
             </a:fld>
             <a:endParaRPr lang="en-US"/>
           </a:p>
@@ -11899,7 +11900,7 @@
           <a:p>
             <a:fld id="{5958763E-B898-436D-883D-03711491D54A}" type="datetimeFigureOut">
               <a:rPr lang="en-US" smtClean="0"/>
-              <a:t>4/3/2022</a:t>
+              <a:t>10/24/2022</a:t>
             </a:fld>
             <a:endParaRPr lang="en-US"/>
           </a:p>
@@ -12023,7 +12024,7 @@
           <a:p>
             <a:fld id="{5958763E-B898-436D-883D-03711491D54A}" type="datetimeFigureOut">
               <a:rPr lang="en-US" smtClean="0"/>
-              <a:t>4/3/2022</a:t>
+              <a:t>10/24/2022</a:t>
             </a:fld>
             <a:endParaRPr lang="en-US"/>
           </a:p>
@@ -12147,7 +12148,7 @@
           <a:p>
             <a:fld id="{5958763E-B898-436D-883D-03711491D54A}" type="datetimeFigureOut">
               <a:rPr lang="en-US" smtClean="0"/>
-              <a:t>4/3/2022</a:t>
+              <a:t>10/24/2022</a:t>
             </a:fld>
             <a:endParaRPr lang="en-US"/>
           </a:p>
@@ -12280,7 +12281,7 @@
           <a:p>
             <a:fld id="{5958763E-B898-436D-883D-03711491D54A}" type="datetimeFigureOut">
               <a:rPr lang="en-US" smtClean="0"/>
-              <a:t>4/3/2022</a:t>
+              <a:t>10/24/2022</a:t>
             </a:fld>
             <a:endParaRPr lang="en-US"/>
           </a:p>
@@ -15619,7 +15620,7 @@
             <a:fld id="{1C2D31DE-C454-491C-B5C3-F097855E3DF7}" type="datetime4">
               <a:rPr lang="en-US" smtClean="0"/>
               <a:pPr/>
-              <a:t>April 3, 2022</a:t>
+              <a:t>October 24, 2022</a:t>
             </a:fld>
             <a:endParaRPr lang="en-US" dirty="0"/>
           </a:p>
@@ -27855,7 +27856,7 @@
           <a:p>
             <a:fld id="{5958763E-B898-436D-883D-03711491D54A}" type="datetimeFigureOut">
               <a:rPr lang="en-US" smtClean="0"/>
-              <a:t>4/3/2022</a:t>
+              <a:t>10/24/2022</a:t>
             </a:fld>
             <a:endParaRPr lang="en-US"/>
           </a:p>
@@ -28257,7 +28258,7 @@
           <a:p>
             <a:fld id="{5958763E-B898-436D-883D-03711491D54A}" type="datetimeFigureOut">
               <a:rPr lang="en-US" smtClean="0"/>
-              <a:t>4/3/2022</a:t>
+              <a:t>10/24/2022</a:t>
             </a:fld>
             <a:endParaRPr lang="en-US"/>
           </a:p>
@@ -28551,7 +28552,7 @@
           <a:p>
             <a:fld id="{5958763E-B898-436D-883D-03711491D54A}" type="datetimeFigureOut">
               <a:rPr lang="en-US" smtClean="0"/>
-              <a:t>4/3/2022</a:t>
+              <a:t>10/24/2022</a:t>
             </a:fld>
             <a:endParaRPr lang="en-US"/>
           </a:p>
@@ -28752,7 +28753,7 @@
           <a:p>
             <a:fld id="{5958763E-B898-436D-883D-03711491D54A}" type="datetimeFigureOut">
               <a:rPr lang="en-US" smtClean="0"/>
-              <a:t>4/3/2022</a:t>
+              <a:t>10/24/2022</a:t>
             </a:fld>
             <a:endParaRPr lang="en-US"/>
           </a:p>
@@ -29013,7 +29014,7 @@
           <a:p>
             <a:fld id="{5958763E-B898-436D-883D-03711491D54A}" type="datetimeFigureOut">
               <a:rPr lang="en-US" smtClean="0"/>
-              <a:t>4/3/2022</a:t>
+              <a:t>10/24/2022</a:t>
             </a:fld>
             <a:endParaRPr lang="en-US"/>
           </a:p>
@@ -29521,7 +29522,7 @@
           <a:p>
             <a:fld id="{5958763E-B898-436D-883D-03711491D54A}" type="datetimeFigureOut">
               <a:rPr lang="en-US" smtClean="0"/>
-              <a:t>4/3/2022</a:t>
+              <a:t>10/24/2022</a:t>
             </a:fld>
             <a:endParaRPr lang="en-US"/>
           </a:p>
@@ -30000,7 +30001,7 @@
           <a:p>
             <a:fld id="{5958763E-B898-436D-883D-03711491D54A}" type="datetimeFigureOut">
               <a:rPr lang="en-US" smtClean="0"/>
-              <a:t>4/3/2022</a:t>
+              <a:t>10/24/2022</a:t>
             </a:fld>
             <a:endParaRPr lang="en-US"/>
           </a:p>
@@ -30819,7 +30820,7 @@
           <a:p>
             <a:fld id="{5958763E-B898-436D-883D-03711491D54A}" type="datetimeFigureOut">
               <a:rPr lang="en-US" smtClean="0"/>
-              <a:t>4/3/2022</a:t>
+              <a:t>10/24/2022</a:t>
             </a:fld>
             <a:endParaRPr lang="en-US"/>
           </a:p>
@@ -31020,7 +31021,7 @@
           <a:p>
             <a:fld id="{5958763E-B898-436D-883D-03711491D54A}" type="datetimeFigureOut">
               <a:rPr lang="en-US" smtClean="0"/>
-              <a:t>4/3/2022</a:t>
+              <a:t>10/24/2022</a:t>
             </a:fld>
             <a:endParaRPr lang="en-US"/>
           </a:p>
@@ -31355,7 +31356,7 @@
           <a:p>
             <a:fld id="{5958763E-B898-436D-883D-03711491D54A}" type="datetimeFigureOut">
               <a:rPr lang="en-US" smtClean="0"/>
-              <a:t>4/3/2022</a:t>
+              <a:t>10/24/2022</a:t>
             </a:fld>
             <a:endParaRPr lang="en-US"/>
           </a:p>
@@ -31585,7 +31586,7 @@
           <a:p>
             <a:fld id="{5958763E-B898-436D-883D-03711491D54A}" type="datetimeFigureOut">
               <a:rPr lang="en-US" smtClean="0"/>
-              <a:t>4/3/2022</a:t>
+              <a:t>10/24/2022</a:t>
             </a:fld>
             <a:endParaRPr lang="en-US"/>
           </a:p>
@@ -31829,7 +31830,7 @@
           <a:p>
             <a:fld id="{5958763E-B898-436D-883D-03711491D54A}" type="datetimeFigureOut">
               <a:rPr lang="en-US" smtClean="0"/>
-              <a:t>4/3/2022</a:t>
+              <a:t>10/24/2022</a:t>
             </a:fld>
             <a:endParaRPr lang="en-US"/>
           </a:p>
@@ -32352,7 +32353,7 @@
           <a:p>
             <a:r>
               <a:rPr lang="en-US" dirty="0"/>
-              <a:t>Review Activity Teams</a:t>
+              <a:t>Review Activity Teams: Virtual</a:t>
             </a:r>
           </a:p>
         </p:txBody>
@@ -32561,7 +32562,7 @@
     </p:spTree>
     <p:extLst>
       <p:ext uri="{BB962C8B-B14F-4D97-AF65-F5344CB8AC3E}">
-        <p14:creationId xmlns:p14="http://schemas.microsoft.com/office/powerpoint/2010/main" val="126340359"/>
+        <p14:creationId xmlns:p14="http://schemas.microsoft.com/office/powerpoint/2010/main" val="550097584"/>
       </p:ext>
     </p:extLst>
   </p:cSld>
@@ -32575,6 +32576,204 @@
 </file>
 
 <file path=ppt/slides/slide10.xml><?xml version="1.0" encoding="utf-8"?>
+<p:sld xmlns:a="http://schemas.openxmlformats.org/drawingml/2006/main" xmlns:r="http://schemas.openxmlformats.org/officeDocument/2006/relationships" xmlns:p="http://schemas.openxmlformats.org/presentationml/2006/main">
+  <p:cSld>
+    <p:spTree>
+      <p:nvGrpSpPr>
+        <p:cNvPr id="1" name=""/>
+        <p:cNvGrpSpPr/>
+        <p:nvPr/>
+      </p:nvGrpSpPr>
+      <p:grpSpPr>
+        <a:xfrm>
+          <a:off x="0" y="0"/>
+          <a:ext cx="0" cy="0"/>
+          <a:chOff x="0" y="0"/>
+          <a:chExt cx="0" cy="0"/>
+        </a:xfrm>
+      </p:grpSpPr>
+      <p:sp>
+        <p:nvSpPr>
+          <p:cNvPr id="2" name="Title 1"/>
+          <p:cNvSpPr>
+            <a:spLocks noGrp="1"/>
+          </p:cNvSpPr>
+          <p:nvPr>
+            <p:ph type="title"/>
+          </p:nvPr>
+        </p:nvSpPr>
+        <p:spPr/>
+        <p:txBody>
+          <a:bodyPr/>
+          <a:lstStyle/>
+          <a:p>
+            <a:r>
+              <a:rPr lang="en-US" dirty="0"/>
+              <a:t>7. Which HTML element connects a CSS stylesheet to an html page?</a:t>
+            </a:r>
+          </a:p>
+        </p:txBody>
+      </p:sp>
+      <p:sp>
+        <p:nvSpPr>
+          <p:cNvPr id="3" name="Content Placeholder 2"/>
+          <p:cNvSpPr>
+            <a:spLocks noGrp="1"/>
+          </p:cNvSpPr>
+          <p:nvPr>
+            <p:ph idx="1"/>
+          </p:nvPr>
+        </p:nvSpPr>
+        <p:spPr/>
+        <p:txBody>
+          <a:bodyPr anchor="ctr">
+            <a:normAutofit/>
+          </a:bodyPr>
+          <a:lstStyle/>
+          <a:p>
+            <a:pPr marL="57150" indent="0" algn="ctr">
+              <a:buNone/>
+            </a:pPr>
+            <a:r>
+              <a:rPr lang="pl-PL" sz="8800" dirty="0">
+                <a:solidFill>
+                  <a:srgbClr val="800000"/>
+                </a:solidFill>
+                <a:latin typeface="Consolas" panose="020B0609020204030204" pitchFamily="49" charset="0"/>
+              </a:rPr>
+              <a:t>&lt;</a:t>
+            </a:r>
+            <a:r>
+              <a:rPr lang="en-US" sz="8800" dirty="0">
+                <a:solidFill>
+                  <a:srgbClr val="800000"/>
+                </a:solidFill>
+                <a:latin typeface="Consolas" panose="020B0609020204030204" pitchFamily="49" charset="0"/>
+              </a:rPr>
+              <a:t>link /&gt;</a:t>
+            </a:r>
+            <a:endParaRPr lang="en-US" sz="8800" dirty="0">
+              <a:solidFill>
+                <a:schemeClr val="accent1">
+                  <a:lumMod val="50000"/>
+                </a:schemeClr>
+              </a:solidFill>
+              <a:latin typeface="Consolas" panose="020B0609020204030204" pitchFamily="49" charset="0"/>
+            </a:endParaRPr>
+          </a:p>
+        </p:txBody>
+      </p:sp>
+    </p:spTree>
+    <p:extLst>
+      <p:ext uri="{BB962C8B-B14F-4D97-AF65-F5344CB8AC3E}">
+        <p14:creationId xmlns:p14="http://schemas.microsoft.com/office/powerpoint/2010/main" val="2013883105"/>
+      </p:ext>
+    </p:extLst>
+  </p:cSld>
+  <p:clrMapOvr>
+    <a:masterClrMapping/>
+  </p:clrMapOvr>
+  <p:transition>
+    <p:fade/>
+  </p:transition>
+  <p:timing>
+    <p:tnLst>
+      <p:par>
+        <p:cTn id="1" dur="indefinite" restart="never" nodeType="tmRoot">
+          <p:childTnLst>
+            <p:seq concurrent="1" nextAc="seek">
+              <p:cTn id="2" dur="indefinite" nodeType="mainSeq">
+                <p:childTnLst>
+                  <p:par>
+                    <p:cTn id="3" fill="hold">
+                      <p:stCondLst>
+                        <p:cond delay="indefinite"/>
+                      </p:stCondLst>
+                      <p:childTnLst>
+                        <p:par>
+                          <p:cTn id="4" fill="hold">
+                            <p:stCondLst>
+                              <p:cond delay="0"/>
+                            </p:stCondLst>
+                            <p:childTnLst>
+                              <p:par>
+                                <p:cTn id="5" presetID="10" presetClass="entr" presetSubtype="0" fill="hold" grpId="0" nodeType="clickEffect">
+                                  <p:stCondLst>
+                                    <p:cond delay="0"/>
+                                  </p:stCondLst>
+                                  <p:childTnLst>
+                                    <p:set>
+                                      <p:cBhvr>
+                                        <p:cTn id="6" dur="1" fill="hold">
+                                          <p:stCondLst>
+                                            <p:cond delay="0"/>
+                                          </p:stCondLst>
+                                        </p:cTn>
+                                        <p:tgtEl>
+                                          <p:spTgt spid="3">
+                                            <p:txEl>
+                                              <p:pRg st="0" end="0"/>
+                                            </p:txEl>
+                                          </p:spTgt>
+                                        </p:tgtEl>
+                                        <p:attrNameLst>
+                                          <p:attrName>style.visibility</p:attrName>
+                                        </p:attrNameLst>
+                                      </p:cBhvr>
+                                      <p:to>
+                                        <p:strVal val="visible"/>
+                                      </p:to>
+                                    </p:set>
+                                    <p:animEffect transition="in" filter="fade">
+                                      <p:cBhvr>
+                                        <p:cTn id="7" dur="500"/>
+                                        <p:tgtEl>
+                                          <p:spTgt spid="3">
+                                            <p:txEl>
+                                              <p:pRg st="0" end="0"/>
+                                            </p:txEl>
+                                          </p:spTgt>
+                                        </p:tgtEl>
+                                      </p:cBhvr>
+                                    </p:animEffect>
+                                  </p:childTnLst>
+                                </p:cTn>
+                              </p:par>
+                            </p:childTnLst>
+                          </p:cTn>
+                        </p:par>
+                      </p:childTnLst>
+                    </p:cTn>
+                  </p:par>
+                </p:childTnLst>
+              </p:cTn>
+              <p:prevCondLst>
+                <p:cond evt="onPrev" delay="0">
+                  <p:tgtEl>
+                    <p:sldTgt/>
+                  </p:tgtEl>
+                </p:cond>
+              </p:prevCondLst>
+              <p:nextCondLst>
+                <p:cond evt="onNext" delay="0">
+                  <p:tgtEl>
+                    <p:sldTgt/>
+                  </p:tgtEl>
+                </p:cond>
+              </p:nextCondLst>
+            </p:seq>
+          </p:childTnLst>
+        </p:cTn>
+      </p:par>
+    </p:tnLst>
+    <p:bldLst>
+      <p:bldP spid="3" grpId="0" build="p"/>
+    </p:bldLst>
+  </p:timing>
+</p:sld>
+</file>
+
+<file path=ppt/slides/slide11.xml><?xml version="1.0" encoding="utf-8"?>
 <p:sld xmlns:a="http://schemas.openxmlformats.org/drawingml/2006/main" xmlns:r="http://schemas.openxmlformats.org/officeDocument/2006/relationships" xmlns:p="http://schemas.openxmlformats.org/presentationml/2006/main">
   <p:cSld>
     <p:spTree>
@@ -32762,7 +32961,7 @@
 </p:sld>
 </file>
 
-<file path=ppt/slides/slide11.xml><?xml version="1.0" encoding="utf-8"?>
+<file path=ppt/slides/slide12.xml><?xml version="1.0" encoding="utf-8"?>
 <p:sld xmlns:a="http://schemas.openxmlformats.org/drawingml/2006/main" xmlns:r="http://schemas.openxmlformats.org/officeDocument/2006/relationships" xmlns:p="http://schemas.openxmlformats.org/presentationml/2006/main">
   <p:cSld>
     <p:spTree>
@@ -33160,7 +33359,7 @@
 </p:sld>
 </file>
 
-<file path=ppt/slides/slide12.xml><?xml version="1.0" encoding="utf-8"?>
+<file path=ppt/slides/slide13.xml><?xml version="1.0" encoding="utf-8"?>
 <p:sld xmlns:a="http://schemas.openxmlformats.org/drawingml/2006/main" xmlns:r="http://schemas.openxmlformats.org/officeDocument/2006/relationships" xmlns:p="http://schemas.openxmlformats.org/presentationml/2006/main">
   <p:cSld>
     <p:spTree>
@@ -33500,7 +33699,7 @@
 </p:sld>
 </file>
 
-<file path=ppt/slides/slide13.xml><?xml version="1.0" encoding="utf-8"?>
+<file path=ppt/slides/slide14.xml><?xml version="1.0" encoding="utf-8"?>
 <p:sld xmlns:a="http://schemas.openxmlformats.org/drawingml/2006/main" xmlns:r="http://schemas.openxmlformats.org/officeDocument/2006/relationships" xmlns:p="http://schemas.openxmlformats.org/presentationml/2006/main">
   <p:cSld>
     <p:spTree>
@@ -33807,7 +34006,7 @@
 </p:sld>
 </file>
 
-<file path=ppt/slides/slide14.xml><?xml version="1.0" encoding="utf-8"?>
+<file path=ppt/slides/slide15.xml><?xml version="1.0" encoding="utf-8"?>
 <p:sld xmlns:a="http://schemas.openxmlformats.org/drawingml/2006/main" xmlns:r="http://schemas.openxmlformats.org/officeDocument/2006/relationships" xmlns:p="http://schemas.openxmlformats.org/presentationml/2006/main">
   <p:cSld>
     <p:spTree>
@@ -33985,7 +34184,7 @@
 </p:sld>
 </file>
 
-<file path=ppt/slides/slide15.xml><?xml version="1.0" encoding="utf-8"?>
+<file path=ppt/slides/slide16.xml><?xml version="1.0" encoding="utf-8"?>
 <p:sld xmlns:a="http://schemas.openxmlformats.org/drawingml/2006/main" xmlns:r="http://schemas.openxmlformats.org/officeDocument/2006/relationships" xmlns:p="http://schemas.openxmlformats.org/presentationml/2006/main">
   <p:cSld>
     <p:spTree>
@@ -34197,6 +34396,262 @@
 </file>
 
 <file path=ppt/slides/slide2.xml><?xml version="1.0" encoding="utf-8"?>
+<p:sld xmlns:a="http://schemas.openxmlformats.org/drawingml/2006/main" xmlns:r="http://schemas.openxmlformats.org/officeDocument/2006/relationships" xmlns:p="http://schemas.openxmlformats.org/presentationml/2006/main">
+  <p:cSld>
+    <p:spTree>
+      <p:nvGrpSpPr>
+        <p:cNvPr id="1" name=""/>
+        <p:cNvGrpSpPr/>
+        <p:nvPr/>
+      </p:nvGrpSpPr>
+      <p:grpSpPr>
+        <a:xfrm>
+          <a:off x="0" y="0"/>
+          <a:ext cx="0" cy="0"/>
+          <a:chOff x="0" y="0"/>
+          <a:chExt cx="0" cy="0"/>
+        </a:xfrm>
+      </p:grpSpPr>
+      <p:sp>
+        <p:nvSpPr>
+          <p:cNvPr id="2" name="Title 1"/>
+          <p:cNvSpPr>
+            <a:spLocks noGrp="1"/>
+          </p:cNvSpPr>
+          <p:nvPr>
+            <p:ph type="title"/>
+          </p:nvPr>
+        </p:nvSpPr>
+        <p:spPr/>
+        <p:txBody>
+          <a:bodyPr/>
+          <a:lstStyle/>
+          <a:p>
+            <a:r>
+              <a:rPr lang="en-US" dirty="0"/>
+              <a:t>Review Activity Teams: In-Person</a:t>
+            </a:r>
+          </a:p>
+        </p:txBody>
+      </p:sp>
+      <p:sp>
+        <p:nvSpPr>
+          <p:cNvPr id="3" name="Content Placeholder 2"/>
+          <p:cNvSpPr>
+            <a:spLocks noGrp="1"/>
+          </p:cNvSpPr>
+          <p:nvPr>
+            <p:ph sz="half" idx="1"/>
+          </p:nvPr>
+        </p:nvSpPr>
+        <p:spPr>
+          <a:ln>
+            <a:solidFill>
+              <a:schemeClr val="tx2"/>
+            </a:solidFill>
+          </a:ln>
+        </p:spPr>
+        <p:txBody>
+          <a:bodyPr/>
+          <a:lstStyle/>
+          <a:p>
+            <a:pPr marL="57150" indent="0" algn="ctr">
+              <a:buNone/>
+            </a:pPr>
+            <a:r>
+              <a:rPr lang="en-US" b="1" u="sng" dirty="0"/>
+              <a:t>Team 4</a:t>
+            </a:r>
+          </a:p>
+          <a:p>
+            <a:r>
+              <a:rPr lang="en-US" sz="2800" dirty="0">
+                <a:hlinkClick r:id="rId2"/>
+              </a:rPr>
+              <a:t>https://replit.com/join/nnzfyknlpr-hylandoutreach</a:t>
+            </a:r>
+            <a:endParaRPr lang="en-US" dirty="0"/>
+          </a:p>
+          <a:p>
+            <a:r>
+              <a:rPr lang="en-US" dirty="0"/>
+              <a:t>Student1</a:t>
+            </a:r>
+          </a:p>
+          <a:p>
+            <a:r>
+              <a:rPr lang="en-US" dirty="0"/>
+              <a:t>Student2</a:t>
+            </a:r>
+          </a:p>
+          <a:p>
+            <a:r>
+              <a:rPr lang="en-US" dirty="0"/>
+              <a:t>Student3</a:t>
+            </a:r>
+          </a:p>
+          <a:p>
+            <a:r>
+              <a:rPr lang="en-US" dirty="0"/>
+              <a:t>Student4</a:t>
+            </a:r>
+          </a:p>
+          <a:p>
+            <a:endParaRPr lang="en-US" dirty="0"/>
+          </a:p>
+        </p:txBody>
+      </p:sp>
+      <p:sp>
+        <p:nvSpPr>
+          <p:cNvPr id="4" name="Content Placeholder 3"/>
+          <p:cNvSpPr>
+            <a:spLocks noGrp="1"/>
+          </p:cNvSpPr>
+          <p:nvPr>
+            <p:ph sz="half" idx="2"/>
+          </p:nvPr>
+        </p:nvSpPr>
+        <p:spPr>
+          <a:ln>
+            <a:solidFill>
+              <a:schemeClr val="tx2"/>
+            </a:solidFill>
+          </a:ln>
+        </p:spPr>
+        <p:txBody>
+          <a:bodyPr/>
+          <a:lstStyle/>
+          <a:p>
+            <a:pPr marL="57150" indent="0" algn="ctr">
+              <a:buNone/>
+            </a:pPr>
+            <a:r>
+              <a:rPr lang="en-US" b="1" u="sng" dirty="0"/>
+              <a:t>Team 5</a:t>
+            </a:r>
+          </a:p>
+          <a:p>
+            <a:r>
+              <a:rPr lang="en-US" sz="2800" dirty="0">
+                <a:hlinkClick r:id="rId3"/>
+              </a:rPr>
+              <a:t>https://replit.com/join/khkvjwamfu-hylandoutreach</a:t>
+            </a:r>
+            <a:endParaRPr lang="en-US" sz="2800" dirty="0"/>
+          </a:p>
+          <a:p>
+            <a:r>
+              <a:rPr lang="en-US" dirty="0"/>
+              <a:t>Student1</a:t>
+            </a:r>
+          </a:p>
+          <a:p>
+            <a:r>
+              <a:rPr lang="en-US" dirty="0"/>
+              <a:t>Student2</a:t>
+            </a:r>
+          </a:p>
+          <a:p>
+            <a:r>
+              <a:rPr lang="en-US" dirty="0"/>
+              <a:t>Student3</a:t>
+            </a:r>
+          </a:p>
+          <a:p>
+            <a:r>
+              <a:rPr lang="en-US" dirty="0"/>
+              <a:t>Student4</a:t>
+            </a:r>
+          </a:p>
+          <a:p>
+            <a:endParaRPr lang="en-US" dirty="0"/>
+          </a:p>
+          <a:p>
+            <a:endParaRPr lang="en-US" dirty="0"/>
+          </a:p>
+        </p:txBody>
+      </p:sp>
+      <p:sp>
+        <p:nvSpPr>
+          <p:cNvPr id="5" name="Content Placeholder 4"/>
+          <p:cNvSpPr>
+            <a:spLocks noGrp="1"/>
+          </p:cNvSpPr>
+          <p:nvPr>
+            <p:ph sz="half" idx="10"/>
+          </p:nvPr>
+        </p:nvSpPr>
+        <p:spPr>
+          <a:ln>
+            <a:solidFill>
+              <a:schemeClr val="tx1"/>
+            </a:solidFill>
+          </a:ln>
+        </p:spPr>
+        <p:txBody>
+          <a:bodyPr/>
+          <a:lstStyle/>
+          <a:p>
+            <a:pPr marL="57150" indent="0" algn="ctr">
+              <a:buNone/>
+            </a:pPr>
+            <a:r>
+              <a:rPr lang="en-US" b="1" u="sng" dirty="0"/>
+              <a:t>Team 6</a:t>
+            </a:r>
+          </a:p>
+          <a:p>
+            <a:r>
+              <a:rPr lang="en-US" sz="2800" dirty="0">
+                <a:hlinkClick r:id="rId4"/>
+              </a:rPr>
+              <a:t>https://replit.com/join/qaejbnplzy-hylandoutreach</a:t>
+            </a:r>
+            <a:endParaRPr lang="en-US" sz="2800" dirty="0"/>
+          </a:p>
+          <a:p>
+            <a:r>
+              <a:rPr lang="en-US" dirty="0"/>
+              <a:t>Student1</a:t>
+            </a:r>
+          </a:p>
+          <a:p>
+            <a:r>
+              <a:rPr lang="en-US" dirty="0"/>
+              <a:t>Student2</a:t>
+            </a:r>
+          </a:p>
+          <a:p>
+            <a:r>
+              <a:rPr lang="en-US" dirty="0"/>
+              <a:t>Student3</a:t>
+            </a:r>
+          </a:p>
+          <a:p>
+            <a:r>
+              <a:rPr lang="en-US" dirty="0"/>
+              <a:t>Student4</a:t>
+            </a:r>
+          </a:p>
+        </p:txBody>
+      </p:sp>
+    </p:spTree>
+    <p:extLst>
+      <p:ext uri="{BB962C8B-B14F-4D97-AF65-F5344CB8AC3E}">
+        <p14:creationId xmlns:p14="http://schemas.microsoft.com/office/powerpoint/2010/main" val="126340359"/>
+      </p:ext>
+    </p:extLst>
+  </p:cSld>
+  <p:clrMapOvr>
+    <a:masterClrMapping/>
+  </p:clrMapOvr>
+  <p:transition>
+    <p:fade/>
+  </p:transition>
+</p:sld>
+</file>
+
+<file path=ppt/slides/slide3.xml><?xml version="1.0" encoding="utf-8"?>
 <p:sld xmlns:a="http://schemas.openxmlformats.org/drawingml/2006/main" xmlns:r="http://schemas.openxmlformats.org/officeDocument/2006/relationships" xmlns:p="http://schemas.openxmlformats.org/presentationml/2006/main">
   <p:cSld>
     <p:spTree>
@@ -37253,7 +37708,7 @@
 </p:sld>
 </file>
 
-<file path=ppt/slides/slide3.xml><?xml version="1.0" encoding="utf-8"?>
+<file path=ppt/slides/slide4.xml><?xml version="1.0" encoding="utf-8"?>
 <p:sld xmlns:a="http://schemas.openxmlformats.org/drawingml/2006/main" xmlns:r="http://schemas.openxmlformats.org/officeDocument/2006/relationships" xmlns:p="http://schemas.openxmlformats.org/presentationml/2006/main">
   <p:cSld>
     <p:spTree>
@@ -37451,7 +37906,7 @@
 </p:sld>
 </file>
 
-<file path=ppt/slides/slide4.xml><?xml version="1.0" encoding="utf-8"?>
+<file path=ppt/slides/slide5.xml><?xml version="1.0" encoding="utf-8"?>
 <p:sld xmlns:a="http://schemas.openxmlformats.org/drawingml/2006/main" xmlns:r="http://schemas.openxmlformats.org/officeDocument/2006/relationships" xmlns:p="http://schemas.openxmlformats.org/presentationml/2006/main">
   <p:cSld>
     <p:spTree>
@@ -37649,7 +38104,7 @@
 </p:sld>
 </file>
 
-<file path=ppt/slides/slide5.xml><?xml version="1.0" encoding="utf-8"?>
+<file path=ppt/slides/slide6.xml><?xml version="1.0" encoding="utf-8"?>
 <p:sld xmlns:a="http://schemas.openxmlformats.org/drawingml/2006/main" xmlns:r="http://schemas.openxmlformats.org/officeDocument/2006/relationships" xmlns:p="http://schemas.openxmlformats.org/presentationml/2006/main">
   <p:cSld>
     <p:spTree>
@@ -37900,7 +38355,7 @@
 </p:sld>
 </file>
 
-<file path=ppt/slides/slide6.xml><?xml version="1.0" encoding="utf-8"?>
+<file path=ppt/slides/slide7.xml><?xml version="1.0" encoding="utf-8"?>
 <p:sld xmlns:a="http://schemas.openxmlformats.org/drawingml/2006/main" xmlns:r="http://schemas.openxmlformats.org/officeDocument/2006/relationships" xmlns:p="http://schemas.openxmlformats.org/presentationml/2006/main">
   <p:cSld>
     <p:spTree>
@@ -38479,7 +38934,7 @@
 </p:sld>
 </file>
 
-<file path=ppt/slides/slide7.xml><?xml version="1.0" encoding="utf-8"?>
+<file path=ppt/slides/slide8.xml><?xml version="1.0" encoding="utf-8"?>
 <p:sld xmlns:a="http://schemas.openxmlformats.org/drawingml/2006/main" xmlns:r="http://schemas.openxmlformats.org/officeDocument/2006/relationships" xmlns:p="http://schemas.openxmlformats.org/presentationml/2006/main">
   <p:cSld>
     <p:spTree>
@@ -39000,7 +39455,7 @@
 </p:sld>
 </file>
 
-<file path=ppt/slides/slide8.xml><?xml version="1.0" encoding="utf-8"?>
+<file path=ppt/slides/slide9.xml><?xml version="1.0" encoding="utf-8"?>
 <p:sld xmlns:a="http://schemas.openxmlformats.org/drawingml/2006/main" xmlns:r="http://schemas.openxmlformats.org/officeDocument/2006/relationships" xmlns:p="http://schemas.openxmlformats.org/presentationml/2006/main">
   <p:cSld>
     <p:spTree>
@@ -39096,204 +39551,6 @@
     <p:extLst>
       <p:ext uri="{BB962C8B-B14F-4D97-AF65-F5344CB8AC3E}">
         <p14:creationId xmlns:p14="http://schemas.microsoft.com/office/powerpoint/2010/main" val="1480472296"/>
-      </p:ext>
-    </p:extLst>
-  </p:cSld>
-  <p:clrMapOvr>
-    <a:masterClrMapping/>
-  </p:clrMapOvr>
-  <p:transition>
-    <p:fade/>
-  </p:transition>
-  <p:timing>
-    <p:tnLst>
-      <p:par>
-        <p:cTn id="1" dur="indefinite" restart="never" nodeType="tmRoot">
-          <p:childTnLst>
-            <p:seq concurrent="1" nextAc="seek">
-              <p:cTn id="2" dur="indefinite" nodeType="mainSeq">
-                <p:childTnLst>
-                  <p:par>
-                    <p:cTn id="3" fill="hold">
-                      <p:stCondLst>
-                        <p:cond delay="indefinite"/>
-                      </p:stCondLst>
-                      <p:childTnLst>
-                        <p:par>
-                          <p:cTn id="4" fill="hold">
-                            <p:stCondLst>
-                              <p:cond delay="0"/>
-                            </p:stCondLst>
-                            <p:childTnLst>
-                              <p:par>
-                                <p:cTn id="5" presetID="10" presetClass="entr" presetSubtype="0" fill="hold" grpId="0" nodeType="clickEffect">
-                                  <p:stCondLst>
-                                    <p:cond delay="0"/>
-                                  </p:stCondLst>
-                                  <p:childTnLst>
-                                    <p:set>
-                                      <p:cBhvr>
-                                        <p:cTn id="6" dur="1" fill="hold">
-                                          <p:stCondLst>
-                                            <p:cond delay="0"/>
-                                          </p:stCondLst>
-                                        </p:cTn>
-                                        <p:tgtEl>
-                                          <p:spTgt spid="3">
-                                            <p:txEl>
-                                              <p:pRg st="0" end="0"/>
-                                            </p:txEl>
-                                          </p:spTgt>
-                                        </p:tgtEl>
-                                        <p:attrNameLst>
-                                          <p:attrName>style.visibility</p:attrName>
-                                        </p:attrNameLst>
-                                      </p:cBhvr>
-                                      <p:to>
-                                        <p:strVal val="visible"/>
-                                      </p:to>
-                                    </p:set>
-                                    <p:animEffect transition="in" filter="fade">
-                                      <p:cBhvr>
-                                        <p:cTn id="7" dur="500"/>
-                                        <p:tgtEl>
-                                          <p:spTgt spid="3">
-                                            <p:txEl>
-                                              <p:pRg st="0" end="0"/>
-                                            </p:txEl>
-                                          </p:spTgt>
-                                        </p:tgtEl>
-                                      </p:cBhvr>
-                                    </p:animEffect>
-                                  </p:childTnLst>
-                                </p:cTn>
-                              </p:par>
-                            </p:childTnLst>
-                          </p:cTn>
-                        </p:par>
-                      </p:childTnLst>
-                    </p:cTn>
-                  </p:par>
-                </p:childTnLst>
-              </p:cTn>
-              <p:prevCondLst>
-                <p:cond evt="onPrev" delay="0">
-                  <p:tgtEl>
-                    <p:sldTgt/>
-                  </p:tgtEl>
-                </p:cond>
-              </p:prevCondLst>
-              <p:nextCondLst>
-                <p:cond evt="onNext" delay="0">
-                  <p:tgtEl>
-                    <p:sldTgt/>
-                  </p:tgtEl>
-                </p:cond>
-              </p:nextCondLst>
-            </p:seq>
-          </p:childTnLst>
-        </p:cTn>
-      </p:par>
-    </p:tnLst>
-    <p:bldLst>
-      <p:bldP spid="3" grpId="0" build="p"/>
-    </p:bldLst>
-  </p:timing>
-</p:sld>
-</file>
-
-<file path=ppt/slides/slide9.xml><?xml version="1.0" encoding="utf-8"?>
-<p:sld xmlns:a="http://schemas.openxmlformats.org/drawingml/2006/main" xmlns:r="http://schemas.openxmlformats.org/officeDocument/2006/relationships" xmlns:p="http://schemas.openxmlformats.org/presentationml/2006/main">
-  <p:cSld>
-    <p:spTree>
-      <p:nvGrpSpPr>
-        <p:cNvPr id="1" name=""/>
-        <p:cNvGrpSpPr/>
-        <p:nvPr/>
-      </p:nvGrpSpPr>
-      <p:grpSpPr>
-        <a:xfrm>
-          <a:off x="0" y="0"/>
-          <a:ext cx="0" cy="0"/>
-          <a:chOff x="0" y="0"/>
-          <a:chExt cx="0" cy="0"/>
-        </a:xfrm>
-      </p:grpSpPr>
-      <p:sp>
-        <p:nvSpPr>
-          <p:cNvPr id="2" name="Title 1"/>
-          <p:cNvSpPr>
-            <a:spLocks noGrp="1"/>
-          </p:cNvSpPr>
-          <p:nvPr>
-            <p:ph type="title"/>
-          </p:nvPr>
-        </p:nvSpPr>
-        <p:spPr/>
-        <p:txBody>
-          <a:bodyPr/>
-          <a:lstStyle/>
-          <a:p>
-            <a:r>
-              <a:rPr lang="en-US" dirty="0"/>
-              <a:t>7. Which HTML element connects a CSS stylesheet to an html page?</a:t>
-            </a:r>
-          </a:p>
-        </p:txBody>
-      </p:sp>
-      <p:sp>
-        <p:nvSpPr>
-          <p:cNvPr id="3" name="Content Placeholder 2"/>
-          <p:cNvSpPr>
-            <a:spLocks noGrp="1"/>
-          </p:cNvSpPr>
-          <p:nvPr>
-            <p:ph idx="1"/>
-          </p:nvPr>
-        </p:nvSpPr>
-        <p:spPr/>
-        <p:txBody>
-          <a:bodyPr anchor="ctr">
-            <a:normAutofit/>
-          </a:bodyPr>
-          <a:lstStyle/>
-          <a:p>
-            <a:pPr marL="57150" indent="0" algn="ctr">
-              <a:buNone/>
-            </a:pPr>
-            <a:r>
-              <a:rPr lang="pl-PL" sz="8800" dirty="0">
-                <a:solidFill>
-                  <a:srgbClr val="800000"/>
-                </a:solidFill>
-                <a:latin typeface="Consolas" panose="020B0609020204030204" pitchFamily="49" charset="0"/>
-              </a:rPr>
-              <a:t>&lt;</a:t>
-            </a:r>
-            <a:r>
-              <a:rPr lang="en-US" sz="8800" dirty="0">
-                <a:solidFill>
-                  <a:srgbClr val="800000"/>
-                </a:solidFill>
-                <a:latin typeface="Consolas" panose="020B0609020204030204" pitchFamily="49" charset="0"/>
-              </a:rPr>
-              <a:t>link /&gt;</a:t>
-            </a:r>
-            <a:endParaRPr lang="en-US" sz="8800" dirty="0">
-              <a:solidFill>
-                <a:schemeClr val="accent1">
-                  <a:lumMod val="50000"/>
-                </a:schemeClr>
-              </a:solidFill>
-              <a:latin typeface="Consolas" panose="020B0609020204030204" pitchFamily="49" charset="0"/>
-            </a:endParaRPr>
-          </a:p>
-        </p:txBody>
-      </p:sp>
-    </p:spTree>
-    <p:extLst>
-      <p:ext uri="{BB962C8B-B14F-4D97-AF65-F5344CB8AC3E}">
-        <p14:creationId xmlns:p14="http://schemas.microsoft.com/office/powerpoint/2010/main" val="2013883105"/>
       </p:ext>
     </p:extLst>
   </p:cSld>

</xml_diff>

<commit_message>
Update gitbook 2022-10-24 18:05:00
</commit_message>
<xml_diff>
--- a/Week06/HtmlCssReviewActivity.pptx
+++ b/Week06/HtmlCssReviewActivity.pptx
@@ -5,24 +5,25 @@
     <p:sldMasterId id="2147483648" r:id="rId1"/>
   </p:sldMasterIdLst>
   <p:notesMasterIdLst>
-    <p:notesMasterId r:id="rId17"/>
+    <p:notesMasterId r:id="rId18"/>
   </p:notesMasterIdLst>
   <p:sldIdLst>
-    <p:sldId id="272" r:id="rId2"/>
-    <p:sldId id="258" r:id="rId3"/>
-    <p:sldId id="259" r:id="rId4"/>
-    <p:sldId id="260" r:id="rId5"/>
-    <p:sldId id="261" r:id="rId6"/>
-    <p:sldId id="262" r:id="rId7"/>
-    <p:sldId id="263" r:id="rId8"/>
-    <p:sldId id="264" r:id="rId9"/>
-    <p:sldId id="265" r:id="rId10"/>
-    <p:sldId id="266" r:id="rId11"/>
-    <p:sldId id="267" r:id="rId12"/>
-    <p:sldId id="268" r:id="rId13"/>
-    <p:sldId id="269" r:id="rId14"/>
-    <p:sldId id="271" r:id="rId15"/>
-    <p:sldId id="270" r:id="rId16"/>
+    <p:sldId id="273" r:id="rId2"/>
+    <p:sldId id="272" r:id="rId3"/>
+    <p:sldId id="258" r:id="rId4"/>
+    <p:sldId id="259" r:id="rId5"/>
+    <p:sldId id="260" r:id="rId6"/>
+    <p:sldId id="261" r:id="rId7"/>
+    <p:sldId id="262" r:id="rId8"/>
+    <p:sldId id="263" r:id="rId9"/>
+    <p:sldId id="264" r:id="rId10"/>
+    <p:sldId id="265" r:id="rId11"/>
+    <p:sldId id="266" r:id="rId12"/>
+    <p:sldId id="267" r:id="rId13"/>
+    <p:sldId id="268" r:id="rId14"/>
+    <p:sldId id="269" r:id="rId15"/>
+    <p:sldId id="271" r:id="rId16"/>
+    <p:sldId id="270" r:id="rId17"/>
   </p:sldIdLst>
   <p:sldSz cx="12192000" cy="6858000"/>
   <p:notesSz cx="6858000" cy="9144000"/>
@@ -222,7 +223,7 @@
           <a:p>
             <a:fld id="{19104133-B5B0-4351-8158-4F0E5EB1E2BF}" type="datetimeFigureOut">
               <a:rPr lang="en-US" smtClean="0"/>
-              <a:t>4/3/2022</a:t>
+              <a:t>10/24/2022</a:t>
             </a:fld>
             <a:endParaRPr lang="en-US"/>
           </a:p>
@@ -562,7 +563,7 @@
           <a:p>
             <a:fld id="{DEC8F7F9-57EC-49CF-9FCD-2B781E4B449F}" type="slidenum">
               <a:rPr lang="en-US" smtClean="0"/>
-              <a:t>2</a:t>
+              <a:t>3</a:t>
             </a:fld>
             <a:endParaRPr lang="en-US"/>
           </a:p>
@@ -763,7 +764,7 @@
             <a:fld id="{1C2D31DE-C454-491C-B5C3-F097855E3DF7}" type="datetime4">
               <a:rPr lang="en-US" smtClean="0"/>
               <a:pPr/>
-              <a:t>April 3, 2022</a:t>
+              <a:t>October 24, 2022</a:t>
             </a:fld>
             <a:endParaRPr lang="en-US" dirty="0"/>
           </a:p>
@@ -4155,7 +4156,7 @@
           <a:p>
             <a:fld id="{5958763E-B898-436D-883D-03711491D54A}" type="datetimeFigureOut">
               <a:rPr lang="en-US" smtClean="0"/>
-              <a:t>4/3/2022</a:t>
+              <a:t>10/24/2022</a:t>
             </a:fld>
             <a:endParaRPr lang="en-US"/>
           </a:p>
@@ -4348,7 +4349,7 @@
           <a:p>
             <a:fld id="{5958763E-B898-436D-883D-03711491D54A}" type="datetimeFigureOut">
               <a:rPr lang="en-US" smtClean="0"/>
-              <a:t>4/3/2022</a:t>
+              <a:t>10/24/2022</a:t>
             </a:fld>
             <a:endParaRPr lang="en-US"/>
           </a:p>
@@ -4598,7 +4599,7 @@
           <a:p>
             <a:fld id="{5958763E-B898-436D-883D-03711491D54A}" type="datetimeFigureOut">
               <a:rPr lang="en-US" smtClean="0"/>
-              <a:t>4/3/2022</a:t>
+              <a:t>10/24/2022</a:t>
             </a:fld>
             <a:endParaRPr lang="en-US"/>
           </a:p>
@@ -4946,7 +4947,7 @@
           <a:p>
             <a:fld id="{5958763E-B898-436D-883D-03711491D54A}" type="datetimeFigureOut">
               <a:rPr lang="en-US" smtClean="0"/>
-              <a:t>4/3/2022</a:t>
+              <a:t>10/24/2022</a:t>
             </a:fld>
             <a:endParaRPr lang="en-US"/>
           </a:p>
@@ -5362,7 +5363,7 @@
           <a:p>
             <a:fld id="{5958763E-B898-436D-883D-03711491D54A}" type="datetimeFigureOut">
               <a:rPr lang="en-US" smtClean="0"/>
-              <a:t>4/3/2022</a:t>
+              <a:t>10/24/2022</a:t>
             </a:fld>
             <a:endParaRPr lang="en-US"/>
           </a:p>
@@ -5863,7 +5864,7 @@
           <a:p>
             <a:fld id="{5958763E-B898-436D-883D-03711491D54A}" type="datetimeFigureOut">
               <a:rPr lang="en-US" smtClean="0"/>
-              <a:t>4/3/2022</a:t>
+              <a:t>10/24/2022</a:t>
             </a:fld>
             <a:endParaRPr lang="en-US"/>
           </a:p>
@@ -6314,7 +6315,7 @@
           <a:p>
             <a:fld id="{5958763E-B898-436D-883D-03711491D54A}" type="datetimeFigureOut">
               <a:rPr lang="en-US" smtClean="0"/>
-              <a:t>4/3/2022</a:t>
+              <a:t>10/24/2022</a:t>
             </a:fld>
             <a:endParaRPr lang="en-US"/>
           </a:p>
@@ -6925,7 +6926,7 @@
           <a:p>
             <a:fld id="{5958763E-B898-436D-883D-03711491D54A}" type="datetimeFigureOut">
               <a:rPr lang="en-US" smtClean="0"/>
-              <a:t>4/3/2022</a:t>
+              <a:t>10/24/2022</a:t>
             </a:fld>
             <a:endParaRPr lang="en-US"/>
           </a:p>
@@ -7696,7 +7697,7 @@
           <a:p>
             <a:fld id="{5958763E-B898-436D-883D-03711491D54A}" type="datetimeFigureOut">
               <a:rPr lang="en-US" smtClean="0"/>
-              <a:t>4/3/2022</a:t>
+              <a:t>10/24/2022</a:t>
             </a:fld>
             <a:endParaRPr lang="en-US"/>
           </a:p>
@@ -7800,7 +7801,7 @@
           <a:p>
             <a:fld id="{5958763E-B898-436D-883D-03711491D54A}" type="datetimeFigureOut">
               <a:rPr lang="en-US" smtClean="0"/>
-              <a:t>4/3/2022</a:t>
+              <a:t>10/24/2022</a:t>
             </a:fld>
             <a:endParaRPr lang="en-US"/>
           </a:p>
@@ -8127,7 +8128,7 @@
             <a:fld id="{1C2D31DE-C454-491C-B5C3-F097855E3DF7}" type="datetime4">
               <a:rPr lang="en-US" smtClean="0"/>
               <a:pPr/>
-              <a:t>April 3, 2022</a:t>
+              <a:t>October 24, 2022</a:t>
             </a:fld>
             <a:endParaRPr lang="en-US" dirty="0"/>
           </a:p>
@@ -11279,7 +11280,7 @@
           <a:p>
             <a:fld id="{5958763E-B898-436D-883D-03711491D54A}" type="datetimeFigureOut">
               <a:rPr lang="en-US" smtClean="0"/>
-              <a:t>4/3/2022</a:t>
+              <a:t>10/24/2022</a:t>
             </a:fld>
             <a:endParaRPr lang="en-US"/>
           </a:p>
@@ -11403,7 +11404,7 @@
           <a:p>
             <a:fld id="{5958763E-B898-436D-883D-03711491D54A}" type="datetimeFigureOut">
               <a:rPr lang="en-US" smtClean="0"/>
-              <a:t>4/3/2022</a:t>
+              <a:t>10/24/2022</a:t>
             </a:fld>
             <a:endParaRPr lang="en-US"/>
           </a:p>
@@ -11527,7 +11528,7 @@
           <a:p>
             <a:fld id="{5958763E-B898-436D-883D-03711491D54A}" type="datetimeFigureOut">
               <a:rPr lang="en-US" smtClean="0"/>
-              <a:t>4/3/2022</a:t>
+              <a:t>10/24/2022</a:t>
             </a:fld>
             <a:endParaRPr lang="en-US"/>
           </a:p>
@@ -11651,7 +11652,7 @@
           <a:p>
             <a:fld id="{5958763E-B898-436D-883D-03711491D54A}" type="datetimeFigureOut">
               <a:rPr lang="en-US" smtClean="0"/>
-              <a:t>4/3/2022</a:t>
+              <a:t>10/24/2022</a:t>
             </a:fld>
             <a:endParaRPr lang="en-US"/>
           </a:p>
@@ -11775,7 +11776,7 @@
           <a:p>
             <a:fld id="{5958763E-B898-436D-883D-03711491D54A}" type="datetimeFigureOut">
               <a:rPr lang="en-US" smtClean="0"/>
-              <a:t>4/3/2022</a:t>
+              <a:t>10/24/2022</a:t>
             </a:fld>
             <a:endParaRPr lang="en-US"/>
           </a:p>
@@ -11899,7 +11900,7 @@
           <a:p>
             <a:fld id="{5958763E-B898-436D-883D-03711491D54A}" type="datetimeFigureOut">
               <a:rPr lang="en-US" smtClean="0"/>
-              <a:t>4/3/2022</a:t>
+              <a:t>10/24/2022</a:t>
             </a:fld>
             <a:endParaRPr lang="en-US"/>
           </a:p>
@@ -12023,7 +12024,7 @@
           <a:p>
             <a:fld id="{5958763E-B898-436D-883D-03711491D54A}" type="datetimeFigureOut">
               <a:rPr lang="en-US" smtClean="0"/>
-              <a:t>4/3/2022</a:t>
+              <a:t>10/24/2022</a:t>
             </a:fld>
             <a:endParaRPr lang="en-US"/>
           </a:p>
@@ -12147,7 +12148,7 @@
           <a:p>
             <a:fld id="{5958763E-B898-436D-883D-03711491D54A}" type="datetimeFigureOut">
               <a:rPr lang="en-US" smtClean="0"/>
-              <a:t>4/3/2022</a:t>
+              <a:t>10/24/2022</a:t>
             </a:fld>
             <a:endParaRPr lang="en-US"/>
           </a:p>
@@ -12280,7 +12281,7 @@
           <a:p>
             <a:fld id="{5958763E-B898-436D-883D-03711491D54A}" type="datetimeFigureOut">
               <a:rPr lang="en-US" smtClean="0"/>
-              <a:t>4/3/2022</a:t>
+              <a:t>10/24/2022</a:t>
             </a:fld>
             <a:endParaRPr lang="en-US"/>
           </a:p>
@@ -15619,7 +15620,7 @@
             <a:fld id="{1C2D31DE-C454-491C-B5C3-F097855E3DF7}" type="datetime4">
               <a:rPr lang="en-US" smtClean="0"/>
               <a:pPr/>
-              <a:t>April 3, 2022</a:t>
+              <a:t>October 24, 2022</a:t>
             </a:fld>
             <a:endParaRPr lang="en-US" dirty="0"/>
           </a:p>
@@ -27855,7 +27856,7 @@
           <a:p>
             <a:fld id="{5958763E-B898-436D-883D-03711491D54A}" type="datetimeFigureOut">
               <a:rPr lang="en-US" smtClean="0"/>
-              <a:t>4/3/2022</a:t>
+              <a:t>10/24/2022</a:t>
             </a:fld>
             <a:endParaRPr lang="en-US"/>
           </a:p>
@@ -28257,7 +28258,7 @@
           <a:p>
             <a:fld id="{5958763E-B898-436D-883D-03711491D54A}" type="datetimeFigureOut">
               <a:rPr lang="en-US" smtClean="0"/>
-              <a:t>4/3/2022</a:t>
+              <a:t>10/24/2022</a:t>
             </a:fld>
             <a:endParaRPr lang="en-US"/>
           </a:p>
@@ -28551,7 +28552,7 @@
           <a:p>
             <a:fld id="{5958763E-B898-436D-883D-03711491D54A}" type="datetimeFigureOut">
               <a:rPr lang="en-US" smtClean="0"/>
-              <a:t>4/3/2022</a:t>
+              <a:t>10/24/2022</a:t>
             </a:fld>
             <a:endParaRPr lang="en-US"/>
           </a:p>
@@ -28752,7 +28753,7 @@
           <a:p>
             <a:fld id="{5958763E-B898-436D-883D-03711491D54A}" type="datetimeFigureOut">
               <a:rPr lang="en-US" smtClean="0"/>
-              <a:t>4/3/2022</a:t>
+              <a:t>10/24/2022</a:t>
             </a:fld>
             <a:endParaRPr lang="en-US"/>
           </a:p>
@@ -29013,7 +29014,7 @@
           <a:p>
             <a:fld id="{5958763E-B898-436D-883D-03711491D54A}" type="datetimeFigureOut">
               <a:rPr lang="en-US" smtClean="0"/>
-              <a:t>4/3/2022</a:t>
+              <a:t>10/24/2022</a:t>
             </a:fld>
             <a:endParaRPr lang="en-US"/>
           </a:p>
@@ -29521,7 +29522,7 @@
           <a:p>
             <a:fld id="{5958763E-B898-436D-883D-03711491D54A}" type="datetimeFigureOut">
               <a:rPr lang="en-US" smtClean="0"/>
-              <a:t>4/3/2022</a:t>
+              <a:t>10/24/2022</a:t>
             </a:fld>
             <a:endParaRPr lang="en-US"/>
           </a:p>
@@ -30000,7 +30001,7 @@
           <a:p>
             <a:fld id="{5958763E-B898-436D-883D-03711491D54A}" type="datetimeFigureOut">
               <a:rPr lang="en-US" smtClean="0"/>
-              <a:t>4/3/2022</a:t>
+              <a:t>10/24/2022</a:t>
             </a:fld>
             <a:endParaRPr lang="en-US"/>
           </a:p>
@@ -30819,7 +30820,7 @@
           <a:p>
             <a:fld id="{5958763E-B898-436D-883D-03711491D54A}" type="datetimeFigureOut">
               <a:rPr lang="en-US" smtClean="0"/>
-              <a:t>4/3/2022</a:t>
+              <a:t>10/24/2022</a:t>
             </a:fld>
             <a:endParaRPr lang="en-US"/>
           </a:p>
@@ -31020,7 +31021,7 @@
           <a:p>
             <a:fld id="{5958763E-B898-436D-883D-03711491D54A}" type="datetimeFigureOut">
               <a:rPr lang="en-US" smtClean="0"/>
-              <a:t>4/3/2022</a:t>
+              <a:t>10/24/2022</a:t>
             </a:fld>
             <a:endParaRPr lang="en-US"/>
           </a:p>
@@ -31355,7 +31356,7 @@
           <a:p>
             <a:fld id="{5958763E-B898-436D-883D-03711491D54A}" type="datetimeFigureOut">
               <a:rPr lang="en-US" smtClean="0"/>
-              <a:t>4/3/2022</a:t>
+              <a:t>10/24/2022</a:t>
             </a:fld>
             <a:endParaRPr lang="en-US"/>
           </a:p>
@@ -31585,7 +31586,7 @@
           <a:p>
             <a:fld id="{5958763E-B898-436D-883D-03711491D54A}" type="datetimeFigureOut">
               <a:rPr lang="en-US" smtClean="0"/>
-              <a:t>4/3/2022</a:t>
+              <a:t>10/24/2022</a:t>
             </a:fld>
             <a:endParaRPr lang="en-US"/>
           </a:p>
@@ -31829,7 +31830,7 @@
           <a:p>
             <a:fld id="{5958763E-B898-436D-883D-03711491D54A}" type="datetimeFigureOut">
               <a:rPr lang="en-US" smtClean="0"/>
-              <a:t>4/3/2022</a:t>
+              <a:t>10/24/2022</a:t>
             </a:fld>
             <a:endParaRPr lang="en-US"/>
           </a:p>
@@ -32352,7 +32353,7 @@
           <a:p>
             <a:r>
               <a:rPr lang="en-US" dirty="0"/>
-              <a:t>Review Activity Teams</a:t>
+              <a:t>Review Activity Teams: Virtual</a:t>
             </a:r>
           </a:p>
         </p:txBody>
@@ -32561,7 +32562,7 @@
     </p:spTree>
     <p:extLst>
       <p:ext uri="{BB962C8B-B14F-4D97-AF65-F5344CB8AC3E}">
-        <p14:creationId xmlns:p14="http://schemas.microsoft.com/office/powerpoint/2010/main" val="126340359"/>
+        <p14:creationId xmlns:p14="http://schemas.microsoft.com/office/powerpoint/2010/main" val="550097584"/>
       </p:ext>
     </p:extLst>
   </p:cSld>
@@ -32575,6 +32576,204 @@
 </file>
 
 <file path=ppt/slides/slide10.xml><?xml version="1.0" encoding="utf-8"?>
+<p:sld xmlns:a="http://schemas.openxmlformats.org/drawingml/2006/main" xmlns:r="http://schemas.openxmlformats.org/officeDocument/2006/relationships" xmlns:p="http://schemas.openxmlformats.org/presentationml/2006/main">
+  <p:cSld>
+    <p:spTree>
+      <p:nvGrpSpPr>
+        <p:cNvPr id="1" name=""/>
+        <p:cNvGrpSpPr/>
+        <p:nvPr/>
+      </p:nvGrpSpPr>
+      <p:grpSpPr>
+        <a:xfrm>
+          <a:off x="0" y="0"/>
+          <a:ext cx="0" cy="0"/>
+          <a:chOff x="0" y="0"/>
+          <a:chExt cx="0" cy="0"/>
+        </a:xfrm>
+      </p:grpSpPr>
+      <p:sp>
+        <p:nvSpPr>
+          <p:cNvPr id="2" name="Title 1"/>
+          <p:cNvSpPr>
+            <a:spLocks noGrp="1"/>
+          </p:cNvSpPr>
+          <p:nvPr>
+            <p:ph type="title"/>
+          </p:nvPr>
+        </p:nvSpPr>
+        <p:spPr/>
+        <p:txBody>
+          <a:bodyPr/>
+          <a:lstStyle/>
+          <a:p>
+            <a:r>
+              <a:rPr lang="en-US" dirty="0"/>
+              <a:t>7. Which HTML element connects a CSS stylesheet to an html page?</a:t>
+            </a:r>
+          </a:p>
+        </p:txBody>
+      </p:sp>
+      <p:sp>
+        <p:nvSpPr>
+          <p:cNvPr id="3" name="Content Placeholder 2"/>
+          <p:cNvSpPr>
+            <a:spLocks noGrp="1"/>
+          </p:cNvSpPr>
+          <p:nvPr>
+            <p:ph idx="1"/>
+          </p:nvPr>
+        </p:nvSpPr>
+        <p:spPr/>
+        <p:txBody>
+          <a:bodyPr anchor="ctr">
+            <a:normAutofit/>
+          </a:bodyPr>
+          <a:lstStyle/>
+          <a:p>
+            <a:pPr marL="57150" indent="0" algn="ctr">
+              <a:buNone/>
+            </a:pPr>
+            <a:r>
+              <a:rPr lang="pl-PL" sz="8800" dirty="0">
+                <a:solidFill>
+                  <a:srgbClr val="800000"/>
+                </a:solidFill>
+                <a:latin typeface="Consolas" panose="020B0609020204030204" pitchFamily="49" charset="0"/>
+              </a:rPr>
+              <a:t>&lt;</a:t>
+            </a:r>
+            <a:r>
+              <a:rPr lang="en-US" sz="8800" dirty="0">
+                <a:solidFill>
+                  <a:srgbClr val="800000"/>
+                </a:solidFill>
+                <a:latin typeface="Consolas" panose="020B0609020204030204" pitchFamily="49" charset="0"/>
+              </a:rPr>
+              <a:t>link /&gt;</a:t>
+            </a:r>
+            <a:endParaRPr lang="en-US" sz="8800" dirty="0">
+              <a:solidFill>
+                <a:schemeClr val="accent1">
+                  <a:lumMod val="50000"/>
+                </a:schemeClr>
+              </a:solidFill>
+              <a:latin typeface="Consolas" panose="020B0609020204030204" pitchFamily="49" charset="0"/>
+            </a:endParaRPr>
+          </a:p>
+        </p:txBody>
+      </p:sp>
+    </p:spTree>
+    <p:extLst>
+      <p:ext uri="{BB962C8B-B14F-4D97-AF65-F5344CB8AC3E}">
+        <p14:creationId xmlns:p14="http://schemas.microsoft.com/office/powerpoint/2010/main" val="2013883105"/>
+      </p:ext>
+    </p:extLst>
+  </p:cSld>
+  <p:clrMapOvr>
+    <a:masterClrMapping/>
+  </p:clrMapOvr>
+  <p:transition>
+    <p:fade/>
+  </p:transition>
+  <p:timing>
+    <p:tnLst>
+      <p:par>
+        <p:cTn id="1" dur="indefinite" restart="never" nodeType="tmRoot">
+          <p:childTnLst>
+            <p:seq concurrent="1" nextAc="seek">
+              <p:cTn id="2" dur="indefinite" nodeType="mainSeq">
+                <p:childTnLst>
+                  <p:par>
+                    <p:cTn id="3" fill="hold">
+                      <p:stCondLst>
+                        <p:cond delay="indefinite"/>
+                      </p:stCondLst>
+                      <p:childTnLst>
+                        <p:par>
+                          <p:cTn id="4" fill="hold">
+                            <p:stCondLst>
+                              <p:cond delay="0"/>
+                            </p:stCondLst>
+                            <p:childTnLst>
+                              <p:par>
+                                <p:cTn id="5" presetID="10" presetClass="entr" presetSubtype="0" fill="hold" grpId="0" nodeType="clickEffect">
+                                  <p:stCondLst>
+                                    <p:cond delay="0"/>
+                                  </p:stCondLst>
+                                  <p:childTnLst>
+                                    <p:set>
+                                      <p:cBhvr>
+                                        <p:cTn id="6" dur="1" fill="hold">
+                                          <p:stCondLst>
+                                            <p:cond delay="0"/>
+                                          </p:stCondLst>
+                                        </p:cTn>
+                                        <p:tgtEl>
+                                          <p:spTgt spid="3">
+                                            <p:txEl>
+                                              <p:pRg st="0" end="0"/>
+                                            </p:txEl>
+                                          </p:spTgt>
+                                        </p:tgtEl>
+                                        <p:attrNameLst>
+                                          <p:attrName>style.visibility</p:attrName>
+                                        </p:attrNameLst>
+                                      </p:cBhvr>
+                                      <p:to>
+                                        <p:strVal val="visible"/>
+                                      </p:to>
+                                    </p:set>
+                                    <p:animEffect transition="in" filter="fade">
+                                      <p:cBhvr>
+                                        <p:cTn id="7" dur="500"/>
+                                        <p:tgtEl>
+                                          <p:spTgt spid="3">
+                                            <p:txEl>
+                                              <p:pRg st="0" end="0"/>
+                                            </p:txEl>
+                                          </p:spTgt>
+                                        </p:tgtEl>
+                                      </p:cBhvr>
+                                    </p:animEffect>
+                                  </p:childTnLst>
+                                </p:cTn>
+                              </p:par>
+                            </p:childTnLst>
+                          </p:cTn>
+                        </p:par>
+                      </p:childTnLst>
+                    </p:cTn>
+                  </p:par>
+                </p:childTnLst>
+              </p:cTn>
+              <p:prevCondLst>
+                <p:cond evt="onPrev" delay="0">
+                  <p:tgtEl>
+                    <p:sldTgt/>
+                  </p:tgtEl>
+                </p:cond>
+              </p:prevCondLst>
+              <p:nextCondLst>
+                <p:cond evt="onNext" delay="0">
+                  <p:tgtEl>
+                    <p:sldTgt/>
+                  </p:tgtEl>
+                </p:cond>
+              </p:nextCondLst>
+            </p:seq>
+          </p:childTnLst>
+        </p:cTn>
+      </p:par>
+    </p:tnLst>
+    <p:bldLst>
+      <p:bldP spid="3" grpId="0" build="p"/>
+    </p:bldLst>
+  </p:timing>
+</p:sld>
+</file>
+
+<file path=ppt/slides/slide11.xml><?xml version="1.0" encoding="utf-8"?>
 <p:sld xmlns:a="http://schemas.openxmlformats.org/drawingml/2006/main" xmlns:r="http://schemas.openxmlformats.org/officeDocument/2006/relationships" xmlns:p="http://schemas.openxmlformats.org/presentationml/2006/main">
   <p:cSld>
     <p:spTree>
@@ -32762,7 +32961,7 @@
 </p:sld>
 </file>
 
-<file path=ppt/slides/slide11.xml><?xml version="1.0" encoding="utf-8"?>
+<file path=ppt/slides/slide12.xml><?xml version="1.0" encoding="utf-8"?>
 <p:sld xmlns:a="http://schemas.openxmlformats.org/drawingml/2006/main" xmlns:r="http://schemas.openxmlformats.org/officeDocument/2006/relationships" xmlns:p="http://schemas.openxmlformats.org/presentationml/2006/main">
   <p:cSld>
     <p:spTree>
@@ -33160,7 +33359,7 @@
 </p:sld>
 </file>
 
-<file path=ppt/slides/slide12.xml><?xml version="1.0" encoding="utf-8"?>
+<file path=ppt/slides/slide13.xml><?xml version="1.0" encoding="utf-8"?>
 <p:sld xmlns:a="http://schemas.openxmlformats.org/drawingml/2006/main" xmlns:r="http://schemas.openxmlformats.org/officeDocument/2006/relationships" xmlns:p="http://schemas.openxmlformats.org/presentationml/2006/main">
   <p:cSld>
     <p:spTree>
@@ -33500,7 +33699,7 @@
 </p:sld>
 </file>
 
-<file path=ppt/slides/slide13.xml><?xml version="1.0" encoding="utf-8"?>
+<file path=ppt/slides/slide14.xml><?xml version="1.0" encoding="utf-8"?>
 <p:sld xmlns:a="http://schemas.openxmlformats.org/drawingml/2006/main" xmlns:r="http://schemas.openxmlformats.org/officeDocument/2006/relationships" xmlns:p="http://schemas.openxmlformats.org/presentationml/2006/main">
   <p:cSld>
     <p:spTree>
@@ -33807,7 +34006,7 @@
 </p:sld>
 </file>
 
-<file path=ppt/slides/slide14.xml><?xml version="1.0" encoding="utf-8"?>
+<file path=ppt/slides/slide15.xml><?xml version="1.0" encoding="utf-8"?>
 <p:sld xmlns:a="http://schemas.openxmlformats.org/drawingml/2006/main" xmlns:r="http://schemas.openxmlformats.org/officeDocument/2006/relationships" xmlns:p="http://schemas.openxmlformats.org/presentationml/2006/main">
   <p:cSld>
     <p:spTree>
@@ -33985,7 +34184,7 @@
 </p:sld>
 </file>
 
-<file path=ppt/slides/slide15.xml><?xml version="1.0" encoding="utf-8"?>
+<file path=ppt/slides/slide16.xml><?xml version="1.0" encoding="utf-8"?>
 <p:sld xmlns:a="http://schemas.openxmlformats.org/drawingml/2006/main" xmlns:r="http://schemas.openxmlformats.org/officeDocument/2006/relationships" xmlns:p="http://schemas.openxmlformats.org/presentationml/2006/main">
   <p:cSld>
     <p:spTree>
@@ -34197,6 +34396,262 @@
 </file>
 
 <file path=ppt/slides/slide2.xml><?xml version="1.0" encoding="utf-8"?>
+<p:sld xmlns:a="http://schemas.openxmlformats.org/drawingml/2006/main" xmlns:r="http://schemas.openxmlformats.org/officeDocument/2006/relationships" xmlns:p="http://schemas.openxmlformats.org/presentationml/2006/main">
+  <p:cSld>
+    <p:spTree>
+      <p:nvGrpSpPr>
+        <p:cNvPr id="1" name=""/>
+        <p:cNvGrpSpPr/>
+        <p:nvPr/>
+      </p:nvGrpSpPr>
+      <p:grpSpPr>
+        <a:xfrm>
+          <a:off x="0" y="0"/>
+          <a:ext cx="0" cy="0"/>
+          <a:chOff x="0" y="0"/>
+          <a:chExt cx="0" cy="0"/>
+        </a:xfrm>
+      </p:grpSpPr>
+      <p:sp>
+        <p:nvSpPr>
+          <p:cNvPr id="2" name="Title 1"/>
+          <p:cNvSpPr>
+            <a:spLocks noGrp="1"/>
+          </p:cNvSpPr>
+          <p:nvPr>
+            <p:ph type="title"/>
+          </p:nvPr>
+        </p:nvSpPr>
+        <p:spPr/>
+        <p:txBody>
+          <a:bodyPr/>
+          <a:lstStyle/>
+          <a:p>
+            <a:r>
+              <a:rPr lang="en-US" dirty="0"/>
+              <a:t>Review Activity Teams: In-Person</a:t>
+            </a:r>
+          </a:p>
+        </p:txBody>
+      </p:sp>
+      <p:sp>
+        <p:nvSpPr>
+          <p:cNvPr id="3" name="Content Placeholder 2"/>
+          <p:cNvSpPr>
+            <a:spLocks noGrp="1"/>
+          </p:cNvSpPr>
+          <p:nvPr>
+            <p:ph sz="half" idx="1"/>
+          </p:nvPr>
+        </p:nvSpPr>
+        <p:spPr>
+          <a:ln>
+            <a:solidFill>
+              <a:schemeClr val="tx2"/>
+            </a:solidFill>
+          </a:ln>
+        </p:spPr>
+        <p:txBody>
+          <a:bodyPr/>
+          <a:lstStyle/>
+          <a:p>
+            <a:pPr marL="57150" indent="0" algn="ctr">
+              <a:buNone/>
+            </a:pPr>
+            <a:r>
+              <a:rPr lang="en-US" b="1" u="sng" dirty="0"/>
+              <a:t>Team 4</a:t>
+            </a:r>
+          </a:p>
+          <a:p>
+            <a:r>
+              <a:rPr lang="en-US" sz="2800" dirty="0">
+                <a:hlinkClick r:id="rId2"/>
+              </a:rPr>
+              <a:t>https://replit.com/join/nnzfyknlpr-hylandoutreach</a:t>
+            </a:r>
+            <a:endParaRPr lang="en-US" dirty="0"/>
+          </a:p>
+          <a:p>
+            <a:r>
+              <a:rPr lang="en-US" dirty="0"/>
+              <a:t>Student1</a:t>
+            </a:r>
+          </a:p>
+          <a:p>
+            <a:r>
+              <a:rPr lang="en-US" dirty="0"/>
+              <a:t>Student2</a:t>
+            </a:r>
+          </a:p>
+          <a:p>
+            <a:r>
+              <a:rPr lang="en-US" dirty="0"/>
+              <a:t>Student3</a:t>
+            </a:r>
+          </a:p>
+          <a:p>
+            <a:r>
+              <a:rPr lang="en-US" dirty="0"/>
+              <a:t>Student4</a:t>
+            </a:r>
+          </a:p>
+          <a:p>
+            <a:endParaRPr lang="en-US" dirty="0"/>
+          </a:p>
+        </p:txBody>
+      </p:sp>
+      <p:sp>
+        <p:nvSpPr>
+          <p:cNvPr id="4" name="Content Placeholder 3"/>
+          <p:cNvSpPr>
+            <a:spLocks noGrp="1"/>
+          </p:cNvSpPr>
+          <p:nvPr>
+            <p:ph sz="half" idx="2"/>
+          </p:nvPr>
+        </p:nvSpPr>
+        <p:spPr>
+          <a:ln>
+            <a:solidFill>
+              <a:schemeClr val="tx2"/>
+            </a:solidFill>
+          </a:ln>
+        </p:spPr>
+        <p:txBody>
+          <a:bodyPr/>
+          <a:lstStyle/>
+          <a:p>
+            <a:pPr marL="57150" indent="0" algn="ctr">
+              <a:buNone/>
+            </a:pPr>
+            <a:r>
+              <a:rPr lang="en-US" b="1" u="sng" dirty="0"/>
+              <a:t>Team 5</a:t>
+            </a:r>
+          </a:p>
+          <a:p>
+            <a:r>
+              <a:rPr lang="en-US" sz="2800" dirty="0">
+                <a:hlinkClick r:id="rId3"/>
+              </a:rPr>
+              <a:t>https://replit.com/join/khkvjwamfu-hylandoutreach</a:t>
+            </a:r>
+            <a:endParaRPr lang="en-US" sz="2800" dirty="0"/>
+          </a:p>
+          <a:p>
+            <a:r>
+              <a:rPr lang="en-US" dirty="0"/>
+              <a:t>Student1</a:t>
+            </a:r>
+          </a:p>
+          <a:p>
+            <a:r>
+              <a:rPr lang="en-US" dirty="0"/>
+              <a:t>Student2</a:t>
+            </a:r>
+          </a:p>
+          <a:p>
+            <a:r>
+              <a:rPr lang="en-US" dirty="0"/>
+              <a:t>Student3</a:t>
+            </a:r>
+          </a:p>
+          <a:p>
+            <a:r>
+              <a:rPr lang="en-US" dirty="0"/>
+              <a:t>Student4</a:t>
+            </a:r>
+          </a:p>
+          <a:p>
+            <a:endParaRPr lang="en-US" dirty="0"/>
+          </a:p>
+          <a:p>
+            <a:endParaRPr lang="en-US" dirty="0"/>
+          </a:p>
+        </p:txBody>
+      </p:sp>
+      <p:sp>
+        <p:nvSpPr>
+          <p:cNvPr id="5" name="Content Placeholder 4"/>
+          <p:cNvSpPr>
+            <a:spLocks noGrp="1"/>
+          </p:cNvSpPr>
+          <p:nvPr>
+            <p:ph sz="half" idx="10"/>
+          </p:nvPr>
+        </p:nvSpPr>
+        <p:spPr>
+          <a:ln>
+            <a:solidFill>
+              <a:schemeClr val="tx1"/>
+            </a:solidFill>
+          </a:ln>
+        </p:spPr>
+        <p:txBody>
+          <a:bodyPr/>
+          <a:lstStyle/>
+          <a:p>
+            <a:pPr marL="57150" indent="0" algn="ctr">
+              <a:buNone/>
+            </a:pPr>
+            <a:r>
+              <a:rPr lang="en-US" b="1" u="sng" dirty="0"/>
+              <a:t>Team 6</a:t>
+            </a:r>
+          </a:p>
+          <a:p>
+            <a:r>
+              <a:rPr lang="en-US" sz="2800" dirty="0">
+                <a:hlinkClick r:id="rId4"/>
+              </a:rPr>
+              <a:t>https://replit.com/join/qaejbnplzy-hylandoutreach</a:t>
+            </a:r>
+            <a:endParaRPr lang="en-US" sz="2800" dirty="0"/>
+          </a:p>
+          <a:p>
+            <a:r>
+              <a:rPr lang="en-US" dirty="0"/>
+              <a:t>Student1</a:t>
+            </a:r>
+          </a:p>
+          <a:p>
+            <a:r>
+              <a:rPr lang="en-US" dirty="0"/>
+              <a:t>Student2</a:t>
+            </a:r>
+          </a:p>
+          <a:p>
+            <a:r>
+              <a:rPr lang="en-US" dirty="0"/>
+              <a:t>Student3</a:t>
+            </a:r>
+          </a:p>
+          <a:p>
+            <a:r>
+              <a:rPr lang="en-US" dirty="0"/>
+              <a:t>Student4</a:t>
+            </a:r>
+          </a:p>
+        </p:txBody>
+      </p:sp>
+    </p:spTree>
+    <p:extLst>
+      <p:ext uri="{BB962C8B-B14F-4D97-AF65-F5344CB8AC3E}">
+        <p14:creationId xmlns:p14="http://schemas.microsoft.com/office/powerpoint/2010/main" val="126340359"/>
+      </p:ext>
+    </p:extLst>
+  </p:cSld>
+  <p:clrMapOvr>
+    <a:masterClrMapping/>
+  </p:clrMapOvr>
+  <p:transition>
+    <p:fade/>
+  </p:transition>
+</p:sld>
+</file>
+
+<file path=ppt/slides/slide3.xml><?xml version="1.0" encoding="utf-8"?>
 <p:sld xmlns:a="http://schemas.openxmlformats.org/drawingml/2006/main" xmlns:r="http://schemas.openxmlformats.org/officeDocument/2006/relationships" xmlns:p="http://schemas.openxmlformats.org/presentationml/2006/main">
   <p:cSld>
     <p:spTree>
@@ -37253,7 +37708,7 @@
 </p:sld>
 </file>
 
-<file path=ppt/slides/slide3.xml><?xml version="1.0" encoding="utf-8"?>
+<file path=ppt/slides/slide4.xml><?xml version="1.0" encoding="utf-8"?>
 <p:sld xmlns:a="http://schemas.openxmlformats.org/drawingml/2006/main" xmlns:r="http://schemas.openxmlformats.org/officeDocument/2006/relationships" xmlns:p="http://schemas.openxmlformats.org/presentationml/2006/main">
   <p:cSld>
     <p:spTree>
@@ -37451,7 +37906,7 @@
 </p:sld>
 </file>
 
-<file path=ppt/slides/slide4.xml><?xml version="1.0" encoding="utf-8"?>
+<file path=ppt/slides/slide5.xml><?xml version="1.0" encoding="utf-8"?>
 <p:sld xmlns:a="http://schemas.openxmlformats.org/drawingml/2006/main" xmlns:r="http://schemas.openxmlformats.org/officeDocument/2006/relationships" xmlns:p="http://schemas.openxmlformats.org/presentationml/2006/main">
   <p:cSld>
     <p:spTree>
@@ -37649,7 +38104,7 @@
 </p:sld>
 </file>
 
-<file path=ppt/slides/slide5.xml><?xml version="1.0" encoding="utf-8"?>
+<file path=ppt/slides/slide6.xml><?xml version="1.0" encoding="utf-8"?>
 <p:sld xmlns:a="http://schemas.openxmlformats.org/drawingml/2006/main" xmlns:r="http://schemas.openxmlformats.org/officeDocument/2006/relationships" xmlns:p="http://schemas.openxmlformats.org/presentationml/2006/main">
   <p:cSld>
     <p:spTree>
@@ -37900,7 +38355,7 @@
 </p:sld>
 </file>
 
-<file path=ppt/slides/slide6.xml><?xml version="1.0" encoding="utf-8"?>
+<file path=ppt/slides/slide7.xml><?xml version="1.0" encoding="utf-8"?>
 <p:sld xmlns:a="http://schemas.openxmlformats.org/drawingml/2006/main" xmlns:r="http://schemas.openxmlformats.org/officeDocument/2006/relationships" xmlns:p="http://schemas.openxmlformats.org/presentationml/2006/main">
   <p:cSld>
     <p:spTree>
@@ -38479,7 +38934,7 @@
 </p:sld>
 </file>
 
-<file path=ppt/slides/slide7.xml><?xml version="1.0" encoding="utf-8"?>
+<file path=ppt/slides/slide8.xml><?xml version="1.0" encoding="utf-8"?>
 <p:sld xmlns:a="http://schemas.openxmlformats.org/drawingml/2006/main" xmlns:r="http://schemas.openxmlformats.org/officeDocument/2006/relationships" xmlns:p="http://schemas.openxmlformats.org/presentationml/2006/main">
   <p:cSld>
     <p:spTree>
@@ -39000,7 +39455,7 @@
 </p:sld>
 </file>
 
-<file path=ppt/slides/slide8.xml><?xml version="1.0" encoding="utf-8"?>
+<file path=ppt/slides/slide9.xml><?xml version="1.0" encoding="utf-8"?>
 <p:sld xmlns:a="http://schemas.openxmlformats.org/drawingml/2006/main" xmlns:r="http://schemas.openxmlformats.org/officeDocument/2006/relationships" xmlns:p="http://schemas.openxmlformats.org/presentationml/2006/main">
   <p:cSld>
     <p:spTree>
@@ -39096,204 +39551,6 @@
     <p:extLst>
       <p:ext uri="{BB962C8B-B14F-4D97-AF65-F5344CB8AC3E}">
         <p14:creationId xmlns:p14="http://schemas.microsoft.com/office/powerpoint/2010/main" val="1480472296"/>
-      </p:ext>
-    </p:extLst>
-  </p:cSld>
-  <p:clrMapOvr>
-    <a:masterClrMapping/>
-  </p:clrMapOvr>
-  <p:transition>
-    <p:fade/>
-  </p:transition>
-  <p:timing>
-    <p:tnLst>
-      <p:par>
-        <p:cTn id="1" dur="indefinite" restart="never" nodeType="tmRoot">
-          <p:childTnLst>
-            <p:seq concurrent="1" nextAc="seek">
-              <p:cTn id="2" dur="indefinite" nodeType="mainSeq">
-                <p:childTnLst>
-                  <p:par>
-                    <p:cTn id="3" fill="hold">
-                      <p:stCondLst>
-                        <p:cond delay="indefinite"/>
-                      </p:stCondLst>
-                      <p:childTnLst>
-                        <p:par>
-                          <p:cTn id="4" fill="hold">
-                            <p:stCondLst>
-                              <p:cond delay="0"/>
-                            </p:stCondLst>
-                            <p:childTnLst>
-                              <p:par>
-                                <p:cTn id="5" presetID="10" presetClass="entr" presetSubtype="0" fill="hold" grpId="0" nodeType="clickEffect">
-                                  <p:stCondLst>
-                                    <p:cond delay="0"/>
-                                  </p:stCondLst>
-                                  <p:childTnLst>
-                                    <p:set>
-                                      <p:cBhvr>
-                                        <p:cTn id="6" dur="1" fill="hold">
-                                          <p:stCondLst>
-                                            <p:cond delay="0"/>
-                                          </p:stCondLst>
-                                        </p:cTn>
-                                        <p:tgtEl>
-                                          <p:spTgt spid="3">
-                                            <p:txEl>
-                                              <p:pRg st="0" end="0"/>
-                                            </p:txEl>
-                                          </p:spTgt>
-                                        </p:tgtEl>
-                                        <p:attrNameLst>
-                                          <p:attrName>style.visibility</p:attrName>
-                                        </p:attrNameLst>
-                                      </p:cBhvr>
-                                      <p:to>
-                                        <p:strVal val="visible"/>
-                                      </p:to>
-                                    </p:set>
-                                    <p:animEffect transition="in" filter="fade">
-                                      <p:cBhvr>
-                                        <p:cTn id="7" dur="500"/>
-                                        <p:tgtEl>
-                                          <p:spTgt spid="3">
-                                            <p:txEl>
-                                              <p:pRg st="0" end="0"/>
-                                            </p:txEl>
-                                          </p:spTgt>
-                                        </p:tgtEl>
-                                      </p:cBhvr>
-                                    </p:animEffect>
-                                  </p:childTnLst>
-                                </p:cTn>
-                              </p:par>
-                            </p:childTnLst>
-                          </p:cTn>
-                        </p:par>
-                      </p:childTnLst>
-                    </p:cTn>
-                  </p:par>
-                </p:childTnLst>
-              </p:cTn>
-              <p:prevCondLst>
-                <p:cond evt="onPrev" delay="0">
-                  <p:tgtEl>
-                    <p:sldTgt/>
-                  </p:tgtEl>
-                </p:cond>
-              </p:prevCondLst>
-              <p:nextCondLst>
-                <p:cond evt="onNext" delay="0">
-                  <p:tgtEl>
-                    <p:sldTgt/>
-                  </p:tgtEl>
-                </p:cond>
-              </p:nextCondLst>
-            </p:seq>
-          </p:childTnLst>
-        </p:cTn>
-      </p:par>
-    </p:tnLst>
-    <p:bldLst>
-      <p:bldP spid="3" grpId="0" build="p"/>
-    </p:bldLst>
-  </p:timing>
-</p:sld>
-</file>
-
-<file path=ppt/slides/slide9.xml><?xml version="1.0" encoding="utf-8"?>
-<p:sld xmlns:a="http://schemas.openxmlformats.org/drawingml/2006/main" xmlns:r="http://schemas.openxmlformats.org/officeDocument/2006/relationships" xmlns:p="http://schemas.openxmlformats.org/presentationml/2006/main">
-  <p:cSld>
-    <p:spTree>
-      <p:nvGrpSpPr>
-        <p:cNvPr id="1" name=""/>
-        <p:cNvGrpSpPr/>
-        <p:nvPr/>
-      </p:nvGrpSpPr>
-      <p:grpSpPr>
-        <a:xfrm>
-          <a:off x="0" y="0"/>
-          <a:ext cx="0" cy="0"/>
-          <a:chOff x="0" y="0"/>
-          <a:chExt cx="0" cy="0"/>
-        </a:xfrm>
-      </p:grpSpPr>
-      <p:sp>
-        <p:nvSpPr>
-          <p:cNvPr id="2" name="Title 1"/>
-          <p:cNvSpPr>
-            <a:spLocks noGrp="1"/>
-          </p:cNvSpPr>
-          <p:nvPr>
-            <p:ph type="title"/>
-          </p:nvPr>
-        </p:nvSpPr>
-        <p:spPr/>
-        <p:txBody>
-          <a:bodyPr/>
-          <a:lstStyle/>
-          <a:p>
-            <a:r>
-              <a:rPr lang="en-US" dirty="0"/>
-              <a:t>7. Which HTML element connects a CSS stylesheet to an html page?</a:t>
-            </a:r>
-          </a:p>
-        </p:txBody>
-      </p:sp>
-      <p:sp>
-        <p:nvSpPr>
-          <p:cNvPr id="3" name="Content Placeholder 2"/>
-          <p:cNvSpPr>
-            <a:spLocks noGrp="1"/>
-          </p:cNvSpPr>
-          <p:nvPr>
-            <p:ph idx="1"/>
-          </p:nvPr>
-        </p:nvSpPr>
-        <p:spPr/>
-        <p:txBody>
-          <a:bodyPr anchor="ctr">
-            <a:normAutofit/>
-          </a:bodyPr>
-          <a:lstStyle/>
-          <a:p>
-            <a:pPr marL="57150" indent="0" algn="ctr">
-              <a:buNone/>
-            </a:pPr>
-            <a:r>
-              <a:rPr lang="pl-PL" sz="8800" dirty="0">
-                <a:solidFill>
-                  <a:srgbClr val="800000"/>
-                </a:solidFill>
-                <a:latin typeface="Consolas" panose="020B0609020204030204" pitchFamily="49" charset="0"/>
-              </a:rPr>
-              <a:t>&lt;</a:t>
-            </a:r>
-            <a:r>
-              <a:rPr lang="en-US" sz="8800" dirty="0">
-                <a:solidFill>
-                  <a:srgbClr val="800000"/>
-                </a:solidFill>
-                <a:latin typeface="Consolas" panose="020B0609020204030204" pitchFamily="49" charset="0"/>
-              </a:rPr>
-              <a:t>link /&gt;</a:t>
-            </a:r>
-            <a:endParaRPr lang="en-US" sz="8800" dirty="0">
-              <a:solidFill>
-                <a:schemeClr val="accent1">
-                  <a:lumMod val="50000"/>
-                </a:schemeClr>
-              </a:solidFill>
-              <a:latin typeface="Consolas" panose="020B0609020204030204" pitchFamily="49" charset="0"/>
-            </a:endParaRPr>
-          </a:p>
-        </p:txBody>
-      </p:sp>
-    </p:spTree>
-    <p:extLst>
-      <p:ext uri="{BB962C8B-B14F-4D97-AF65-F5344CB8AC3E}">
-        <p14:creationId xmlns:p14="http://schemas.microsoft.com/office/powerpoint/2010/main" val="2013883105"/>
       </p:ext>
     </p:extLst>
   </p:cSld>

</xml_diff>

<commit_message>
update week 6 review ppt
</commit_message>
<xml_diff>
--- a/Week06/HtmlCssReviewActivity.pptx
+++ b/Week06/HtmlCssReviewActivity.pptx
@@ -5,25 +5,24 @@
     <p:sldMasterId id="2147483648" r:id="rId1"/>
   </p:sldMasterIdLst>
   <p:notesMasterIdLst>
-    <p:notesMasterId r:id="rId18"/>
+    <p:notesMasterId r:id="rId17"/>
   </p:notesMasterIdLst>
   <p:sldIdLst>
     <p:sldId id="273" r:id="rId2"/>
-    <p:sldId id="272" r:id="rId3"/>
-    <p:sldId id="258" r:id="rId4"/>
-    <p:sldId id="259" r:id="rId5"/>
-    <p:sldId id="260" r:id="rId6"/>
-    <p:sldId id="261" r:id="rId7"/>
-    <p:sldId id="262" r:id="rId8"/>
-    <p:sldId id="263" r:id="rId9"/>
-    <p:sldId id="264" r:id="rId10"/>
-    <p:sldId id="265" r:id="rId11"/>
-    <p:sldId id="266" r:id="rId12"/>
-    <p:sldId id="267" r:id="rId13"/>
-    <p:sldId id="268" r:id="rId14"/>
-    <p:sldId id="269" r:id="rId15"/>
-    <p:sldId id="271" r:id="rId16"/>
-    <p:sldId id="270" r:id="rId17"/>
+    <p:sldId id="258" r:id="rId3"/>
+    <p:sldId id="259" r:id="rId4"/>
+    <p:sldId id="260" r:id="rId5"/>
+    <p:sldId id="261" r:id="rId6"/>
+    <p:sldId id="262" r:id="rId7"/>
+    <p:sldId id="263" r:id="rId8"/>
+    <p:sldId id="264" r:id="rId9"/>
+    <p:sldId id="265" r:id="rId10"/>
+    <p:sldId id="266" r:id="rId11"/>
+    <p:sldId id="267" r:id="rId12"/>
+    <p:sldId id="268" r:id="rId13"/>
+    <p:sldId id="269" r:id="rId14"/>
+    <p:sldId id="271" r:id="rId15"/>
+    <p:sldId id="270" r:id="rId16"/>
   </p:sldIdLst>
   <p:sldSz cx="12192000" cy="6858000"/>
   <p:notesSz cx="6858000" cy="9144000"/>
@@ -223,7 +222,7 @@
           <a:p>
             <a:fld id="{19104133-B5B0-4351-8158-4F0E5EB1E2BF}" type="datetimeFigureOut">
               <a:rPr lang="en-US" smtClean="0"/>
-              <a:t>10/24/2022</a:t>
+              <a:t>2/3/2023</a:t>
             </a:fld>
             <a:endParaRPr lang="en-US"/>
           </a:p>
@@ -563,7 +562,7 @@
           <a:p>
             <a:fld id="{DEC8F7F9-57EC-49CF-9FCD-2B781E4B449F}" type="slidenum">
               <a:rPr lang="en-US" smtClean="0"/>
-              <a:t>3</a:t>
+              <a:t>2</a:t>
             </a:fld>
             <a:endParaRPr lang="en-US"/>
           </a:p>
@@ -764,7 +763,7 @@
             <a:fld id="{1C2D31DE-C454-491C-B5C3-F097855E3DF7}" type="datetime4">
               <a:rPr lang="en-US" smtClean="0"/>
               <a:pPr/>
-              <a:t>October 24, 2022</a:t>
+              <a:t>February 3, 2023</a:t>
             </a:fld>
             <a:endParaRPr lang="en-US" dirty="0"/>
           </a:p>
@@ -4156,7 +4155,7 @@
           <a:p>
             <a:fld id="{5958763E-B898-436D-883D-03711491D54A}" type="datetimeFigureOut">
               <a:rPr lang="en-US" smtClean="0"/>
-              <a:t>10/24/2022</a:t>
+              <a:t>2/3/2023</a:t>
             </a:fld>
             <a:endParaRPr lang="en-US"/>
           </a:p>
@@ -4349,7 +4348,7 @@
           <a:p>
             <a:fld id="{5958763E-B898-436D-883D-03711491D54A}" type="datetimeFigureOut">
               <a:rPr lang="en-US" smtClean="0"/>
-              <a:t>10/24/2022</a:t>
+              <a:t>2/3/2023</a:t>
             </a:fld>
             <a:endParaRPr lang="en-US"/>
           </a:p>
@@ -4599,7 +4598,7 @@
           <a:p>
             <a:fld id="{5958763E-B898-436D-883D-03711491D54A}" type="datetimeFigureOut">
               <a:rPr lang="en-US" smtClean="0"/>
-              <a:t>10/24/2022</a:t>
+              <a:t>2/3/2023</a:t>
             </a:fld>
             <a:endParaRPr lang="en-US"/>
           </a:p>
@@ -4947,7 +4946,7 @@
           <a:p>
             <a:fld id="{5958763E-B898-436D-883D-03711491D54A}" type="datetimeFigureOut">
               <a:rPr lang="en-US" smtClean="0"/>
-              <a:t>10/24/2022</a:t>
+              <a:t>2/3/2023</a:t>
             </a:fld>
             <a:endParaRPr lang="en-US"/>
           </a:p>
@@ -5363,7 +5362,7 @@
           <a:p>
             <a:fld id="{5958763E-B898-436D-883D-03711491D54A}" type="datetimeFigureOut">
               <a:rPr lang="en-US" smtClean="0"/>
-              <a:t>10/24/2022</a:t>
+              <a:t>2/3/2023</a:t>
             </a:fld>
             <a:endParaRPr lang="en-US"/>
           </a:p>
@@ -5864,7 +5863,7 @@
           <a:p>
             <a:fld id="{5958763E-B898-436D-883D-03711491D54A}" type="datetimeFigureOut">
               <a:rPr lang="en-US" smtClean="0"/>
-              <a:t>10/24/2022</a:t>
+              <a:t>2/3/2023</a:t>
             </a:fld>
             <a:endParaRPr lang="en-US"/>
           </a:p>
@@ -6315,7 +6314,7 @@
           <a:p>
             <a:fld id="{5958763E-B898-436D-883D-03711491D54A}" type="datetimeFigureOut">
               <a:rPr lang="en-US" smtClean="0"/>
-              <a:t>10/24/2022</a:t>
+              <a:t>2/3/2023</a:t>
             </a:fld>
             <a:endParaRPr lang="en-US"/>
           </a:p>
@@ -6926,7 +6925,7 @@
           <a:p>
             <a:fld id="{5958763E-B898-436D-883D-03711491D54A}" type="datetimeFigureOut">
               <a:rPr lang="en-US" smtClean="0"/>
-              <a:t>10/24/2022</a:t>
+              <a:t>2/3/2023</a:t>
             </a:fld>
             <a:endParaRPr lang="en-US"/>
           </a:p>
@@ -7697,7 +7696,7 @@
           <a:p>
             <a:fld id="{5958763E-B898-436D-883D-03711491D54A}" type="datetimeFigureOut">
               <a:rPr lang="en-US" smtClean="0"/>
-              <a:t>10/24/2022</a:t>
+              <a:t>2/3/2023</a:t>
             </a:fld>
             <a:endParaRPr lang="en-US"/>
           </a:p>
@@ -7801,7 +7800,7 @@
           <a:p>
             <a:fld id="{5958763E-B898-436D-883D-03711491D54A}" type="datetimeFigureOut">
               <a:rPr lang="en-US" smtClean="0"/>
-              <a:t>10/24/2022</a:t>
+              <a:t>2/3/2023</a:t>
             </a:fld>
             <a:endParaRPr lang="en-US"/>
           </a:p>
@@ -8128,7 +8127,7 @@
             <a:fld id="{1C2D31DE-C454-491C-B5C3-F097855E3DF7}" type="datetime4">
               <a:rPr lang="en-US" smtClean="0"/>
               <a:pPr/>
-              <a:t>October 24, 2022</a:t>
+              <a:t>February 3, 2023</a:t>
             </a:fld>
             <a:endParaRPr lang="en-US" dirty="0"/>
           </a:p>
@@ -11280,7 +11279,7 @@
           <a:p>
             <a:fld id="{5958763E-B898-436D-883D-03711491D54A}" type="datetimeFigureOut">
               <a:rPr lang="en-US" smtClean="0"/>
-              <a:t>10/24/2022</a:t>
+              <a:t>2/3/2023</a:t>
             </a:fld>
             <a:endParaRPr lang="en-US"/>
           </a:p>
@@ -11404,7 +11403,7 @@
           <a:p>
             <a:fld id="{5958763E-B898-436D-883D-03711491D54A}" type="datetimeFigureOut">
               <a:rPr lang="en-US" smtClean="0"/>
-              <a:t>10/24/2022</a:t>
+              <a:t>2/3/2023</a:t>
             </a:fld>
             <a:endParaRPr lang="en-US"/>
           </a:p>
@@ -11528,7 +11527,7 @@
           <a:p>
             <a:fld id="{5958763E-B898-436D-883D-03711491D54A}" type="datetimeFigureOut">
               <a:rPr lang="en-US" smtClean="0"/>
-              <a:t>10/24/2022</a:t>
+              <a:t>2/3/2023</a:t>
             </a:fld>
             <a:endParaRPr lang="en-US"/>
           </a:p>
@@ -11652,7 +11651,7 @@
           <a:p>
             <a:fld id="{5958763E-B898-436D-883D-03711491D54A}" type="datetimeFigureOut">
               <a:rPr lang="en-US" smtClean="0"/>
-              <a:t>10/24/2022</a:t>
+              <a:t>2/3/2023</a:t>
             </a:fld>
             <a:endParaRPr lang="en-US"/>
           </a:p>
@@ -11776,7 +11775,7 @@
           <a:p>
             <a:fld id="{5958763E-B898-436D-883D-03711491D54A}" type="datetimeFigureOut">
               <a:rPr lang="en-US" smtClean="0"/>
-              <a:t>10/24/2022</a:t>
+              <a:t>2/3/2023</a:t>
             </a:fld>
             <a:endParaRPr lang="en-US"/>
           </a:p>
@@ -11900,7 +11899,7 @@
           <a:p>
             <a:fld id="{5958763E-B898-436D-883D-03711491D54A}" type="datetimeFigureOut">
               <a:rPr lang="en-US" smtClean="0"/>
-              <a:t>10/24/2022</a:t>
+              <a:t>2/3/2023</a:t>
             </a:fld>
             <a:endParaRPr lang="en-US"/>
           </a:p>
@@ -12024,7 +12023,7 @@
           <a:p>
             <a:fld id="{5958763E-B898-436D-883D-03711491D54A}" type="datetimeFigureOut">
               <a:rPr lang="en-US" smtClean="0"/>
-              <a:t>10/24/2022</a:t>
+              <a:t>2/3/2023</a:t>
             </a:fld>
             <a:endParaRPr lang="en-US"/>
           </a:p>
@@ -12148,7 +12147,7 @@
           <a:p>
             <a:fld id="{5958763E-B898-436D-883D-03711491D54A}" type="datetimeFigureOut">
               <a:rPr lang="en-US" smtClean="0"/>
-              <a:t>10/24/2022</a:t>
+              <a:t>2/3/2023</a:t>
             </a:fld>
             <a:endParaRPr lang="en-US"/>
           </a:p>
@@ -12281,7 +12280,7 @@
           <a:p>
             <a:fld id="{5958763E-B898-436D-883D-03711491D54A}" type="datetimeFigureOut">
               <a:rPr lang="en-US" smtClean="0"/>
-              <a:t>10/24/2022</a:t>
+              <a:t>2/3/2023</a:t>
             </a:fld>
             <a:endParaRPr lang="en-US"/>
           </a:p>
@@ -15620,7 +15619,7 @@
             <a:fld id="{1C2D31DE-C454-491C-B5C3-F097855E3DF7}" type="datetime4">
               <a:rPr lang="en-US" smtClean="0"/>
               <a:pPr/>
-              <a:t>October 24, 2022</a:t>
+              <a:t>February 3, 2023</a:t>
             </a:fld>
             <a:endParaRPr lang="en-US" dirty="0"/>
           </a:p>
@@ -27856,7 +27855,7 @@
           <a:p>
             <a:fld id="{5958763E-B898-436D-883D-03711491D54A}" type="datetimeFigureOut">
               <a:rPr lang="en-US" smtClean="0"/>
-              <a:t>10/24/2022</a:t>
+              <a:t>2/3/2023</a:t>
             </a:fld>
             <a:endParaRPr lang="en-US"/>
           </a:p>
@@ -28258,7 +28257,7 @@
           <a:p>
             <a:fld id="{5958763E-B898-436D-883D-03711491D54A}" type="datetimeFigureOut">
               <a:rPr lang="en-US" smtClean="0"/>
-              <a:t>10/24/2022</a:t>
+              <a:t>2/3/2023</a:t>
             </a:fld>
             <a:endParaRPr lang="en-US"/>
           </a:p>
@@ -28552,7 +28551,7 @@
           <a:p>
             <a:fld id="{5958763E-B898-436D-883D-03711491D54A}" type="datetimeFigureOut">
               <a:rPr lang="en-US" smtClean="0"/>
-              <a:t>10/24/2022</a:t>
+              <a:t>2/3/2023</a:t>
             </a:fld>
             <a:endParaRPr lang="en-US"/>
           </a:p>
@@ -28753,7 +28752,7 @@
           <a:p>
             <a:fld id="{5958763E-B898-436D-883D-03711491D54A}" type="datetimeFigureOut">
               <a:rPr lang="en-US" smtClean="0"/>
-              <a:t>10/24/2022</a:t>
+              <a:t>2/3/2023</a:t>
             </a:fld>
             <a:endParaRPr lang="en-US"/>
           </a:p>
@@ -29014,7 +29013,7 @@
           <a:p>
             <a:fld id="{5958763E-B898-436D-883D-03711491D54A}" type="datetimeFigureOut">
               <a:rPr lang="en-US" smtClean="0"/>
-              <a:t>10/24/2022</a:t>
+              <a:t>2/3/2023</a:t>
             </a:fld>
             <a:endParaRPr lang="en-US"/>
           </a:p>
@@ -29522,7 +29521,7 @@
           <a:p>
             <a:fld id="{5958763E-B898-436D-883D-03711491D54A}" type="datetimeFigureOut">
               <a:rPr lang="en-US" smtClean="0"/>
-              <a:t>10/24/2022</a:t>
+              <a:t>2/3/2023</a:t>
             </a:fld>
             <a:endParaRPr lang="en-US"/>
           </a:p>
@@ -30001,7 +30000,7 @@
           <a:p>
             <a:fld id="{5958763E-B898-436D-883D-03711491D54A}" type="datetimeFigureOut">
               <a:rPr lang="en-US" smtClean="0"/>
-              <a:t>10/24/2022</a:t>
+              <a:t>2/3/2023</a:t>
             </a:fld>
             <a:endParaRPr lang="en-US"/>
           </a:p>
@@ -30820,7 +30819,7 @@
           <a:p>
             <a:fld id="{5958763E-B898-436D-883D-03711491D54A}" type="datetimeFigureOut">
               <a:rPr lang="en-US" smtClean="0"/>
-              <a:t>10/24/2022</a:t>
+              <a:t>2/3/2023</a:t>
             </a:fld>
             <a:endParaRPr lang="en-US"/>
           </a:p>
@@ -31021,7 +31020,7 @@
           <a:p>
             <a:fld id="{5958763E-B898-436D-883D-03711491D54A}" type="datetimeFigureOut">
               <a:rPr lang="en-US" smtClean="0"/>
-              <a:t>10/24/2022</a:t>
+              <a:t>2/3/2023</a:t>
             </a:fld>
             <a:endParaRPr lang="en-US"/>
           </a:p>
@@ -31356,7 +31355,7 @@
           <a:p>
             <a:fld id="{5958763E-B898-436D-883D-03711491D54A}" type="datetimeFigureOut">
               <a:rPr lang="en-US" smtClean="0"/>
-              <a:t>10/24/2022</a:t>
+              <a:t>2/3/2023</a:t>
             </a:fld>
             <a:endParaRPr lang="en-US"/>
           </a:p>
@@ -31586,7 +31585,7 @@
           <a:p>
             <a:fld id="{5958763E-B898-436D-883D-03711491D54A}" type="datetimeFigureOut">
               <a:rPr lang="en-US" smtClean="0"/>
-              <a:t>10/24/2022</a:t>
+              <a:t>2/3/2023</a:t>
             </a:fld>
             <a:endParaRPr lang="en-US"/>
           </a:p>
@@ -31830,7 +31829,7 @@
           <a:p>
             <a:fld id="{5958763E-B898-436D-883D-03711491D54A}" type="datetimeFigureOut">
               <a:rPr lang="en-US" smtClean="0"/>
-              <a:t>10/24/2022</a:t>
+              <a:t>2/3/2023</a:t>
             </a:fld>
             <a:endParaRPr lang="en-US"/>
           </a:p>
@@ -32353,7 +32352,7 @@
           <a:p>
             <a:r>
               <a:rPr lang="en-US" dirty="0"/>
-              <a:t>Review Activity Teams: Virtual</a:t>
+              <a:t>Review Activity Teams</a:t>
             </a:r>
           </a:p>
         </p:txBody>
@@ -32609,204 +32608,6 @@
           <a:p>
             <a:r>
               <a:rPr lang="en-US" dirty="0"/>
-              <a:t>7. Which HTML element connects a CSS stylesheet to an html page?</a:t>
-            </a:r>
-          </a:p>
-        </p:txBody>
-      </p:sp>
-      <p:sp>
-        <p:nvSpPr>
-          <p:cNvPr id="3" name="Content Placeholder 2"/>
-          <p:cNvSpPr>
-            <a:spLocks noGrp="1"/>
-          </p:cNvSpPr>
-          <p:nvPr>
-            <p:ph idx="1"/>
-          </p:nvPr>
-        </p:nvSpPr>
-        <p:spPr/>
-        <p:txBody>
-          <a:bodyPr anchor="ctr">
-            <a:normAutofit/>
-          </a:bodyPr>
-          <a:lstStyle/>
-          <a:p>
-            <a:pPr marL="57150" indent="0" algn="ctr">
-              <a:buNone/>
-            </a:pPr>
-            <a:r>
-              <a:rPr lang="pl-PL" sz="8800" dirty="0">
-                <a:solidFill>
-                  <a:srgbClr val="800000"/>
-                </a:solidFill>
-                <a:latin typeface="Consolas" panose="020B0609020204030204" pitchFamily="49" charset="0"/>
-              </a:rPr>
-              <a:t>&lt;</a:t>
-            </a:r>
-            <a:r>
-              <a:rPr lang="en-US" sz="8800" dirty="0">
-                <a:solidFill>
-                  <a:srgbClr val="800000"/>
-                </a:solidFill>
-                <a:latin typeface="Consolas" panose="020B0609020204030204" pitchFamily="49" charset="0"/>
-              </a:rPr>
-              <a:t>link /&gt;</a:t>
-            </a:r>
-            <a:endParaRPr lang="en-US" sz="8800" dirty="0">
-              <a:solidFill>
-                <a:schemeClr val="accent1">
-                  <a:lumMod val="50000"/>
-                </a:schemeClr>
-              </a:solidFill>
-              <a:latin typeface="Consolas" panose="020B0609020204030204" pitchFamily="49" charset="0"/>
-            </a:endParaRPr>
-          </a:p>
-        </p:txBody>
-      </p:sp>
-    </p:spTree>
-    <p:extLst>
-      <p:ext uri="{BB962C8B-B14F-4D97-AF65-F5344CB8AC3E}">
-        <p14:creationId xmlns:p14="http://schemas.microsoft.com/office/powerpoint/2010/main" val="2013883105"/>
-      </p:ext>
-    </p:extLst>
-  </p:cSld>
-  <p:clrMapOvr>
-    <a:masterClrMapping/>
-  </p:clrMapOvr>
-  <p:transition>
-    <p:fade/>
-  </p:transition>
-  <p:timing>
-    <p:tnLst>
-      <p:par>
-        <p:cTn id="1" dur="indefinite" restart="never" nodeType="tmRoot">
-          <p:childTnLst>
-            <p:seq concurrent="1" nextAc="seek">
-              <p:cTn id="2" dur="indefinite" nodeType="mainSeq">
-                <p:childTnLst>
-                  <p:par>
-                    <p:cTn id="3" fill="hold">
-                      <p:stCondLst>
-                        <p:cond delay="indefinite"/>
-                      </p:stCondLst>
-                      <p:childTnLst>
-                        <p:par>
-                          <p:cTn id="4" fill="hold">
-                            <p:stCondLst>
-                              <p:cond delay="0"/>
-                            </p:stCondLst>
-                            <p:childTnLst>
-                              <p:par>
-                                <p:cTn id="5" presetID="10" presetClass="entr" presetSubtype="0" fill="hold" grpId="0" nodeType="clickEffect">
-                                  <p:stCondLst>
-                                    <p:cond delay="0"/>
-                                  </p:stCondLst>
-                                  <p:childTnLst>
-                                    <p:set>
-                                      <p:cBhvr>
-                                        <p:cTn id="6" dur="1" fill="hold">
-                                          <p:stCondLst>
-                                            <p:cond delay="0"/>
-                                          </p:stCondLst>
-                                        </p:cTn>
-                                        <p:tgtEl>
-                                          <p:spTgt spid="3">
-                                            <p:txEl>
-                                              <p:pRg st="0" end="0"/>
-                                            </p:txEl>
-                                          </p:spTgt>
-                                        </p:tgtEl>
-                                        <p:attrNameLst>
-                                          <p:attrName>style.visibility</p:attrName>
-                                        </p:attrNameLst>
-                                      </p:cBhvr>
-                                      <p:to>
-                                        <p:strVal val="visible"/>
-                                      </p:to>
-                                    </p:set>
-                                    <p:animEffect transition="in" filter="fade">
-                                      <p:cBhvr>
-                                        <p:cTn id="7" dur="500"/>
-                                        <p:tgtEl>
-                                          <p:spTgt spid="3">
-                                            <p:txEl>
-                                              <p:pRg st="0" end="0"/>
-                                            </p:txEl>
-                                          </p:spTgt>
-                                        </p:tgtEl>
-                                      </p:cBhvr>
-                                    </p:animEffect>
-                                  </p:childTnLst>
-                                </p:cTn>
-                              </p:par>
-                            </p:childTnLst>
-                          </p:cTn>
-                        </p:par>
-                      </p:childTnLst>
-                    </p:cTn>
-                  </p:par>
-                </p:childTnLst>
-              </p:cTn>
-              <p:prevCondLst>
-                <p:cond evt="onPrev" delay="0">
-                  <p:tgtEl>
-                    <p:sldTgt/>
-                  </p:tgtEl>
-                </p:cond>
-              </p:prevCondLst>
-              <p:nextCondLst>
-                <p:cond evt="onNext" delay="0">
-                  <p:tgtEl>
-                    <p:sldTgt/>
-                  </p:tgtEl>
-                </p:cond>
-              </p:nextCondLst>
-            </p:seq>
-          </p:childTnLst>
-        </p:cTn>
-      </p:par>
-    </p:tnLst>
-    <p:bldLst>
-      <p:bldP spid="3" grpId="0" build="p"/>
-    </p:bldLst>
-  </p:timing>
-</p:sld>
-</file>
-
-<file path=ppt/slides/slide11.xml><?xml version="1.0" encoding="utf-8"?>
-<p:sld xmlns:a="http://schemas.openxmlformats.org/drawingml/2006/main" xmlns:r="http://schemas.openxmlformats.org/officeDocument/2006/relationships" xmlns:p="http://schemas.openxmlformats.org/presentationml/2006/main">
-  <p:cSld>
-    <p:spTree>
-      <p:nvGrpSpPr>
-        <p:cNvPr id="1" name=""/>
-        <p:cNvGrpSpPr/>
-        <p:nvPr/>
-      </p:nvGrpSpPr>
-      <p:grpSpPr>
-        <a:xfrm>
-          <a:off x="0" y="0"/>
-          <a:ext cx="0" cy="0"/>
-          <a:chOff x="0" y="0"/>
-          <a:chExt cx="0" cy="0"/>
-        </a:xfrm>
-      </p:grpSpPr>
-      <p:sp>
-        <p:nvSpPr>
-          <p:cNvPr id="2" name="Title 1"/>
-          <p:cNvSpPr>
-            <a:spLocks noGrp="1"/>
-          </p:cNvSpPr>
-          <p:nvPr>
-            <p:ph type="title"/>
-          </p:nvPr>
-        </p:nvSpPr>
-        <p:spPr/>
-        <p:txBody>
-          <a:bodyPr/>
-          <a:lstStyle/>
-          <a:p>
-            <a:r>
-              <a:rPr lang="en-US" dirty="0"/>
               <a:t>8. Which CSS property can make text larger?</a:t>
             </a:r>
           </a:p>
@@ -32961,7 +32762,7 @@
 </p:sld>
 </file>
 
-<file path=ppt/slides/slide12.xml><?xml version="1.0" encoding="utf-8"?>
+<file path=ppt/slides/slide11.xml><?xml version="1.0" encoding="utf-8"?>
 <p:sld xmlns:a="http://schemas.openxmlformats.org/drawingml/2006/main" xmlns:r="http://schemas.openxmlformats.org/officeDocument/2006/relationships" xmlns:p="http://schemas.openxmlformats.org/presentationml/2006/main">
   <p:cSld>
     <p:spTree>
@@ -33359,7 +33160,7 @@
 </p:sld>
 </file>
 
-<file path=ppt/slides/slide13.xml><?xml version="1.0" encoding="utf-8"?>
+<file path=ppt/slides/slide12.xml><?xml version="1.0" encoding="utf-8"?>
 <p:sld xmlns:a="http://schemas.openxmlformats.org/drawingml/2006/main" xmlns:r="http://schemas.openxmlformats.org/officeDocument/2006/relationships" xmlns:p="http://schemas.openxmlformats.org/presentationml/2006/main">
   <p:cSld>
     <p:spTree>
@@ -33699,7 +33500,7 @@
 </p:sld>
 </file>
 
-<file path=ppt/slides/slide14.xml><?xml version="1.0" encoding="utf-8"?>
+<file path=ppt/slides/slide13.xml><?xml version="1.0" encoding="utf-8"?>
 <p:sld xmlns:a="http://schemas.openxmlformats.org/drawingml/2006/main" xmlns:r="http://schemas.openxmlformats.org/officeDocument/2006/relationships" xmlns:p="http://schemas.openxmlformats.org/presentationml/2006/main">
   <p:cSld>
     <p:spTree>
@@ -34006,7 +33807,7 @@
 </p:sld>
 </file>
 
-<file path=ppt/slides/slide15.xml><?xml version="1.0" encoding="utf-8"?>
+<file path=ppt/slides/slide14.xml><?xml version="1.0" encoding="utf-8"?>
 <p:sld xmlns:a="http://schemas.openxmlformats.org/drawingml/2006/main" xmlns:r="http://schemas.openxmlformats.org/officeDocument/2006/relationships" xmlns:p="http://schemas.openxmlformats.org/presentationml/2006/main">
   <p:cSld>
     <p:spTree>
@@ -34184,7 +33985,7 @@
 </p:sld>
 </file>
 
-<file path=ppt/slides/slide16.xml><?xml version="1.0" encoding="utf-8"?>
+<file path=ppt/slides/slide15.xml><?xml version="1.0" encoding="utf-8"?>
 <p:sld xmlns:a="http://schemas.openxmlformats.org/drawingml/2006/main" xmlns:r="http://schemas.openxmlformats.org/officeDocument/2006/relationships" xmlns:p="http://schemas.openxmlformats.org/presentationml/2006/main">
   <p:cSld>
     <p:spTree>
@@ -34396,262 +34197,6 @@
 </file>
 
 <file path=ppt/slides/slide2.xml><?xml version="1.0" encoding="utf-8"?>
-<p:sld xmlns:a="http://schemas.openxmlformats.org/drawingml/2006/main" xmlns:r="http://schemas.openxmlformats.org/officeDocument/2006/relationships" xmlns:p="http://schemas.openxmlformats.org/presentationml/2006/main">
-  <p:cSld>
-    <p:spTree>
-      <p:nvGrpSpPr>
-        <p:cNvPr id="1" name=""/>
-        <p:cNvGrpSpPr/>
-        <p:nvPr/>
-      </p:nvGrpSpPr>
-      <p:grpSpPr>
-        <a:xfrm>
-          <a:off x="0" y="0"/>
-          <a:ext cx="0" cy="0"/>
-          <a:chOff x="0" y="0"/>
-          <a:chExt cx="0" cy="0"/>
-        </a:xfrm>
-      </p:grpSpPr>
-      <p:sp>
-        <p:nvSpPr>
-          <p:cNvPr id="2" name="Title 1"/>
-          <p:cNvSpPr>
-            <a:spLocks noGrp="1"/>
-          </p:cNvSpPr>
-          <p:nvPr>
-            <p:ph type="title"/>
-          </p:nvPr>
-        </p:nvSpPr>
-        <p:spPr/>
-        <p:txBody>
-          <a:bodyPr/>
-          <a:lstStyle/>
-          <a:p>
-            <a:r>
-              <a:rPr lang="en-US" dirty="0"/>
-              <a:t>Review Activity Teams: In-Person</a:t>
-            </a:r>
-          </a:p>
-        </p:txBody>
-      </p:sp>
-      <p:sp>
-        <p:nvSpPr>
-          <p:cNvPr id="3" name="Content Placeholder 2"/>
-          <p:cNvSpPr>
-            <a:spLocks noGrp="1"/>
-          </p:cNvSpPr>
-          <p:nvPr>
-            <p:ph sz="half" idx="1"/>
-          </p:nvPr>
-        </p:nvSpPr>
-        <p:spPr>
-          <a:ln>
-            <a:solidFill>
-              <a:schemeClr val="tx2"/>
-            </a:solidFill>
-          </a:ln>
-        </p:spPr>
-        <p:txBody>
-          <a:bodyPr/>
-          <a:lstStyle/>
-          <a:p>
-            <a:pPr marL="57150" indent="0" algn="ctr">
-              <a:buNone/>
-            </a:pPr>
-            <a:r>
-              <a:rPr lang="en-US" b="1" u="sng" dirty="0"/>
-              <a:t>Team 4</a:t>
-            </a:r>
-          </a:p>
-          <a:p>
-            <a:r>
-              <a:rPr lang="en-US" sz="2800" dirty="0">
-                <a:hlinkClick r:id="rId2"/>
-              </a:rPr>
-              <a:t>https://replit.com/join/nnzfyknlpr-hylandoutreach</a:t>
-            </a:r>
-            <a:endParaRPr lang="en-US" dirty="0"/>
-          </a:p>
-          <a:p>
-            <a:r>
-              <a:rPr lang="en-US" dirty="0"/>
-              <a:t>Student1</a:t>
-            </a:r>
-          </a:p>
-          <a:p>
-            <a:r>
-              <a:rPr lang="en-US" dirty="0"/>
-              <a:t>Student2</a:t>
-            </a:r>
-          </a:p>
-          <a:p>
-            <a:r>
-              <a:rPr lang="en-US" dirty="0"/>
-              <a:t>Student3</a:t>
-            </a:r>
-          </a:p>
-          <a:p>
-            <a:r>
-              <a:rPr lang="en-US" dirty="0"/>
-              <a:t>Student4</a:t>
-            </a:r>
-          </a:p>
-          <a:p>
-            <a:endParaRPr lang="en-US" dirty="0"/>
-          </a:p>
-        </p:txBody>
-      </p:sp>
-      <p:sp>
-        <p:nvSpPr>
-          <p:cNvPr id="4" name="Content Placeholder 3"/>
-          <p:cNvSpPr>
-            <a:spLocks noGrp="1"/>
-          </p:cNvSpPr>
-          <p:nvPr>
-            <p:ph sz="half" idx="2"/>
-          </p:nvPr>
-        </p:nvSpPr>
-        <p:spPr>
-          <a:ln>
-            <a:solidFill>
-              <a:schemeClr val="tx2"/>
-            </a:solidFill>
-          </a:ln>
-        </p:spPr>
-        <p:txBody>
-          <a:bodyPr/>
-          <a:lstStyle/>
-          <a:p>
-            <a:pPr marL="57150" indent="0" algn="ctr">
-              <a:buNone/>
-            </a:pPr>
-            <a:r>
-              <a:rPr lang="en-US" b="1" u="sng" dirty="0"/>
-              <a:t>Team 5</a:t>
-            </a:r>
-          </a:p>
-          <a:p>
-            <a:r>
-              <a:rPr lang="en-US" sz="2800" dirty="0">
-                <a:hlinkClick r:id="rId3"/>
-              </a:rPr>
-              <a:t>https://replit.com/join/khkvjwamfu-hylandoutreach</a:t>
-            </a:r>
-            <a:endParaRPr lang="en-US" sz="2800" dirty="0"/>
-          </a:p>
-          <a:p>
-            <a:r>
-              <a:rPr lang="en-US" dirty="0"/>
-              <a:t>Student1</a:t>
-            </a:r>
-          </a:p>
-          <a:p>
-            <a:r>
-              <a:rPr lang="en-US" dirty="0"/>
-              <a:t>Student2</a:t>
-            </a:r>
-          </a:p>
-          <a:p>
-            <a:r>
-              <a:rPr lang="en-US" dirty="0"/>
-              <a:t>Student3</a:t>
-            </a:r>
-          </a:p>
-          <a:p>
-            <a:r>
-              <a:rPr lang="en-US" dirty="0"/>
-              <a:t>Student4</a:t>
-            </a:r>
-          </a:p>
-          <a:p>
-            <a:endParaRPr lang="en-US" dirty="0"/>
-          </a:p>
-          <a:p>
-            <a:endParaRPr lang="en-US" dirty="0"/>
-          </a:p>
-        </p:txBody>
-      </p:sp>
-      <p:sp>
-        <p:nvSpPr>
-          <p:cNvPr id="5" name="Content Placeholder 4"/>
-          <p:cNvSpPr>
-            <a:spLocks noGrp="1"/>
-          </p:cNvSpPr>
-          <p:nvPr>
-            <p:ph sz="half" idx="10"/>
-          </p:nvPr>
-        </p:nvSpPr>
-        <p:spPr>
-          <a:ln>
-            <a:solidFill>
-              <a:schemeClr val="tx1"/>
-            </a:solidFill>
-          </a:ln>
-        </p:spPr>
-        <p:txBody>
-          <a:bodyPr/>
-          <a:lstStyle/>
-          <a:p>
-            <a:pPr marL="57150" indent="0" algn="ctr">
-              <a:buNone/>
-            </a:pPr>
-            <a:r>
-              <a:rPr lang="en-US" b="1" u="sng" dirty="0"/>
-              <a:t>Team 6</a:t>
-            </a:r>
-          </a:p>
-          <a:p>
-            <a:r>
-              <a:rPr lang="en-US" sz="2800" dirty="0">
-                <a:hlinkClick r:id="rId4"/>
-              </a:rPr>
-              <a:t>https://replit.com/join/qaejbnplzy-hylandoutreach</a:t>
-            </a:r>
-            <a:endParaRPr lang="en-US" sz="2800" dirty="0"/>
-          </a:p>
-          <a:p>
-            <a:r>
-              <a:rPr lang="en-US" dirty="0"/>
-              <a:t>Student1</a:t>
-            </a:r>
-          </a:p>
-          <a:p>
-            <a:r>
-              <a:rPr lang="en-US" dirty="0"/>
-              <a:t>Student2</a:t>
-            </a:r>
-          </a:p>
-          <a:p>
-            <a:r>
-              <a:rPr lang="en-US" dirty="0"/>
-              <a:t>Student3</a:t>
-            </a:r>
-          </a:p>
-          <a:p>
-            <a:r>
-              <a:rPr lang="en-US" dirty="0"/>
-              <a:t>Student4</a:t>
-            </a:r>
-          </a:p>
-        </p:txBody>
-      </p:sp>
-    </p:spTree>
-    <p:extLst>
-      <p:ext uri="{BB962C8B-B14F-4D97-AF65-F5344CB8AC3E}">
-        <p14:creationId xmlns:p14="http://schemas.microsoft.com/office/powerpoint/2010/main" val="126340359"/>
-      </p:ext>
-    </p:extLst>
-  </p:cSld>
-  <p:clrMapOvr>
-    <a:masterClrMapping/>
-  </p:clrMapOvr>
-  <p:transition>
-    <p:fade/>
-  </p:transition>
-</p:sld>
-</file>
-
-<file path=ppt/slides/slide3.xml><?xml version="1.0" encoding="utf-8"?>
 <p:sld xmlns:a="http://schemas.openxmlformats.org/drawingml/2006/main" xmlns:r="http://schemas.openxmlformats.org/officeDocument/2006/relationships" xmlns:p="http://schemas.openxmlformats.org/presentationml/2006/main">
   <p:cSld>
     <p:spTree>
@@ -37708,7 +37253,7 @@
 </p:sld>
 </file>
 
-<file path=ppt/slides/slide4.xml><?xml version="1.0" encoding="utf-8"?>
+<file path=ppt/slides/slide3.xml><?xml version="1.0" encoding="utf-8"?>
 <p:sld xmlns:a="http://schemas.openxmlformats.org/drawingml/2006/main" xmlns:r="http://schemas.openxmlformats.org/officeDocument/2006/relationships" xmlns:p="http://schemas.openxmlformats.org/presentationml/2006/main">
   <p:cSld>
     <p:spTree>
@@ -37906,7 +37451,7 @@
 </p:sld>
 </file>
 
-<file path=ppt/slides/slide5.xml><?xml version="1.0" encoding="utf-8"?>
+<file path=ppt/slides/slide4.xml><?xml version="1.0" encoding="utf-8"?>
 <p:sld xmlns:a="http://schemas.openxmlformats.org/drawingml/2006/main" xmlns:r="http://schemas.openxmlformats.org/officeDocument/2006/relationships" xmlns:p="http://schemas.openxmlformats.org/presentationml/2006/main">
   <p:cSld>
     <p:spTree>
@@ -38104,7 +37649,7 @@
 </p:sld>
 </file>
 
-<file path=ppt/slides/slide6.xml><?xml version="1.0" encoding="utf-8"?>
+<file path=ppt/slides/slide5.xml><?xml version="1.0" encoding="utf-8"?>
 <p:sld xmlns:a="http://schemas.openxmlformats.org/drawingml/2006/main" xmlns:r="http://schemas.openxmlformats.org/officeDocument/2006/relationships" xmlns:p="http://schemas.openxmlformats.org/presentationml/2006/main">
   <p:cSld>
     <p:spTree>
@@ -38355,7 +37900,7 @@
 </p:sld>
 </file>
 
-<file path=ppt/slides/slide7.xml><?xml version="1.0" encoding="utf-8"?>
+<file path=ppt/slides/slide6.xml><?xml version="1.0" encoding="utf-8"?>
 <p:sld xmlns:a="http://schemas.openxmlformats.org/drawingml/2006/main" xmlns:r="http://schemas.openxmlformats.org/officeDocument/2006/relationships" xmlns:p="http://schemas.openxmlformats.org/presentationml/2006/main">
   <p:cSld>
     <p:spTree>
@@ -38934,7 +38479,7 @@
 </p:sld>
 </file>
 
-<file path=ppt/slides/slide8.xml><?xml version="1.0" encoding="utf-8"?>
+<file path=ppt/slides/slide7.xml><?xml version="1.0" encoding="utf-8"?>
 <p:sld xmlns:a="http://schemas.openxmlformats.org/drawingml/2006/main" xmlns:r="http://schemas.openxmlformats.org/officeDocument/2006/relationships" xmlns:p="http://schemas.openxmlformats.org/presentationml/2006/main">
   <p:cSld>
     <p:spTree>
@@ -39455,7 +39000,7 @@
 </p:sld>
 </file>
 
-<file path=ppt/slides/slide9.xml><?xml version="1.0" encoding="utf-8"?>
+<file path=ppt/slides/slide8.xml><?xml version="1.0" encoding="utf-8"?>
 <p:sld xmlns:a="http://schemas.openxmlformats.org/drawingml/2006/main" xmlns:r="http://schemas.openxmlformats.org/officeDocument/2006/relationships" xmlns:p="http://schemas.openxmlformats.org/presentationml/2006/main">
   <p:cSld>
     <p:spTree>
@@ -39551,6 +39096,204 @@
     <p:extLst>
       <p:ext uri="{BB962C8B-B14F-4D97-AF65-F5344CB8AC3E}">
         <p14:creationId xmlns:p14="http://schemas.microsoft.com/office/powerpoint/2010/main" val="1480472296"/>
+      </p:ext>
+    </p:extLst>
+  </p:cSld>
+  <p:clrMapOvr>
+    <a:masterClrMapping/>
+  </p:clrMapOvr>
+  <p:transition>
+    <p:fade/>
+  </p:transition>
+  <p:timing>
+    <p:tnLst>
+      <p:par>
+        <p:cTn id="1" dur="indefinite" restart="never" nodeType="tmRoot">
+          <p:childTnLst>
+            <p:seq concurrent="1" nextAc="seek">
+              <p:cTn id="2" dur="indefinite" nodeType="mainSeq">
+                <p:childTnLst>
+                  <p:par>
+                    <p:cTn id="3" fill="hold">
+                      <p:stCondLst>
+                        <p:cond delay="indefinite"/>
+                      </p:stCondLst>
+                      <p:childTnLst>
+                        <p:par>
+                          <p:cTn id="4" fill="hold">
+                            <p:stCondLst>
+                              <p:cond delay="0"/>
+                            </p:stCondLst>
+                            <p:childTnLst>
+                              <p:par>
+                                <p:cTn id="5" presetID="10" presetClass="entr" presetSubtype="0" fill="hold" grpId="0" nodeType="clickEffect">
+                                  <p:stCondLst>
+                                    <p:cond delay="0"/>
+                                  </p:stCondLst>
+                                  <p:childTnLst>
+                                    <p:set>
+                                      <p:cBhvr>
+                                        <p:cTn id="6" dur="1" fill="hold">
+                                          <p:stCondLst>
+                                            <p:cond delay="0"/>
+                                          </p:stCondLst>
+                                        </p:cTn>
+                                        <p:tgtEl>
+                                          <p:spTgt spid="3">
+                                            <p:txEl>
+                                              <p:pRg st="0" end="0"/>
+                                            </p:txEl>
+                                          </p:spTgt>
+                                        </p:tgtEl>
+                                        <p:attrNameLst>
+                                          <p:attrName>style.visibility</p:attrName>
+                                        </p:attrNameLst>
+                                      </p:cBhvr>
+                                      <p:to>
+                                        <p:strVal val="visible"/>
+                                      </p:to>
+                                    </p:set>
+                                    <p:animEffect transition="in" filter="fade">
+                                      <p:cBhvr>
+                                        <p:cTn id="7" dur="500"/>
+                                        <p:tgtEl>
+                                          <p:spTgt spid="3">
+                                            <p:txEl>
+                                              <p:pRg st="0" end="0"/>
+                                            </p:txEl>
+                                          </p:spTgt>
+                                        </p:tgtEl>
+                                      </p:cBhvr>
+                                    </p:animEffect>
+                                  </p:childTnLst>
+                                </p:cTn>
+                              </p:par>
+                            </p:childTnLst>
+                          </p:cTn>
+                        </p:par>
+                      </p:childTnLst>
+                    </p:cTn>
+                  </p:par>
+                </p:childTnLst>
+              </p:cTn>
+              <p:prevCondLst>
+                <p:cond evt="onPrev" delay="0">
+                  <p:tgtEl>
+                    <p:sldTgt/>
+                  </p:tgtEl>
+                </p:cond>
+              </p:prevCondLst>
+              <p:nextCondLst>
+                <p:cond evt="onNext" delay="0">
+                  <p:tgtEl>
+                    <p:sldTgt/>
+                  </p:tgtEl>
+                </p:cond>
+              </p:nextCondLst>
+            </p:seq>
+          </p:childTnLst>
+        </p:cTn>
+      </p:par>
+    </p:tnLst>
+    <p:bldLst>
+      <p:bldP spid="3" grpId="0" build="p"/>
+    </p:bldLst>
+  </p:timing>
+</p:sld>
+</file>
+
+<file path=ppt/slides/slide9.xml><?xml version="1.0" encoding="utf-8"?>
+<p:sld xmlns:a="http://schemas.openxmlformats.org/drawingml/2006/main" xmlns:r="http://schemas.openxmlformats.org/officeDocument/2006/relationships" xmlns:p="http://schemas.openxmlformats.org/presentationml/2006/main">
+  <p:cSld>
+    <p:spTree>
+      <p:nvGrpSpPr>
+        <p:cNvPr id="1" name=""/>
+        <p:cNvGrpSpPr/>
+        <p:nvPr/>
+      </p:nvGrpSpPr>
+      <p:grpSpPr>
+        <a:xfrm>
+          <a:off x="0" y="0"/>
+          <a:ext cx="0" cy="0"/>
+          <a:chOff x="0" y="0"/>
+          <a:chExt cx="0" cy="0"/>
+        </a:xfrm>
+      </p:grpSpPr>
+      <p:sp>
+        <p:nvSpPr>
+          <p:cNvPr id="2" name="Title 1"/>
+          <p:cNvSpPr>
+            <a:spLocks noGrp="1"/>
+          </p:cNvSpPr>
+          <p:nvPr>
+            <p:ph type="title"/>
+          </p:nvPr>
+        </p:nvSpPr>
+        <p:spPr/>
+        <p:txBody>
+          <a:bodyPr/>
+          <a:lstStyle/>
+          <a:p>
+            <a:r>
+              <a:rPr lang="en-US" dirty="0"/>
+              <a:t>7. Which HTML element connects a CSS stylesheet to an html page?</a:t>
+            </a:r>
+          </a:p>
+        </p:txBody>
+      </p:sp>
+      <p:sp>
+        <p:nvSpPr>
+          <p:cNvPr id="3" name="Content Placeholder 2"/>
+          <p:cNvSpPr>
+            <a:spLocks noGrp="1"/>
+          </p:cNvSpPr>
+          <p:nvPr>
+            <p:ph idx="1"/>
+          </p:nvPr>
+        </p:nvSpPr>
+        <p:spPr/>
+        <p:txBody>
+          <a:bodyPr anchor="ctr">
+            <a:normAutofit/>
+          </a:bodyPr>
+          <a:lstStyle/>
+          <a:p>
+            <a:pPr marL="57150" indent="0" algn="ctr">
+              <a:buNone/>
+            </a:pPr>
+            <a:r>
+              <a:rPr lang="pl-PL" sz="8800" dirty="0">
+                <a:solidFill>
+                  <a:srgbClr val="800000"/>
+                </a:solidFill>
+                <a:latin typeface="Consolas" panose="020B0609020204030204" pitchFamily="49" charset="0"/>
+              </a:rPr>
+              <a:t>&lt;</a:t>
+            </a:r>
+            <a:r>
+              <a:rPr lang="en-US" sz="8800" dirty="0">
+                <a:solidFill>
+                  <a:srgbClr val="800000"/>
+                </a:solidFill>
+                <a:latin typeface="Consolas" panose="020B0609020204030204" pitchFamily="49" charset="0"/>
+              </a:rPr>
+              <a:t>link /&gt;</a:t>
+            </a:r>
+            <a:endParaRPr lang="en-US" sz="8800" dirty="0">
+              <a:solidFill>
+                <a:schemeClr val="accent1">
+                  <a:lumMod val="50000"/>
+                </a:schemeClr>
+              </a:solidFill>
+              <a:latin typeface="Consolas" panose="020B0609020204030204" pitchFamily="49" charset="0"/>
+            </a:endParaRPr>
+          </a:p>
+        </p:txBody>
+      </p:sp>
+    </p:spTree>
+    <p:extLst>
+      <p:ext uri="{BB962C8B-B14F-4D97-AF65-F5344CB8AC3E}">
+        <p14:creationId xmlns:p14="http://schemas.microsoft.com/office/powerpoint/2010/main" val="2013883105"/>
       </p:ext>
     </p:extLst>
   </p:cSld>

</xml_diff>

<commit_message>
Update gitbook 2023-02-03 15:36:31
</commit_message>
<xml_diff>
--- a/Week06/HtmlCssReviewActivity.pptx
+++ b/Week06/HtmlCssReviewActivity.pptx
@@ -5,25 +5,24 @@
     <p:sldMasterId id="2147483648" r:id="rId1"/>
   </p:sldMasterIdLst>
   <p:notesMasterIdLst>
-    <p:notesMasterId r:id="rId18"/>
+    <p:notesMasterId r:id="rId17"/>
   </p:notesMasterIdLst>
   <p:sldIdLst>
     <p:sldId id="273" r:id="rId2"/>
-    <p:sldId id="272" r:id="rId3"/>
-    <p:sldId id="258" r:id="rId4"/>
-    <p:sldId id="259" r:id="rId5"/>
-    <p:sldId id="260" r:id="rId6"/>
-    <p:sldId id="261" r:id="rId7"/>
-    <p:sldId id="262" r:id="rId8"/>
-    <p:sldId id="263" r:id="rId9"/>
-    <p:sldId id="264" r:id="rId10"/>
-    <p:sldId id="265" r:id="rId11"/>
-    <p:sldId id="266" r:id="rId12"/>
-    <p:sldId id="267" r:id="rId13"/>
-    <p:sldId id="268" r:id="rId14"/>
-    <p:sldId id="269" r:id="rId15"/>
-    <p:sldId id="271" r:id="rId16"/>
-    <p:sldId id="270" r:id="rId17"/>
+    <p:sldId id="258" r:id="rId3"/>
+    <p:sldId id="259" r:id="rId4"/>
+    <p:sldId id="260" r:id="rId5"/>
+    <p:sldId id="261" r:id="rId6"/>
+    <p:sldId id="262" r:id="rId7"/>
+    <p:sldId id="263" r:id="rId8"/>
+    <p:sldId id="264" r:id="rId9"/>
+    <p:sldId id="265" r:id="rId10"/>
+    <p:sldId id="266" r:id="rId11"/>
+    <p:sldId id="267" r:id="rId12"/>
+    <p:sldId id="268" r:id="rId13"/>
+    <p:sldId id="269" r:id="rId14"/>
+    <p:sldId id="271" r:id="rId15"/>
+    <p:sldId id="270" r:id="rId16"/>
   </p:sldIdLst>
   <p:sldSz cx="12192000" cy="6858000"/>
   <p:notesSz cx="6858000" cy="9144000"/>
@@ -223,7 +222,7 @@
           <a:p>
             <a:fld id="{19104133-B5B0-4351-8158-4F0E5EB1E2BF}" type="datetimeFigureOut">
               <a:rPr lang="en-US" smtClean="0"/>
-              <a:t>10/24/2022</a:t>
+              <a:t>2/3/2023</a:t>
             </a:fld>
             <a:endParaRPr lang="en-US"/>
           </a:p>
@@ -563,7 +562,7 @@
           <a:p>
             <a:fld id="{DEC8F7F9-57EC-49CF-9FCD-2B781E4B449F}" type="slidenum">
               <a:rPr lang="en-US" smtClean="0"/>
-              <a:t>3</a:t>
+              <a:t>2</a:t>
             </a:fld>
             <a:endParaRPr lang="en-US"/>
           </a:p>
@@ -764,7 +763,7 @@
             <a:fld id="{1C2D31DE-C454-491C-B5C3-F097855E3DF7}" type="datetime4">
               <a:rPr lang="en-US" smtClean="0"/>
               <a:pPr/>
-              <a:t>October 24, 2022</a:t>
+              <a:t>February 3, 2023</a:t>
             </a:fld>
             <a:endParaRPr lang="en-US" dirty="0"/>
           </a:p>
@@ -4156,7 +4155,7 @@
           <a:p>
             <a:fld id="{5958763E-B898-436D-883D-03711491D54A}" type="datetimeFigureOut">
               <a:rPr lang="en-US" smtClean="0"/>
-              <a:t>10/24/2022</a:t>
+              <a:t>2/3/2023</a:t>
             </a:fld>
             <a:endParaRPr lang="en-US"/>
           </a:p>
@@ -4349,7 +4348,7 @@
           <a:p>
             <a:fld id="{5958763E-B898-436D-883D-03711491D54A}" type="datetimeFigureOut">
               <a:rPr lang="en-US" smtClean="0"/>
-              <a:t>10/24/2022</a:t>
+              <a:t>2/3/2023</a:t>
             </a:fld>
             <a:endParaRPr lang="en-US"/>
           </a:p>
@@ -4599,7 +4598,7 @@
           <a:p>
             <a:fld id="{5958763E-B898-436D-883D-03711491D54A}" type="datetimeFigureOut">
               <a:rPr lang="en-US" smtClean="0"/>
-              <a:t>10/24/2022</a:t>
+              <a:t>2/3/2023</a:t>
             </a:fld>
             <a:endParaRPr lang="en-US"/>
           </a:p>
@@ -4947,7 +4946,7 @@
           <a:p>
             <a:fld id="{5958763E-B898-436D-883D-03711491D54A}" type="datetimeFigureOut">
               <a:rPr lang="en-US" smtClean="0"/>
-              <a:t>10/24/2022</a:t>
+              <a:t>2/3/2023</a:t>
             </a:fld>
             <a:endParaRPr lang="en-US"/>
           </a:p>
@@ -5363,7 +5362,7 @@
           <a:p>
             <a:fld id="{5958763E-B898-436D-883D-03711491D54A}" type="datetimeFigureOut">
               <a:rPr lang="en-US" smtClean="0"/>
-              <a:t>10/24/2022</a:t>
+              <a:t>2/3/2023</a:t>
             </a:fld>
             <a:endParaRPr lang="en-US"/>
           </a:p>
@@ -5864,7 +5863,7 @@
           <a:p>
             <a:fld id="{5958763E-B898-436D-883D-03711491D54A}" type="datetimeFigureOut">
               <a:rPr lang="en-US" smtClean="0"/>
-              <a:t>10/24/2022</a:t>
+              <a:t>2/3/2023</a:t>
             </a:fld>
             <a:endParaRPr lang="en-US"/>
           </a:p>
@@ -6315,7 +6314,7 @@
           <a:p>
             <a:fld id="{5958763E-B898-436D-883D-03711491D54A}" type="datetimeFigureOut">
               <a:rPr lang="en-US" smtClean="0"/>
-              <a:t>10/24/2022</a:t>
+              <a:t>2/3/2023</a:t>
             </a:fld>
             <a:endParaRPr lang="en-US"/>
           </a:p>
@@ -6926,7 +6925,7 @@
           <a:p>
             <a:fld id="{5958763E-B898-436D-883D-03711491D54A}" type="datetimeFigureOut">
               <a:rPr lang="en-US" smtClean="0"/>
-              <a:t>10/24/2022</a:t>
+              <a:t>2/3/2023</a:t>
             </a:fld>
             <a:endParaRPr lang="en-US"/>
           </a:p>
@@ -7697,7 +7696,7 @@
           <a:p>
             <a:fld id="{5958763E-B898-436D-883D-03711491D54A}" type="datetimeFigureOut">
               <a:rPr lang="en-US" smtClean="0"/>
-              <a:t>10/24/2022</a:t>
+              <a:t>2/3/2023</a:t>
             </a:fld>
             <a:endParaRPr lang="en-US"/>
           </a:p>
@@ -7801,7 +7800,7 @@
           <a:p>
             <a:fld id="{5958763E-B898-436D-883D-03711491D54A}" type="datetimeFigureOut">
               <a:rPr lang="en-US" smtClean="0"/>
-              <a:t>10/24/2022</a:t>
+              <a:t>2/3/2023</a:t>
             </a:fld>
             <a:endParaRPr lang="en-US"/>
           </a:p>
@@ -8128,7 +8127,7 @@
             <a:fld id="{1C2D31DE-C454-491C-B5C3-F097855E3DF7}" type="datetime4">
               <a:rPr lang="en-US" smtClean="0"/>
               <a:pPr/>
-              <a:t>October 24, 2022</a:t>
+              <a:t>February 3, 2023</a:t>
             </a:fld>
             <a:endParaRPr lang="en-US" dirty="0"/>
           </a:p>
@@ -11280,7 +11279,7 @@
           <a:p>
             <a:fld id="{5958763E-B898-436D-883D-03711491D54A}" type="datetimeFigureOut">
               <a:rPr lang="en-US" smtClean="0"/>
-              <a:t>10/24/2022</a:t>
+              <a:t>2/3/2023</a:t>
             </a:fld>
             <a:endParaRPr lang="en-US"/>
           </a:p>
@@ -11404,7 +11403,7 @@
           <a:p>
             <a:fld id="{5958763E-B898-436D-883D-03711491D54A}" type="datetimeFigureOut">
               <a:rPr lang="en-US" smtClean="0"/>
-              <a:t>10/24/2022</a:t>
+              <a:t>2/3/2023</a:t>
             </a:fld>
             <a:endParaRPr lang="en-US"/>
           </a:p>
@@ -11528,7 +11527,7 @@
           <a:p>
             <a:fld id="{5958763E-B898-436D-883D-03711491D54A}" type="datetimeFigureOut">
               <a:rPr lang="en-US" smtClean="0"/>
-              <a:t>10/24/2022</a:t>
+              <a:t>2/3/2023</a:t>
             </a:fld>
             <a:endParaRPr lang="en-US"/>
           </a:p>
@@ -11652,7 +11651,7 @@
           <a:p>
             <a:fld id="{5958763E-B898-436D-883D-03711491D54A}" type="datetimeFigureOut">
               <a:rPr lang="en-US" smtClean="0"/>
-              <a:t>10/24/2022</a:t>
+              <a:t>2/3/2023</a:t>
             </a:fld>
             <a:endParaRPr lang="en-US"/>
           </a:p>
@@ -11776,7 +11775,7 @@
           <a:p>
             <a:fld id="{5958763E-B898-436D-883D-03711491D54A}" type="datetimeFigureOut">
               <a:rPr lang="en-US" smtClean="0"/>
-              <a:t>10/24/2022</a:t>
+              <a:t>2/3/2023</a:t>
             </a:fld>
             <a:endParaRPr lang="en-US"/>
           </a:p>
@@ -11900,7 +11899,7 @@
           <a:p>
             <a:fld id="{5958763E-B898-436D-883D-03711491D54A}" type="datetimeFigureOut">
               <a:rPr lang="en-US" smtClean="0"/>
-              <a:t>10/24/2022</a:t>
+              <a:t>2/3/2023</a:t>
             </a:fld>
             <a:endParaRPr lang="en-US"/>
           </a:p>
@@ -12024,7 +12023,7 @@
           <a:p>
             <a:fld id="{5958763E-B898-436D-883D-03711491D54A}" type="datetimeFigureOut">
               <a:rPr lang="en-US" smtClean="0"/>
-              <a:t>10/24/2022</a:t>
+              <a:t>2/3/2023</a:t>
             </a:fld>
             <a:endParaRPr lang="en-US"/>
           </a:p>
@@ -12148,7 +12147,7 @@
           <a:p>
             <a:fld id="{5958763E-B898-436D-883D-03711491D54A}" type="datetimeFigureOut">
               <a:rPr lang="en-US" smtClean="0"/>
-              <a:t>10/24/2022</a:t>
+              <a:t>2/3/2023</a:t>
             </a:fld>
             <a:endParaRPr lang="en-US"/>
           </a:p>
@@ -12281,7 +12280,7 @@
           <a:p>
             <a:fld id="{5958763E-B898-436D-883D-03711491D54A}" type="datetimeFigureOut">
               <a:rPr lang="en-US" smtClean="0"/>
-              <a:t>10/24/2022</a:t>
+              <a:t>2/3/2023</a:t>
             </a:fld>
             <a:endParaRPr lang="en-US"/>
           </a:p>
@@ -15620,7 +15619,7 @@
             <a:fld id="{1C2D31DE-C454-491C-B5C3-F097855E3DF7}" type="datetime4">
               <a:rPr lang="en-US" smtClean="0"/>
               <a:pPr/>
-              <a:t>October 24, 2022</a:t>
+              <a:t>February 3, 2023</a:t>
             </a:fld>
             <a:endParaRPr lang="en-US" dirty="0"/>
           </a:p>
@@ -27856,7 +27855,7 @@
           <a:p>
             <a:fld id="{5958763E-B898-436D-883D-03711491D54A}" type="datetimeFigureOut">
               <a:rPr lang="en-US" smtClean="0"/>
-              <a:t>10/24/2022</a:t>
+              <a:t>2/3/2023</a:t>
             </a:fld>
             <a:endParaRPr lang="en-US"/>
           </a:p>
@@ -28258,7 +28257,7 @@
           <a:p>
             <a:fld id="{5958763E-B898-436D-883D-03711491D54A}" type="datetimeFigureOut">
               <a:rPr lang="en-US" smtClean="0"/>
-              <a:t>10/24/2022</a:t>
+              <a:t>2/3/2023</a:t>
             </a:fld>
             <a:endParaRPr lang="en-US"/>
           </a:p>
@@ -28552,7 +28551,7 @@
           <a:p>
             <a:fld id="{5958763E-B898-436D-883D-03711491D54A}" type="datetimeFigureOut">
               <a:rPr lang="en-US" smtClean="0"/>
-              <a:t>10/24/2022</a:t>
+              <a:t>2/3/2023</a:t>
             </a:fld>
             <a:endParaRPr lang="en-US"/>
           </a:p>
@@ -28753,7 +28752,7 @@
           <a:p>
             <a:fld id="{5958763E-B898-436D-883D-03711491D54A}" type="datetimeFigureOut">
               <a:rPr lang="en-US" smtClean="0"/>
-              <a:t>10/24/2022</a:t>
+              <a:t>2/3/2023</a:t>
             </a:fld>
             <a:endParaRPr lang="en-US"/>
           </a:p>
@@ -29014,7 +29013,7 @@
           <a:p>
             <a:fld id="{5958763E-B898-436D-883D-03711491D54A}" type="datetimeFigureOut">
               <a:rPr lang="en-US" smtClean="0"/>
-              <a:t>10/24/2022</a:t>
+              <a:t>2/3/2023</a:t>
             </a:fld>
             <a:endParaRPr lang="en-US"/>
           </a:p>
@@ -29522,7 +29521,7 @@
           <a:p>
             <a:fld id="{5958763E-B898-436D-883D-03711491D54A}" type="datetimeFigureOut">
               <a:rPr lang="en-US" smtClean="0"/>
-              <a:t>10/24/2022</a:t>
+              <a:t>2/3/2023</a:t>
             </a:fld>
             <a:endParaRPr lang="en-US"/>
           </a:p>
@@ -30001,7 +30000,7 @@
           <a:p>
             <a:fld id="{5958763E-B898-436D-883D-03711491D54A}" type="datetimeFigureOut">
               <a:rPr lang="en-US" smtClean="0"/>
-              <a:t>10/24/2022</a:t>
+              <a:t>2/3/2023</a:t>
             </a:fld>
             <a:endParaRPr lang="en-US"/>
           </a:p>
@@ -30820,7 +30819,7 @@
           <a:p>
             <a:fld id="{5958763E-B898-436D-883D-03711491D54A}" type="datetimeFigureOut">
               <a:rPr lang="en-US" smtClean="0"/>
-              <a:t>10/24/2022</a:t>
+              <a:t>2/3/2023</a:t>
             </a:fld>
             <a:endParaRPr lang="en-US"/>
           </a:p>
@@ -31021,7 +31020,7 @@
           <a:p>
             <a:fld id="{5958763E-B898-436D-883D-03711491D54A}" type="datetimeFigureOut">
               <a:rPr lang="en-US" smtClean="0"/>
-              <a:t>10/24/2022</a:t>
+              <a:t>2/3/2023</a:t>
             </a:fld>
             <a:endParaRPr lang="en-US"/>
           </a:p>
@@ -31356,7 +31355,7 @@
           <a:p>
             <a:fld id="{5958763E-B898-436D-883D-03711491D54A}" type="datetimeFigureOut">
               <a:rPr lang="en-US" smtClean="0"/>
-              <a:t>10/24/2022</a:t>
+              <a:t>2/3/2023</a:t>
             </a:fld>
             <a:endParaRPr lang="en-US"/>
           </a:p>
@@ -31586,7 +31585,7 @@
           <a:p>
             <a:fld id="{5958763E-B898-436D-883D-03711491D54A}" type="datetimeFigureOut">
               <a:rPr lang="en-US" smtClean="0"/>
-              <a:t>10/24/2022</a:t>
+              <a:t>2/3/2023</a:t>
             </a:fld>
             <a:endParaRPr lang="en-US"/>
           </a:p>
@@ -31830,7 +31829,7 @@
           <a:p>
             <a:fld id="{5958763E-B898-436D-883D-03711491D54A}" type="datetimeFigureOut">
               <a:rPr lang="en-US" smtClean="0"/>
-              <a:t>10/24/2022</a:t>
+              <a:t>2/3/2023</a:t>
             </a:fld>
             <a:endParaRPr lang="en-US"/>
           </a:p>
@@ -32353,7 +32352,7 @@
           <a:p>
             <a:r>
               <a:rPr lang="en-US" dirty="0"/>
-              <a:t>Review Activity Teams: Virtual</a:t>
+              <a:t>Review Activity Teams</a:t>
             </a:r>
           </a:p>
         </p:txBody>
@@ -32609,204 +32608,6 @@
           <a:p>
             <a:r>
               <a:rPr lang="en-US" dirty="0"/>
-              <a:t>7. Which HTML element connects a CSS stylesheet to an html page?</a:t>
-            </a:r>
-          </a:p>
-        </p:txBody>
-      </p:sp>
-      <p:sp>
-        <p:nvSpPr>
-          <p:cNvPr id="3" name="Content Placeholder 2"/>
-          <p:cNvSpPr>
-            <a:spLocks noGrp="1"/>
-          </p:cNvSpPr>
-          <p:nvPr>
-            <p:ph idx="1"/>
-          </p:nvPr>
-        </p:nvSpPr>
-        <p:spPr/>
-        <p:txBody>
-          <a:bodyPr anchor="ctr">
-            <a:normAutofit/>
-          </a:bodyPr>
-          <a:lstStyle/>
-          <a:p>
-            <a:pPr marL="57150" indent="0" algn="ctr">
-              <a:buNone/>
-            </a:pPr>
-            <a:r>
-              <a:rPr lang="pl-PL" sz="8800" dirty="0">
-                <a:solidFill>
-                  <a:srgbClr val="800000"/>
-                </a:solidFill>
-                <a:latin typeface="Consolas" panose="020B0609020204030204" pitchFamily="49" charset="0"/>
-              </a:rPr>
-              <a:t>&lt;</a:t>
-            </a:r>
-            <a:r>
-              <a:rPr lang="en-US" sz="8800" dirty="0">
-                <a:solidFill>
-                  <a:srgbClr val="800000"/>
-                </a:solidFill>
-                <a:latin typeface="Consolas" panose="020B0609020204030204" pitchFamily="49" charset="0"/>
-              </a:rPr>
-              <a:t>link /&gt;</a:t>
-            </a:r>
-            <a:endParaRPr lang="en-US" sz="8800" dirty="0">
-              <a:solidFill>
-                <a:schemeClr val="accent1">
-                  <a:lumMod val="50000"/>
-                </a:schemeClr>
-              </a:solidFill>
-              <a:latin typeface="Consolas" panose="020B0609020204030204" pitchFamily="49" charset="0"/>
-            </a:endParaRPr>
-          </a:p>
-        </p:txBody>
-      </p:sp>
-    </p:spTree>
-    <p:extLst>
-      <p:ext uri="{BB962C8B-B14F-4D97-AF65-F5344CB8AC3E}">
-        <p14:creationId xmlns:p14="http://schemas.microsoft.com/office/powerpoint/2010/main" val="2013883105"/>
-      </p:ext>
-    </p:extLst>
-  </p:cSld>
-  <p:clrMapOvr>
-    <a:masterClrMapping/>
-  </p:clrMapOvr>
-  <p:transition>
-    <p:fade/>
-  </p:transition>
-  <p:timing>
-    <p:tnLst>
-      <p:par>
-        <p:cTn id="1" dur="indefinite" restart="never" nodeType="tmRoot">
-          <p:childTnLst>
-            <p:seq concurrent="1" nextAc="seek">
-              <p:cTn id="2" dur="indefinite" nodeType="mainSeq">
-                <p:childTnLst>
-                  <p:par>
-                    <p:cTn id="3" fill="hold">
-                      <p:stCondLst>
-                        <p:cond delay="indefinite"/>
-                      </p:stCondLst>
-                      <p:childTnLst>
-                        <p:par>
-                          <p:cTn id="4" fill="hold">
-                            <p:stCondLst>
-                              <p:cond delay="0"/>
-                            </p:stCondLst>
-                            <p:childTnLst>
-                              <p:par>
-                                <p:cTn id="5" presetID="10" presetClass="entr" presetSubtype="0" fill="hold" grpId="0" nodeType="clickEffect">
-                                  <p:stCondLst>
-                                    <p:cond delay="0"/>
-                                  </p:stCondLst>
-                                  <p:childTnLst>
-                                    <p:set>
-                                      <p:cBhvr>
-                                        <p:cTn id="6" dur="1" fill="hold">
-                                          <p:stCondLst>
-                                            <p:cond delay="0"/>
-                                          </p:stCondLst>
-                                        </p:cTn>
-                                        <p:tgtEl>
-                                          <p:spTgt spid="3">
-                                            <p:txEl>
-                                              <p:pRg st="0" end="0"/>
-                                            </p:txEl>
-                                          </p:spTgt>
-                                        </p:tgtEl>
-                                        <p:attrNameLst>
-                                          <p:attrName>style.visibility</p:attrName>
-                                        </p:attrNameLst>
-                                      </p:cBhvr>
-                                      <p:to>
-                                        <p:strVal val="visible"/>
-                                      </p:to>
-                                    </p:set>
-                                    <p:animEffect transition="in" filter="fade">
-                                      <p:cBhvr>
-                                        <p:cTn id="7" dur="500"/>
-                                        <p:tgtEl>
-                                          <p:spTgt spid="3">
-                                            <p:txEl>
-                                              <p:pRg st="0" end="0"/>
-                                            </p:txEl>
-                                          </p:spTgt>
-                                        </p:tgtEl>
-                                      </p:cBhvr>
-                                    </p:animEffect>
-                                  </p:childTnLst>
-                                </p:cTn>
-                              </p:par>
-                            </p:childTnLst>
-                          </p:cTn>
-                        </p:par>
-                      </p:childTnLst>
-                    </p:cTn>
-                  </p:par>
-                </p:childTnLst>
-              </p:cTn>
-              <p:prevCondLst>
-                <p:cond evt="onPrev" delay="0">
-                  <p:tgtEl>
-                    <p:sldTgt/>
-                  </p:tgtEl>
-                </p:cond>
-              </p:prevCondLst>
-              <p:nextCondLst>
-                <p:cond evt="onNext" delay="0">
-                  <p:tgtEl>
-                    <p:sldTgt/>
-                  </p:tgtEl>
-                </p:cond>
-              </p:nextCondLst>
-            </p:seq>
-          </p:childTnLst>
-        </p:cTn>
-      </p:par>
-    </p:tnLst>
-    <p:bldLst>
-      <p:bldP spid="3" grpId="0" build="p"/>
-    </p:bldLst>
-  </p:timing>
-</p:sld>
-</file>
-
-<file path=ppt/slides/slide11.xml><?xml version="1.0" encoding="utf-8"?>
-<p:sld xmlns:a="http://schemas.openxmlformats.org/drawingml/2006/main" xmlns:r="http://schemas.openxmlformats.org/officeDocument/2006/relationships" xmlns:p="http://schemas.openxmlformats.org/presentationml/2006/main">
-  <p:cSld>
-    <p:spTree>
-      <p:nvGrpSpPr>
-        <p:cNvPr id="1" name=""/>
-        <p:cNvGrpSpPr/>
-        <p:nvPr/>
-      </p:nvGrpSpPr>
-      <p:grpSpPr>
-        <a:xfrm>
-          <a:off x="0" y="0"/>
-          <a:ext cx="0" cy="0"/>
-          <a:chOff x="0" y="0"/>
-          <a:chExt cx="0" cy="0"/>
-        </a:xfrm>
-      </p:grpSpPr>
-      <p:sp>
-        <p:nvSpPr>
-          <p:cNvPr id="2" name="Title 1"/>
-          <p:cNvSpPr>
-            <a:spLocks noGrp="1"/>
-          </p:cNvSpPr>
-          <p:nvPr>
-            <p:ph type="title"/>
-          </p:nvPr>
-        </p:nvSpPr>
-        <p:spPr/>
-        <p:txBody>
-          <a:bodyPr/>
-          <a:lstStyle/>
-          <a:p>
-            <a:r>
-              <a:rPr lang="en-US" dirty="0"/>
               <a:t>8. Which CSS property can make text larger?</a:t>
             </a:r>
           </a:p>
@@ -32961,7 +32762,7 @@
 </p:sld>
 </file>
 
-<file path=ppt/slides/slide12.xml><?xml version="1.0" encoding="utf-8"?>
+<file path=ppt/slides/slide11.xml><?xml version="1.0" encoding="utf-8"?>
 <p:sld xmlns:a="http://schemas.openxmlformats.org/drawingml/2006/main" xmlns:r="http://schemas.openxmlformats.org/officeDocument/2006/relationships" xmlns:p="http://schemas.openxmlformats.org/presentationml/2006/main">
   <p:cSld>
     <p:spTree>
@@ -33359,7 +33160,7 @@
 </p:sld>
 </file>
 
-<file path=ppt/slides/slide13.xml><?xml version="1.0" encoding="utf-8"?>
+<file path=ppt/slides/slide12.xml><?xml version="1.0" encoding="utf-8"?>
 <p:sld xmlns:a="http://schemas.openxmlformats.org/drawingml/2006/main" xmlns:r="http://schemas.openxmlformats.org/officeDocument/2006/relationships" xmlns:p="http://schemas.openxmlformats.org/presentationml/2006/main">
   <p:cSld>
     <p:spTree>
@@ -33699,7 +33500,7 @@
 </p:sld>
 </file>
 
-<file path=ppt/slides/slide14.xml><?xml version="1.0" encoding="utf-8"?>
+<file path=ppt/slides/slide13.xml><?xml version="1.0" encoding="utf-8"?>
 <p:sld xmlns:a="http://schemas.openxmlformats.org/drawingml/2006/main" xmlns:r="http://schemas.openxmlformats.org/officeDocument/2006/relationships" xmlns:p="http://schemas.openxmlformats.org/presentationml/2006/main">
   <p:cSld>
     <p:spTree>
@@ -34006,7 +33807,7 @@
 </p:sld>
 </file>
 
-<file path=ppt/slides/slide15.xml><?xml version="1.0" encoding="utf-8"?>
+<file path=ppt/slides/slide14.xml><?xml version="1.0" encoding="utf-8"?>
 <p:sld xmlns:a="http://schemas.openxmlformats.org/drawingml/2006/main" xmlns:r="http://schemas.openxmlformats.org/officeDocument/2006/relationships" xmlns:p="http://schemas.openxmlformats.org/presentationml/2006/main">
   <p:cSld>
     <p:spTree>
@@ -34184,7 +33985,7 @@
 </p:sld>
 </file>
 
-<file path=ppt/slides/slide16.xml><?xml version="1.0" encoding="utf-8"?>
+<file path=ppt/slides/slide15.xml><?xml version="1.0" encoding="utf-8"?>
 <p:sld xmlns:a="http://schemas.openxmlformats.org/drawingml/2006/main" xmlns:r="http://schemas.openxmlformats.org/officeDocument/2006/relationships" xmlns:p="http://schemas.openxmlformats.org/presentationml/2006/main">
   <p:cSld>
     <p:spTree>
@@ -34396,262 +34197,6 @@
 </file>
 
 <file path=ppt/slides/slide2.xml><?xml version="1.0" encoding="utf-8"?>
-<p:sld xmlns:a="http://schemas.openxmlformats.org/drawingml/2006/main" xmlns:r="http://schemas.openxmlformats.org/officeDocument/2006/relationships" xmlns:p="http://schemas.openxmlformats.org/presentationml/2006/main">
-  <p:cSld>
-    <p:spTree>
-      <p:nvGrpSpPr>
-        <p:cNvPr id="1" name=""/>
-        <p:cNvGrpSpPr/>
-        <p:nvPr/>
-      </p:nvGrpSpPr>
-      <p:grpSpPr>
-        <a:xfrm>
-          <a:off x="0" y="0"/>
-          <a:ext cx="0" cy="0"/>
-          <a:chOff x="0" y="0"/>
-          <a:chExt cx="0" cy="0"/>
-        </a:xfrm>
-      </p:grpSpPr>
-      <p:sp>
-        <p:nvSpPr>
-          <p:cNvPr id="2" name="Title 1"/>
-          <p:cNvSpPr>
-            <a:spLocks noGrp="1"/>
-          </p:cNvSpPr>
-          <p:nvPr>
-            <p:ph type="title"/>
-          </p:nvPr>
-        </p:nvSpPr>
-        <p:spPr/>
-        <p:txBody>
-          <a:bodyPr/>
-          <a:lstStyle/>
-          <a:p>
-            <a:r>
-              <a:rPr lang="en-US" dirty="0"/>
-              <a:t>Review Activity Teams: In-Person</a:t>
-            </a:r>
-          </a:p>
-        </p:txBody>
-      </p:sp>
-      <p:sp>
-        <p:nvSpPr>
-          <p:cNvPr id="3" name="Content Placeholder 2"/>
-          <p:cNvSpPr>
-            <a:spLocks noGrp="1"/>
-          </p:cNvSpPr>
-          <p:nvPr>
-            <p:ph sz="half" idx="1"/>
-          </p:nvPr>
-        </p:nvSpPr>
-        <p:spPr>
-          <a:ln>
-            <a:solidFill>
-              <a:schemeClr val="tx2"/>
-            </a:solidFill>
-          </a:ln>
-        </p:spPr>
-        <p:txBody>
-          <a:bodyPr/>
-          <a:lstStyle/>
-          <a:p>
-            <a:pPr marL="57150" indent="0" algn="ctr">
-              <a:buNone/>
-            </a:pPr>
-            <a:r>
-              <a:rPr lang="en-US" b="1" u="sng" dirty="0"/>
-              <a:t>Team 4</a:t>
-            </a:r>
-          </a:p>
-          <a:p>
-            <a:r>
-              <a:rPr lang="en-US" sz="2800" dirty="0">
-                <a:hlinkClick r:id="rId2"/>
-              </a:rPr>
-              <a:t>https://replit.com/join/nnzfyknlpr-hylandoutreach</a:t>
-            </a:r>
-            <a:endParaRPr lang="en-US" dirty="0"/>
-          </a:p>
-          <a:p>
-            <a:r>
-              <a:rPr lang="en-US" dirty="0"/>
-              <a:t>Student1</a:t>
-            </a:r>
-          </a:p>
-          <a:p>
-            <a:r>
-              <a:rPr lang="en-US" dirty="0"/>
-              <a:t>Student2</a:t>
-            </a:r>
-          </a:p>
-          <a:p>
-            <a:r>
-              <a:rPr lang="en-US" dirty="0"/>
-              <a:t>Student3</a:t>
-            </a:r>
-          </a:p>
-          <a:p>
-            <a:r>
-              <a:rPr lang="en-US" dirty="0"/>
-              <a:t>Student4</a:t>
-            </a:r>
-          </a:p>
-          <a:p>
-            <a:endParaRPr lang="en-US" dirty="0"/>
-          </a:p>
-        </p:txBody>
-      </p:sp>
-      <p:sp>
-        <p:nvSpPr>
-          <p:cNvPr id="4" name="Content Placeholder 3"/>
-          <p:cNvSpPr>
-            <a:spLocks noGrp="1"/>
-          </p:cNvSpPr>
-          <p:nvPr>
-            <p:ph sz="half" idx="2"/>
-          </p:nvPr>
-        </p:nvSpPr>
-        <p:spPr>
-          <a:ln>
-            <a:solidFill>
-              <a:schemeClr val="tx2"/>
-            </a:solidFill>
-          </a:ln>
-        </p:spPr>
-        <p:txBody>
-          <a:bodyPr/>
-          <a:lstStyle/>
-          <a:p>
-            <a:pPr marL="57150" indent="0" algn="ctr">
-              <a:buNone/>
-            </a:pPr>
-            <a:r>
-              <a:rPr lang="en-US" b="1" u="sng" dirty="0"/>
-              <a:t>Team 5</a:t>
-            </a:r>
-          </a:p>
-          <a:p>
-            <a:r>
-              <a:rPr lang="en-US" sz="2800" dirty="0">
-                <a:hlinkClick r:id="rId3"/>
-              </a:rPr>
-              <a:t>https://replit.com/join/khkvjwamfu-hylandoutreach</a:t>
-            </a:r>
-            <a:endParaRPr lang="en-US" sz="2800" dirty="0"/>
-          </a:p>
-          <a:p>
-            <a:r>
-              <a:rPr lang="en-US" dirty="0"/>
-              <a:t>Student1</a:t>
-            </a:r>
-          </a:p>
-          <a:p>
-            <a:r>
-              <a:rPr lang="en-US" dirty="0"/>
-              <a:t>Student2</a:t>
-            </a:r>
-          </a:p>
-          <a:p>
-            <a:r>
-              <a:rPr lang="en-US" dirty="0"/>
-              <a:t>Student3</a:t>
-            </a:r>
-          </a:p>
-          <a:p>
-            <a:r>
-              <a:rPr lang="en-US" dirty="0"/>
-              <a:t>Student4</a:t>
-            </a:r>
-          </a:p>
-          <a:p>
-            <a:endParaRPr lang="en-US" dirty="0"/>
-          </a:p>
-          <a:p>
-            <a:endParaRPr lang="en-US" dirty="0"/>
-          </a:p>
-        </p:txBody>
-      </p:sp>
-      <p:sp>
-        <p:nvSpPr>
-          <p:cNvPr id="5" name="Content Placeholder 4"/>
-          <p:cNvSpPr>
-            <a:spLocks noGrp="1"/>
-          </p:cNvSpPr>
-          <p:nvPr>
-            <p:ph sz="half" idx="10"/>
-          </p:nvPr>
-        </p:nvSpPr>
-        <p:spPr>
-          <a:ln>
-            <a:solidFill>
-              <a:schemeClr val="tx1"/>
-            </a:solidFill>
-          </a:ln>
-        </p:spPr>
-        <p:txBody>
-          <a:bodyPr/>
-          <a:lstStyle/>
-          <a:p>
-            <a:pPr marL="57150" indent="0" algn="ctr">
-              <a:buNone/>
-            </a:pPr>
-            <a:r>
-              <a:rPr lang="en-US" b="1" u="sng" dirty="0"/>
-              <a:t>Team 6</a:t>
-            </a:r>
-          </a:p>
-          <a:p>
-            <a:r>
-              <a:rPr lang="en-US" sz="2800" dirty="0">
-                <a:hlinkClick r:id="rId4"/>
-              </a:rPr>
-              <a:t>https://replit.com/join/qaejbnplzy-hylandoutreach</a:t>
-            </a:r>
-            <a:endParaRPr lang="en-US" sz="2800" dirty="0"/>
-          </a:p>
-          <a:p>
-            <a:r>
-              <a:rPr lang="en-US" dirty="0"/>
-              <a:t>Student1</a:t>
-            </a:r>
-          </a:p>
-          <a:p>
-            <a:r>
-              <a:rPr lang="en-US" dirty="0"/>
-              <a:t>Student2</a:t>
-            </a:r>
-          </a:p>
-          <a:p>
-            <a:r>
-              <a:rPr lang="en-US" dirty="0"/>
-              <a:t>Student3</a:t>
-            </a:r>
-          </a:p>
-          <a:p>
-            <a:r>
-              <a:rPr lang="en-US" dirty="0"/>
-              <a:t>Student4</a:t>
-            </a:r>
-          </a:p>
-        </p:txBody>
-      </p:sp>
-    </p:spTree>
-    <p:extLst>
-      <p:ext uri="{BB962C8B-B14F-4D97-AF65-F5344CB8AC3E}">
-        <p14:creationId xmlns:p14="http://schemas.microsoft.com/office/powerpoint/2010/main" val="126340359"/>
-      </p:ext>
-    </p:extLst>
-  </p:cSld>
-  <p:clrMapOvr>
-    <a:masterClrMapping/>
-  </p:clrMapOvr>
-  <p:transition>
-    <p:fade/>
-  </p:transition>
-</p:sld>
-</file>
-
-<file path=ppt/slides/slide3.xml><?xml version="1.0" encoding="utf-8"?>
 <p:sld xmlns:a="http://schemas.openxmlformats.org/drawingml/2006/main" xmlns:r="http://schemas.openxmlformats.org/officeDocument/2006/relationships" xmlns:p="http://schemas.openxmlformats.org/presentationml/2006/main">
   <p:cSld>
     <p:spTree>
@@ -37708,7 +37253,7 @@
 </p:sld>
 </file>
 
-<file path=ppt/slides/slide4.xml><?xml version="1.0" encoding="utf-8"?>
+<file path=ppt/slides/slide3.xml><?xml version="1.0" encoding="utf-8"?>
 <p:sld xmlns:a="http://schemas.openxmlformats.org/drawingml/2006/main" xmlns:r="http://schemas.openxmlformats.org/officeDocument/2006/relationships" xmlns:p="http://schemas.openxmlformats.org/presentationml/2006/main">
   <p:cSld>
     <p:spTree>
@@ -37906,7 +37451,7 @@
 </p:sld>
 </file>
 
-<file path=ppt/slides/slide5.xml><?xml version="1.0" encoding="utf-8"?>
+<file path=ppt/slides/slide4.xml><?xml version="1.0" encoding="utf-8"?>
 <p:sld xmlns:a="http://schemas.openxmlformats.org/drawingml/2006/main" xmlns:r="http://schemas.openxmlformats.org/officeDocument/2006/relationships" xmlns:p="http://schemas.openxmlformats.org/presentationml/2006/main">
   <p:cSld>
     <p:spTree>
@@ -38104,7 +37649,7 @@
 </p:sld>
 </file>
 
-<file path=ppt/slides/slide6.xml><?xml version="1.0" encoding="utf-8"?>
+<file path=ppt/slides/slide5.xml><?xml version="1.0" encoding="utf-8"?>
 <p:sld xmlns:a="http://schemas.openxmlformats.org/drawingml/2006/main" xmlns:r="http://schemas.openxmlformats.org/officeDocument/2006/relationships" xmlns:p="http://schemas.openxmlformats.org/presentationml/2006/main">
   <p:cSld>
     <p:spTree>
@@ -38355,7 +37900,7 @@
 </p:sld>
 </file>
 
-<file path=ppt/slides/slide7.xml><?xml version="1.0" encoding="utf-8"?>
+<file path=ppt/slides/slide6.xml><?xml version="1.0" encoding="utf-8"?>
 <p:sld xmlns:a="http://schemas.openxmlformats.org/drawingml/2006/main" xmlns:r="http://schemas.openxmlformats.org/officeDocument/2006/relationships" xmlns:p="http://schemas.openxmlformats.org/presentationml/2006/main">
   <p:cSld>
     <p:spTree>
@@ -38934,7 +38479,7 @@
 </p:sld>
 </file>
 
-<file path=ppt/slides/slide8.xml><?xml version="1.0" encoding="utf-8"?>
+<file path=ppt/slides/slide7.xml><?xml version="1.0" encoding="utf-8"?>
 <p:sld xmlns:a="http://schemas.openxmlformats.org/drawingml/2006/main" xmlns:r="http://schemas.openxmlformats.org/officeDocument/2006/relationships" xmlns:p="http://schemas.openxmlformats.org/presentationml/2006/main">
   <p:cSld>
     <p:spTree>
@@ -39455,7 +39000,7 @@
 </p:sld>
 </file>
 
-<file path=ppt/slides/slide9.xml><?xml version="1.0" encoding="utf-8"?>
+<file path=ppt/slides/slide8.xml><?xml version="1.0" encoding="utf-8"?>
 <p:sld xmlns:a="http://schemas.openxmlformats.org/drawingml/2006/main" xmlns:r="http://schemas.openxmlformats.org/officeDocument/2006/relationships" xmlns:p="http://schemas.openxmlformats.org/presentationml/2006/main">
   <p:cSld>
     <p:spTree>
@@ -39551,6 +39096,204 @@
     <p:extLst>
       <p:ext uri="{BB962C8B-B14F-4D97-AF65-F5344CB8AC3E}">
         <p14:creationId xmlns:p14="http://schemas.microsoft.com/office/powerpoint/2010/main" val="1480472296"/>
+      </p:ext>
+    </p:extLst>
+  </p:cSld>
+  <p:clrMapOvr>
+    <a:masterClrMapping/>
+  </p:clrMapOvr>
+  <p:transition>
+    <p:fade/>
+  </p:transition>
+  <p:timing>
+    <p:tnLst>
+      <p:par>
+        <p:cTn id="1" dur="indefinite" restart="never" nodeType="tmRoot">
+          <p:childTnLst>
+            <p:seq concurrent="1" nextAc="seek">
+              <p:cTn id="2" dur="indefinite" nodeType="mainSeq">
+                <p:childTnLst>
+                  <p:par>
+                    <p:cTn id="3" fill="hold">
+                      <p:stCondLst>
+                        <p:cond delay="indefinite"/>
+                      </p:stCondLst>
+                      <p:childTnLst>
+                        <p:par>
+                          <p:cTn id="4" fill="hold">
+                            <p:stCondLst>
+                              <p:cond delay="0"/>
+                            </p:stCondLst>
+                            <p:childTnLst>
+                              <p:par>
+                                <p:cTn id="5" presetID="10" presetClass="entr" presetSubtype="0" fill="hold" grpId="0" nodeType="clickEffect">
+                                  <p:stCondLst>
+                                    <p:cond delay="0"/>
+                                  </p:stCondLst>
+                                  <p:childTnLst>
+                                    <p:set>
+                                      <p:cBhvr>
+                                        <p:cTn id="6" dur="1" fill="hold">
+                                          <p:stCondLst>
+                                            <p:cond delay="0"/>
+                                          </p:stCondLst>
+                                        </p:cTn>
+                                        <p:tgtEl>
+                                          <p:spTgt spid="3">
+                                            <p:txEl>
+                                              <p:pRg st="0" end="0"/>
+                                            </p:txEl>
+                                          </p:spTgt>
+                                        </p:tgtEl>
+                                        <p:attrNameLst>
+                                          <p:attrName>style.visibility</p:attrName>
+                                        </p:attrNameLst>
+                                      </p:cBhvr>
+                                      <p:to>
+                                        <p:strVal val="visible"/>
+                                      </p:to>
+                                    </p:set>
+                                    <p:animEffect transition="in" filter="fade">
+                                      <p:cBhvr>
+                                        <p:cTn id="7" dur="500"/>
+                                        <p:tgtEl>
+                                          <p:spTgt spid="3">
+                                            <p:txEl>
+                                              <p:pRg st="0" end="0"/>
+                                            </p:txEl>
+                                          </p:spTgt>
+                                        </p:tgtEl>
+                                      </p:cBhvr>
+                                    </p:animEffect>
+                                  </p:childTnLst>
+                                </p:cTn>
+                              </p:par>
+                            </p:childTnLst>
+                          </p:cTn>
+                        </p:par>
+                      </p:childTnLst>
+                    </p:cTn>
+                  </p:par>
+                </p:childTnLst>
+              </p:cTn>
+              <p:prevCondLst>
+                <p:cond evt="onPrev" delay="0">
+                  <p:tgtEl>
+                    <p:sldTgt/>
+                  </p:tgtEl>
+                </p:cond>
+              </p:prevCondLst>
+              <p:nextCondLst>
+                <p:cond evt="onNext" delay="0">
+                  <p:tgtEl>
+                    <p:sldTgt/>
+                  </p:tgtEl>
+                </p:cond>
+              </p:nextCondLst>
+            </p:seq>
+          </p:childTnLst>
+        </p:cTn>
+      </p:par>
+    </p:tnLst>
+    <p:bldLst>
+      <p:bldP spid="3" grpId="0" build="p"/>
+    </p:bldLst>
+  </p:timing>
+</p:sld>
+</file>
+
+<file path=ppt/slides/slide9.xml><?xml version="1.0" encoding="utf-8"?>
+<p:sld xmlns:a="http://schemas.openxmlformats.org/drawingml/2006/main" xmlns:r="http://schemas.openxmlformats.org/officeDocument/2006/relationships" xmlns:p="http://schemas.openxmlformats.org/presentationml/2006/main">
+  <p:cSld>
+    <p:spTree>
+      <p:nvGrpSpPr>
+        <p:cNvPr id="1" name=""/>
+        <p:cNvGrpSpPr/>
+        <p:nvPr/>
+      </p:nvGrpSpPr>
+      <p:grpSpPr>
+        <a:xfrm>
+          <a:off x="0" y="0"/>
+          <a:ext cx="0" cy="0"/>
+          <a:chOff x="0" y="0"/>
+          <a:chExt cx="0" cy="0"/>
+        </a:xfrm>
+      </p:grpSpPr>
+      <p:sp>
+        <p:nvSpPr>
+          <p:cNvPr id="2" name="Title 1"/>
+          <p:cNvSpPr>
+            <a:spLocks noGrp="1"/>
+          </p:cNvSpPr>
+          <p:nvPr>
+            <p:ph type="title"/>
+          </p:nvPr>
+        </p:nvSpPr>
+        <p:spPr/>
+        <p:txBody>
+          <a:bodyPr/>
+          <a:lstStyle/>
+          <a:p>
+            <a:r>
+              <a:rPr lang="en-US" dirty="0"/>
+              <a:t>7. Which HTML element connects a CSS stylesheet to an html page?</a:t>
+            </a:r>
+          </a:p>
+        </p:txBody>
+      </p:sp>
+      <p:sp>
+        <p:nvSpPr>
+          <p:cNvPr id="3" name="Content Placeholder 2"/>
+          <p:cNvSpPr>
+            <a:spLocks noGrp="1"/>
+          </p:cNvSpPr>
+          <p:nvPr>
+            <p:ph idx="1"/>
+          </p:nvPr>
+        </p:nvSpPr>
+        <p:spPr/>
+        <p:txBody>
+          <a:bodyPr anchor="ctr">
+            <a:normAutofit/>
+          </a:bodyPr>
+          <a:lstStyle/>
+          <a:p>
+            <a:pPr marL="57150" indent="0" algn="ctr">
+              <a:buNone/>
+            </a:pPr>
+            <a:r>
+              <a:rPr lang="pl-PL" sz="8800" dirty="0">
+                <a:solidFill>
+                  <a:srgbClr val="800000"/>
+                </a:solidFill>
+                <a:latin typeface="Consolas" panose="020B0609020204030204" pitchFamily="49" charset="0"/>
+              </a:rPr>
+              <a:t>&lt;</a:t>
+            </a:r>
+            <a:r>
+              <a:rPr lang="en-US" sz="8800" dirty="0">
+                <a:solidFill>
+                  <a:srgbClr val="800000"/>
+                </a:solidFill>
+                <a:latin typeface="Consolas" panose="020B0609020204030204" pitchFamily="49" charset="0"/>
+              </a:rPr>
+              <a:t>link /&gt;</a:t>
+            </a:r>
+            <a:endParaRPr lang="en-US" sz="8800" dirty="0">
+              <a:solidFill>
+                <a:schemeClr val="accent1">
+                  <a:lumMod val="50000"/>
+                </a:schemeClr>
+              </a:solidFill>
+              <a:latin typeface="Consolas" panose="020B0609020204030204" pitchFamily="49" charset="0"/>
+            </a:endParaRPr>
+          </a:p>
+        </p:txBody>
+      </p:sp>
+    </p:spTree>
+    <p:extLst>
+      <p:ext uri="{BB962C8B-B14F-4D97-AF65-F5344CB8AC3E}">
+        <p14:creationId xmlns:p14="http://schemas.microsoft.com/office/powerpoint/2010/main" val="2013883105"/>
       </p:ext>
     </p:extLst>
   </p:cSld>

</xml_diff>

<commit_message>
week 6 review team repls
</commit_message>
<xml_diff>
--- a/Week06/HtmlCssReviewActivity.pptx
+++ b/Week06/HtmlCssReviewActivity.pptx
@@ -4117,7 +4117,7 @@
           <a:p>
             <a:fld id="{5958763E-B898-436D-883D-03711491D54A}" type="datetimeFigureOut">
               <a:rPr lang="en-US" smtClean="0"/>
-              <a:t>2/9/2023</a:t>
+              <a:t>10/23/2023</a:t>
             </a:fld>
             <a:endParaRPr lang="en-US"/>
           </a:p>
@@ -4432,7 +4432,7 @@
             <a:fld id="{1C2D31DE-C454-491C-B5C3-F097855E3DF7}" type="datetime4">
               <a:rPr lang="en-US" smtClean="0"/>
               <a:pPr/>
-              <a:t>February 9, 2023</a:t>
+              <a:t>October 23, 2023</a:t>
             </a:fld>
             <a:endParaRPr lang="en-US" dirty="0"/>
           </a:p>
@@ -8876,66 +8876,44 @@
               <a:buNone/>
             </a:pPr>
             <a:r>
-              <a:rPr lang="en-US" b="1" dirty="0">
+              <a:rPr lang="en-US" dirty="0">
                 <a:hlinkClick r:id="rId2"/>
               </a:rPr>
               <a:t>https://replit.com/join/</a:t>
             </a:r>
+          </a:p>
+          <a:p>
+            <a:pPr marL="127000" indent="0">
+              <a:buNone/>
+            </a:pPr>
             <a:r>
-              <a:rPr lang="en-US" sz="2000" b="1" dirty="0">
+              <a:rPr lang="en-US" sz="2400" b="1" dirty="0" err="1">
                 <a:hlinkClick r:id="rId2"/>
               </a:rPr>
-              <a:t>qmaefwjwmp-hylandoutreach</a:t>
+              <a:t>tnbeqtqrqn-hylandoutreach</a:t>
             </a:r>
-            <a:endParaRPr lang="en-US" sz="2000" b="1" dirty="0"/>
+            <a:endParaRPr lang="en-US" sz="2400" b="1" dirty="0"/>
           </a:p>
           <a:p>
             <a:endParaRPr lang="en-US" dirty="0"/>
           </a:p>
           <a:p>
+            <a:pPr marL="127000" indent="0" algn="ctr">
+              <a:buNone/>
+            </a:pPr>
             <a:r>
-              <a:rPr lang="en-US" dirty="0"/>
-              <a:t>Student1</a:t>
+              <a:rPr lang="en-US" sz="3200" dirty="0"/>
+              <a:t>In-Person</a:t>
             </a:r>
           </a:p>
           <a:p>
+            <a:pPr marL="127000" indent="0" algn="ctr">
+              <a:buNone/>
+            </a:pPr>
             <a:r>
-              <a:rPr lang="en-US" dirty="0"/>
-              <a:t>Student2</a:t>
+              <a:rPr lang="en-US" sz="3200" dirty="0"/>
+              <a:t>House Left</a:t>
             </a:r>
-          </a:p>
-          <a:p>
-            <a:r>
-              <a:rPr lang="en-US" dirty="0"/>
-              <a:t>Student3</a:t>
-            </a:r>
-          </a:p>
-          <a:p>
-            <a:r>
-              <a:rPr lang="en-US" dirty="0"/>
-              <a:t>Student4</a:t>
-            </a:r>
-          </a:p>
-          <a:p>
-            <a:r>
-              <a:rPr lang="en-US" dirty="0"/>
-              <a:t>Student5</a:t>
-            </a:r>
-          </a:p>
-          <a:p>
-            <a:r>
-              <a:rPr lang="en-US" dirty="0"/>
-              <a:t>Student6</a:t>
-            </a:r>
-          </a:p>
-          <a:p>
-            <a:r>
-              <a:rPr lang="en-US" dirty="0"/>
-              <a:t>Student7</a:t>
-            </a:r>
-          </a:p>
-          <a:p>
-            <a:endParaRPr lang="en-US" dirty="0"/>
           </a:p>
         </p:txBody>
       </p:sp>
@@ -8974,12 +8952,12 @@
               <a:buNone/>
             </a:pPr>
             <a:r>
-              <a:rPr lang="en-US" sz="2400" b="1" u="sng" dirty="0"/>
+              <a:rPr lang="en-US" sz="2400" b="1" u="sng"/>
               <a:t>Team 3</a:t>
             </a:r>
           </a:p>
           <a:p>
-            <a:pPr marL="127000" indent="0">
+            <a:pPr marL="42863" indent="0" algn="ctr">
               <a:buNone/>
             </a:pPr>
             <a:endParaRPr lang="en-US" sz="2100" dirty="0">
@@ -8991,66 +8969,38 @@
               <a:buNone/>
             </a:pPr>
             <a:r>
-              <a:rPr lang="en-US" b="1" dirty="0">
-                <a:hlinkClick r:id="rId3"/>
+              <a:rPr lang="en-US" dirty="0">
+                <a:hlinkClick r:id="rId4"/>
               </a:rPr>
               <a:t>https://replit.com/join/</a:t>
             </a:r>
+          </a:p>
+          <a:p>
+            <a:pPr marL="127000" indent="0">
+              <a:buNone/>
+            </a:pPr>
             <a:r>
-              <a:rPr lang="en-US" sz="2000" b="1" dirty="0">
-                <a:hlinkClick r:id="rId3"/>
+              <a:rPr lang="en-US" sz="2400" b="1" dirty="0" err="1">
+                <a:hlinkClick r:id="rId4"/>
               </a:rPr>
-              <a:t>clfsjzajqs-hylandoutreach</a:t>
+              <a:t>yzhoxecfvr-hylandoutreach</a:t>
             </a:r>
-            <a:endParaRPr lang="en-US" sz="2000" b="1" dirty="0"/>
-          </a:p>
-          <a:p>
+            <a:endParaRPr lang="en-US" sz="2400" b="1" dirty="0"/>
+          </a:p>
+          <a:p>
+            <a:pPr marL="127000" indent="0">
+              <a:buNone/>
+            </a:pPr>
             <a:endParaRPr lang="en-US" dirty="0"/>
           </a:p>
           <a:p>
+            <a:pPr marL="127000" indent="0" algn="ctr">
+              <a:buNone/>
+            </a:pPr>
             <a:r>
-              <a:rPr lang="en-US" dirty="0"/>
-              <a:t>Student1</a:t>
+              <a:rPr lang="en-US" sz="3200" dirty="0"/>
+              <a:t>Virtual</a:t>
             </a:r>
-          </a:p>
-          <a:p>
-            <a:r>
-              <a:rPr lang="en-US" dirty="0"/>
-              <a:t>Student2</a:t>
-            </a:r>
-          </a:p>
-          <a:p>
-            <a:r>
-              <a:rPr lang="en-US" dirty="0"/>
-              <a:t>Student3</a:t>
-            </a:r>
-          </a:p>
-          <a:p>
-            <a:r>
-              <a:rPr lang="en-US" dirty="0"/>
-              <a:t>Student4</a:t>
-            </a:r>
-          </a:p>
-          <a:p>
-            <a:r>
-              <a:rPr lang="en-US" dirty="0"/>
-              <a:t>Student5</a:t>
-            </a:r>
-          </a:p>
-          <a:p>
-            <a:r>
-              <a:rPr lang="en-US" dirty="0"/>
-              <a:t>Student6</a:t>
-            </a:r>
-          </a:p>
-          <a:p>
-            <a:r>
-              <a:rPr lang="en-US" dirty="0"/>
-              <a:t>Student7</a:t>
-            </a:r>
-          </a:p>
-          <a:p>
-            <a:endParaRPr lang="en-US" dirty="0"/>
           </a:p>
         </p:txBody>
       </p:sp>
@@ -9104,66 +9054,50 @@
               <a:buNone/>
             </a:pPr>
             <a:r>
-              <a:rPr lang="en-US" b="1" dirty="0">
-                <a:hlinkClick r:id="rId4"/>
+              <a:rPr lang="en-US" dirty="0">
+                <a:hlinkClick r:id="rId5"/>
               </a:rPr>
               <a:t>https://replit.com/join/</a:t>
             </a:r>
+          </a:p>
+          <a:p>
+            <a:pPr marL="127000" indent="0">
+              <a:buNone/>
+            </a:pPr>
             <a:r>
-              <a:rPr lang="en-US" sz="2000" b="1" dirty="0">
-                <a:hlinkClick r:id="rId4"/>
+              <a:rPr lang="en-US" sz="2400" b="1" dirty="0" err="1">
+                <a:hlinkClick r:id="rId5"/>
               </a:rPr>
-              <a:t>ywjiowgvnx-hylandoutreach</a:t>
+              <a:t>uwktjxhmyx-hylandoutreach</a:t>
             </a:r>
-            <a:endParaRPr lang="en-US" sz="2000" b="1" dirty="0"/>
-          </a:p>
-          <a:p>
+            <a:r>
+              <a:rPr lang="en-US" sz="2400" b="1" dirty="0"/>
+              <a:t> </a:t>
+            </a:r>
+          </a:p>
+          <a:p>
+            <a:pPr marL="127000" indent="0">
+              <a:buNone/>
+            </a:pPr>
             <a:endParaRPr lang="en-US" dirty="0"/>
           </a:p>
           <a:p>
+            <a:pPr marL="127000" indent="0" algn="ctr">
+              <a:buNone/>
+            </a:pPr>
             <a:r>
-              <a:rPr lang="en-US" dirty="0"/>
-              <a:t>Student1</a:t>
+              <a:rPr lang="en-US" sz="3200" dirty="0"/>
+              <a:t>In-Person</a:t>
             </a:r>
           </a:p>
           <a:p>
+            <a:pPr marL="127000" indent="0" algn="ctr">
+              <a:buNone/>
+            </a:pPr>
             <a:r>
-              <a:rPr lang="en-US" dirty="0"/>
-              <a:t>Student2</a:t>
+              <a:rPr lang="en-US" sz="3200" dirty="0"/>
+              <a:t>House Right</a:t>
             </a:r>
-          </a:p>
-          <a:p>
-            <a:r>
-              <a:rPr lang="en-US" dirty="0"/>
-              <a:t>Student3</a:t>
-            </a:r>
-          </a:p>
-          <a:p>
-            <a:r>
-              <a:rPr lang="en-US" dirty="0"/>
-              <a:t>Student4</a:t>
-            </a:r>
-          </a:p>
-          <a:p>
-            <a:r>
-              <a:rPr lang="en-US" dirty="0"/>
-              <a:t>Student5</a:t>
-            </a:r>
-          </a:p>
-          <a:p>
-            <a:r>
-              <a:rPr lang="en-US" dirty="0"/>
-              <a:t>Student6</a:t>
-            </a:r>
-          </a:p>
-          <a:p>
-            <a:r>
-              <a:rPr lang="en-US" dirty="0"/>
-              <a:t>Student7</a:t>
-            </a:r>
-          </a:p>
-          <a:p>
-            <a:endParaRPr lang="en-US" dirty="0"/>
           </a:p>
           <a:p>
             <a:endParaRPr lang="en-US" dirty="0"/>

</xml_diff>

<commit_message>
Update gitbook 2023-10-23 16:41:41
</commit_message>
<xml_diff>
--- a/Week06/HtmlCssReviewActivity.pptx
+++ b/Week06/HtmlCssReviewActivity.pptx
@@ -4117,7 +4117,7 @@
           <a:p>
             <a:fld id="{5958763E-B898-436D-883D-03711491D54A}" type="datetimeFigureOut">
               <a:rPr lang="en-US" smtClean="0"/>
-              <a:t>2/9/2023</a:t>
+              <a:t>10/23/2023</a:t>
             </a:fld>
             <a:endParaRPr lang="en-US"/>
           </a:p>
@@ -4432,7 +4432,7 @@
             <a:fld id="{1C2D31DE-C454-491C-B5C3-F097855E3DF7}" type="datetime4">
               <a:rPr lang="en-US" smtClean="0"/>
               <a:pPr/>
-              <a:t>February 9, 2023</a:t>
+              <a:t>October 23, 2023</a:t>
             </a:fld>
             <a:endParaRPr lang="en-US" dirty="0"/>
           </a:p>
@@ -8876,66 +8876,44 @@
               <a:buNone/>
             </a:pPr>
             <a:r>
-              <a:rPr lang="en-US" b="1" dirty="0">
+              <a:rPr lang="en-US" dirty="0">
                 <a:hlinkClick r:id="rId2"/>
               </a:rPr>
               <a:t>https://replit.com/join/</a:t>
             </a:r>
+          </a:p>
+          <a:p>
+            <a:pPr marL="127000" indent="0">
+              <a:buNone/>
+            </a:pPr>
             <a:r>
-              <a:rPr lang="en-US" sz="2000" b="1" dirty="0">
+              <a:rPr lang="en-US" sz="2400" b="1" dirty="0" err="1">
                 <a:hlinkClick r:id="rId2"/>
               </a:rPr>
-              <a:t>qmaefwjwmp-hylandoutreach</a:t>
+              <a:t>tnbeqtqrqn-hylandoutreach</a:t>
             </a:r>
-            <a:endParaRPr lang="en-US" sz="2000" b="1" dirty="0"/>
+            <a:endParaRPr lang="en-US" sz="2400" b="1" dirty="0"/>
           </a:p>
           <a:p>
             <a:endParaRPr lang="en-US" dirty="0"/>
           </a:p>
           <a:p>
+            <a:pPr marL="127000" indent="0" algn="ctr">
+              <a:buNone/>
+            </a:pPr>
             <a:r>
-              <a:rPr lang="en-US" dirty="0"/>
-              <a:t>Student1</a:t>
+              <a:rPr lang="en-US" sz="3200" dirty="0"/>
+              <a:t>In-Person</a:t>
             </a:r>
           </a:p>
           <a:p>
+            <a:pPr marL="127000" indent="0" algn="ctr">
+              <a:buNone/>
+            </a:pPr>
             <a:r>
-              <a:rPr lang="en-US" dirty="0"/>
-              <a:t>Student2</a:t>
+              <a:rPr lang="en-US" sz="3200" dirty="0"/>
+              <a:t>House Left</a:t>
             </a:r>
-          </a:p>
-          <a:p>
-            <a:r>
-              <a:rPr lang="en-US" dirty="0"/>
-              <a:t>Student3</a:t>
-            </a:r>
-          </a:p>
-          <a:p>
-            <a:r>
-              <a:rPr lang="en-US" dirty="0"/>
-              <a:t>Student4</a:t>
-            </a:r>
-          </a:p>
-          <a:p>
-            <a:r>
-              <a:rPr lang="en-US" dirty="0"/>
-              <a:t>Student5</a:t>
-            </a:r>
-          </a:p>
-          <a:p>
-            <a:r>
-              <a:rPr lang="en-US" dirty="0"/>
-              <a:t>Student6</a:t>
-            </a:r>
-          </a:p>
-          <a:p>
-            <a:r>
-              <a:rPr lang="en-US" dirty="0"/>
-              <a:t>Student7</a:t>
-            </a:r>
-          </a:p>
-          <a:p>
-            <a:endParaRPr lang="en-US" dirty="0"/>
           </a:p>
         </p:txBody>
       </p:sp>
@@ -8974,12 +8952,12 @@
               <a:buNone/>
             </a:pPr>
             <a:r>
-              <a:rPr lang="en-US" sz="2400" b="1" u="sng" dirty="0"/>
+              <a:rPr lang="en-US" sz="2400" b="1" u="sng"/>
               <a:t>Team 3</a:t>
             </a:r>
           </a:p>
           <a:p>
-            <a:pPr marL="127000" indent="0">
+            <a:pPr marL="42863" indent="0" algn="ctr">
               <a:buNone/>
             </a:pPr>
             <a:endParaRPr lang="en-US" sz="2100" dirty="0">
@@ -8991,66 +8969,38 @@
               <a:buNone/>
             </a:pPr>
             <a:r>
-              <a:rPr lang="en-US" b="1" dirty="0">
-                <a:hlinkClick r:id="rId3"/>
+              <a:rPr lang="en-US" dirty="0">
+                <a:hlinkClick r:id="rId4"/>
               </a:rPr>
               <a:t>https://replit.com/join/</a:t>
             </a:r>
+          </a:p>
+          <a:p>
+            <a:pPr marL="127000" indent="0">
+              <a:buNone/>
+            </a:pPr>
             <a:r>
-              <a:rPr lang="en-US" sz="2000" b="1" dirty="0">
-                <a:hlinkClick r:id="rId3"/>
+              <a:rPr lang="en-US" sz="2400" b="1" dirty="0" err="1">
+                <a:hlinkClick r:id="rId4"/>
               </a:rPr>
-              <a:t>clfsjzajqs-hylandoutreach</a:t>
+              <a:t>yzhoxecfvr-hylandoutreach</a:t>
             </a:r>
-            <a:endParaRPr lang="en-US" sz="2000" b="1" dirty="0"/>
-          </a:p>
-          <a:p>
+            <a:endParaRPr lang="en-US" sz="2400" b="1" dirty="0"/>
+          </a:p>
+          <a:p>
+            <a:pPr marL="127000" indent="0">
+              <a:buNone/>
+            </a:pPr>
             <a:endParaRPr lang="en-US" dirty="0"/>
           </a:p>
           <a:p>
+            <a:pPr marL="127000" indent="0" algn="ctr">
+              <a:buNone/>
+            </a:pPr>
             <a:r>
-              <a:rPr lang="en-US" dirty="0"/>
-              <a:t>Student1</a:t>
+              <a:rPr lang="en-US" sz="3200" dirty="0"/>
+              <a:t>Virtual</a:t>
             </a:r>
-          </a:p>
-          <a:p>
-            <a:r>
-              <a:rPr lang="en-US" dirty="0"/>
-              <a:t>Student2</a:t>
-            </a:r>
-          </a:p>
-          <a:p>
-            <a:r>
-              <a:rPr lang="en-US" dirty="0"/>
-              <a:t>Student3</a:t>
-            </a:r>
-          </a:p>
-          <a:p>
-            <a:r>
-              <a:rPr lang="en-US" dirty="0"/>
-              <a:t>Student4</a:t>
-            </a:r>
-          </a:p>
-          <a:p>
-            <a:r>
-              <a:rPr lang="en-US" dirty="0"/>
-              <a:t>Student5</a:t>
-            </a:r>
-          </a:p>
-          <a:p>
-            <a:r>
-              <a:rPr lang="en-US" dirty="0"/>
-              <a:t>Student6</a:t>
-            </a:r>
-          </a:p>
-          <a:p>
-            <a:r>
-              <a:rPr lang="en-US" dirty="0"/>
-              <a:t>Student7</a:t>
-            </a:r>
-          </a:p>
-          <a:p>
-            <a:endParaRPr lang="en-US" dirty="0"/>
           </a:p>
         </p:txBody>
       </p:sp>
@@ -9104,66 +9054,50 @@
               <a:buNone/>
             </a:pPr>
             <a:r>
-              <a:rPr lang="en-US" b="1" dirty="0">
-                <a:hlinkClick r:id="rId4"/>
+              <a:rPr lang="en-US" dirty="0">
+                <a:hlinkClick r:id="rId5"/>
               </a:rPr>
               <a:t>https://replit.com/join/</a:t>
             </a:r>
+          </a:p>
+          <a:p>
+            <a:pPr marL="127000" indent="0">
+              <a:buNone/>
+            </a:pPr>
             <a:r>
-              <a:rPr lang="en-US" sz="2000" b="1" dirty="0">
-                <a:hlinkClick r:id="rId4"/>
+              <a:rPr lang="en-US" sz="2400" b="1" dirty="0" err="1">
+                <a:hlinkClick r:id="rId5"/>
               </a:rPr>
-              <a:t>ywjiowgvnx-hylandoutreach</a:t>
+              <a:t>uwktjxhmyx-hylandoutreach</a:t>
             </a:r>
-            <a:endParaRPr lang="en-US" sz="2000" b="1" dirty="0"/>
-          </a:p>
-          <a:p>
+            <a:r>
+              <a:rPr lang="en-US" sz="2400" b="1" dirty="0"/>
+              <a:t> </a:t>
+            </a:r>
+          </a:p>
+          <a:p>
+            <a:pPr marL="127000" indent="0">
+              <a:buNone/>
+            </a:pPr>
             <a:endParaRPr lang="en-US" dirty="0"/>
           </a:p>
           <a:p>
+            <a:pPr marL="127000" indent="0" algn="ctr">
+              <a:buNone/>
+            </a:pPr>
             <a:r>
-              <a:rPr lang="en-US" dirty="0"/>
-              <a:t>Student1</a:t>
+              <a:rPr lang="en-US" sz="3200" dirty="0"/>
+              <a:t>In-Person</a:t>
             </a:r>
           </a:p>
           <a:p>
+            <a:pPr marL="127000" indent="0" algn="ctr">
+              <a:buNone/>
+            </a:pPr>
             <a:r>
-              <a:rPr lang="en-US" dirty="0"/>
-              <a:t>Student2</a:t>
+              <a:rPr lang="en-US" sz="3200" dirty="0"/>
+              <a:t>House Right</a:t>
             </a:r>
-          </a:p>
-          <a:p>
-            <a:r>
-              <a:rPr lang="en-US" dirty="0"/>
-              <a:t>Student3</a:t>
-            </a:r>
-          </a:p>
-          <a:p>
-            <a:r>
-              <a:rPr lang="en-US" dirty="0"/>
-              <a:t>Student4</a:t>
-            </a:r>
-          </a:p>
-          <a:p>
-            <a:r>
-              <a:rPr lang="en-US" dirty="0"/>
-              <a:t>Student5</a:t>
-            </a:r>
-          </a:p>
-          <a:p>
-            <a:r>
-              <a:rPr lang="en-US" dirty="0"/>
-              <a:t>Student6</a:t>
-            </a:r>
-          </a:p>
-          <a:p>
-            <a:r>
-              <a:rPr lang="en-US" dirty="0"/>
-              <a:t>Student7</a:t>
-            </a:r>
-          </a:p>
-          <a:p>
-            <a:endParaRPr lang="en-US" dirty="0"/>
           </a:p>
           <a:p>
             <a:endParaRPr lang="en-US" dirty="0"/>

</xml_diff>

<commit_message>
week 6 review update
</commit_message>
<xml_diff>
--- a/Week06/HtmlCssReviewActivity.pptx
+++ b/Week06/HtmlCssReviewActivity.pptx
@@ -4117,7 +4117,7 @@
           <a:p>
             <a:fld id="{5958763E-B898-436D-883D-03711491D54A}" type="datetimeFigureOut">
               <a:rPr lang="en-US" smtClean="0"/>
-              <a:t>10/23/2023</a:t>
+              <a:t>1/31/2024</a:t>
             </a:fld>
             <a:endParaRPr lang="en-US"/>
           </a:p>
@@ -4432,7 +4432,7 @@
             <a:fld id="{1C2D31DE-C454-491C-B5C3-F097855E3DF7}" type="datetime4">
               <a:rPr lang="en-US" smtClean="0"/>
               <a:pPr/>
-              <a:t>October 23, 2023</a:t>
+              <a:t>January 31, 2024</a:t>
             </a:fld>
             <a:endParaRPr lang="en-US" dirty="0"/>
           </a:p>
@@ -8881,21 +8881,23 @@
               </a:rPr>
               <a:t>https://replit.com/join/</a:t>
             </a:r>
+            <a:endParaRPr lang="en-US" dirty="0"/>
           </a:p>
           <a:p>
             <a:pPr marL="127000" indent="0">
               <a:buNone/>
             </a:pPr>
             <a:r>
-              <a:rPr lang="en-US" sz="2400" b="1" dirty="0" err="1">
-                <a:hlinkClick r:id="rId2"/>
-              </a:rPr>
-              <a:t>tnbeqtqrqn-hylandoutreach</a:t>
+              <a:rPr lang="en-US" sz="2400" b="1" u="sng" dirty="0" err="1"/>
+              <a:t>iwrphdxtqh-hylandoutreach</a:t>
             </a:r>
-            <a:endParaRPr lang="en-US" sz="2400" b="1" dirty="0"/>
-          </a:p>
-          <a:p>
-            <a:endParaRPr lang="en-US" dirty="0"/>
+            <a:endParaRPr lang="en-US" sz="2400" b="1" u="sng" dirty="0"/>
+          </a:p>
+          <a:p>
+            <a:pPr marL="127000" indent="0" algn="ctr">
+              <a:buNone/>
+            </a:pPr>
+            <a:endParaRPr lang="en-US" sz="3200" dirty="0"/>
           </a:p>
           <a:p>
             <a:pPr marL="127000" indent="0" algn="ctr">
@@ -8952,7 +8954,7 @@
               <a:buNone/>
             </a:pPr>
             <a:r>
-              <a:rPr lang="en-US" sz="2400" b="1" u="sng"/>
+              <a:rPr lang="en-US" sz="2400" b="1" u="sng" dirty="0"/>
               <a:t>Team 3</a:t>
             </a:r>
           </a:p>
@@ -8970,28 +8972,27 @@
             </a:pPr>
             <a:r>
               <a:rPr lang="en-US" dirty="0">
-                <a:hlinkClick r:id="rId4"/>
+                <a:hlinkClick r:id="rId2"/>
               </a:rPr>
               <a:t>https://replit.com/join/</a:t>
             </a:r>
+            <a:endParaRPr lang="en-US" dirty="0"/>
           </a:p>
           <a:p>
             <a:pPr marL="127000" indent="0">
               <a:buNone/>
             </a:pPr>
             <a:r>
-              <a:rPr lang="en-US" sz="2400" b="1" dirty="0" err="1">
-                <a:hlinkClick r:id="rId4"/>
-              </a:rPr>
-              <a:t>yzhoxecfvr-hylandoutreach</a:t>
+              <a:rPr lang="en-US" sz="2400" b="1" u="sng" dirty="0" err="1"/>
+              <a:t>ntdyhoognx-hylandoutreach</a:t>
             </a:r>
-            <a:endParaRPr lang="en-US" sz="2400" b="1" dirty="0"/>
-          </a:p>
-          <a:p>
-            <a:pPr marL="127000" indent="0">
+            <a:endParaRPr lang="en-US" sz="2400" b="1" u="sng" dirty="0"/>
+          </a:p>
+          <a:p>
+            <a:pPr marL="127000" indent="0" algn="ctr">
               <a:buNone/>
             </a:pPr>
-            <a:endParaRPr lang="en-US" dirty="0"/>
+            <a:endParaRPr lang="en-US" sz="3200" dirty="0"/>
           </a:p>
           <a:p>
             <a:pPr marL="127000" indent="0" algn="ctr">
@@ -9055,31 +9056,27 @@
             </a:pPr>
             <a:r>
               <a:rPr lang="en-US" dirty="0">
-                <a:hlinkClick r:id="rId5"/>
+                <a:hlinkClick r:id="rId2"/>
               </a:rPr>
               <a:t>https://replit.com/join/</a:t>
             </a:r>
+            <a:endParaRPr lang="en-US" dirty="0"/>
           </a:p>
           <a:p>
             <a:pPr marL="127000" indent="0">
               <a:buNone/>
             </a:pPr>
             <a:r>
-              <a:rPr lang="en-US" sz="2400" b="1" dirty="0" err="1">
-                <a:hlinkClick r:id="rId5"/>
-              </a:rPr>
-              <a:t>uwktjxhmyx-hylandoutreach</a:t>
+              <a:rPr lang="en-US" sz="2400" b="1" u="sng" dirty="0" err="1"/>
+              <a:t>lncqcuvvdw-hylandoutreach</a:t>
             </a:r>
-            <a:r>
-              <a:rPr lang="en-US" sz="2400" b="1" dirty="0"/>
-              <a:t> </a:t>
-            </a:r>
-          </a:p>
-          <a:p>
-            <a:pPr marL="127000" indent="0">
+            <a:endParaRPr lang="en-US" sz="2400" b="1" u="sng" dirty="0"/>
+          </a:p>
+          <a:p>
+            <a:pPr marL="127000" indent="0" algn="ctr">
               <a:buNone/>
             </a:pPr>
-            <a:endParaRPr lang="en-US" dirty="0"/>
+            <a:endParaRPr lang="en-US" sz="3200" dirty="0"/>
           </a:p>
           <a:p>
             <a:pPr marL="127000" indent="0" algn="ctr">

</xml_diff>

<commit_message>
Update gitbook 2024-01-31 14:58:40
</commit_message>
<xml_diff>
--- a/Week06/HtmlCssReviewActivity.pptx
+++ b/Week06/HtmlCssReviewActivity.pptx
@@ -4117,7 +4117,7 @@
           <a:p>
             <a:fld id="{5958763E-B898-436D-883D-03711491D54A}" type="datetimeFigureOut">
               <a:rPr lang="en-US" smtClean="0"/>
-              <a:t>10/23/2023</a:t>
+              <a:t>1/31/2024</a:t>
             </a:fld>
             <a:endParaRPr lang="en-US"/>
           </a:p>
@@ -4432,7 +4432,7 @@
             <a:fld id="{1C2D31DE-C454-491C-B5C3-F097855E3DF7}" type="datetime4">
               <a:rPr lang="en-US" smtClean="0"/>
               <a:pPr/>
-              <a:t>October 23, 2023</a:t>
+              <a:t>January 31, 2024</a:t>
             </a:fld>
             <a:endParaRPr lang="en-US" dirty="0"/>
           </a:p>
@@ -8881,21 +8881,23 @@
               </a:rPr>
               <a:t>https://replit.com/join/</a:t>
             </a:r>
+            <a:endParaRPr lang="en-US" dirty="0"/>
           </a:p>
           <a:p>
             <a:pPr marL="127000" indent="0">
               <a:buNone/>
             </a:pPr>
             <a:r>
-              <a:rPr lang="en-US" sz="2400" b="1" dirty="0" err="1">
-                <a:hlinkClick r:id="rId2"/>
-              </a:rPr>
-              <a:t>tnbeqtqrqn-hylandoutreach</a:t>
+              <a:rPr lang="en-US" sz="2400" b="1" u="sng" dirty="0" err="1"/>
+              <a:t>iwrphdxtqh-hylandoutreach</a:t>
             </a:r>
-            <a:endParaRPr lang="en-US" sz="2400" b="1" dirty="0"/>
-          </a:p>
-          <a:p>
-            <a:endParaRPr lang="en-US" dirty="0"/>
+            <a:endParaRPr lang="en-US" sz="2400" b="1" u="sng" dirty="0"/>
+          </a:p>
+          <a:p>
+            <a:pPr marL="127000" indent="0" algn="ctr">
+              <a:buNone/>
+            </a:pPr>
+            <a:endParaRPr lang="en-US" sz="3200" dirty="0"/>
           </a:p>
           <a:p>
             <a:pPr marL="127000" indent="0" algn="ctr">
@@ -8952,7 +8954,7 @@
               <a:buNone/>
             </a:pPr>
             <a:r>
-              <a:rPr lang="en-US" sz="2400" b="1" u="sng"/>
+              <a:rPr lang="en-US" sz="2400" b="1" u="sng" dirty="0"/>
               <a:t>Team 3</a:t>
             </a:r>
           </a:p>
@@ -8970,28 +8972,27 @@
             </a:pPr>
             <a:r>
               <a:rPr lang="en-US" dirty="0">
-                <a:hlinkClick r:id="rId4"/>
+                <a:hlinkClick r:id="rId2"/>
               </a:rPr>
               <a:t>https://replit.com/join/</a:t>
             </a:r>
+            <a:endParaRPr lang="en-US" dirty="0"/>
           </a:p>
           <a:p>
             <a:pPr marL="127000" indent="0">
               <a:buNone/>
             </a:pPr>
             <a:r>
-              <a:rPr lang="en-US" sz="2400" b="1" dirty="0" err="1">
-                <a:hlinkClick r:id="rId4"/>
-              </a:rPr>
-              <a:t>yzhoxecfvr-hylandoutreach</a:t>
+              <a:rPr lang="en-US" sz="2400" b="1" u="sng" dirty="0" err="1"/>
+              <a:t>ntdyhoognx-hylandoutreach</a:t>
             </a:r>
-            <a:endParaRPr lang="en-US" sz="2400" b="1" dirty="0"/>
-          </a:p>
-          <a:p>
-            <a:pPr marL="127000" indent="0">
+            <a:endParaRPr lang="en-US" sz="2400" b="1" u="sng" dirty="0"/>
+          </a:p>
+          <a:p>
+            <a:pPr marL="127000" indent="0" algn="ctr">
               <a:buNone/>
             </a:pPr>
-            <a:endParaRPr lang="en-US" dirty="0"/>
+            <a:endParaRPr lang="en-US" sz="3200" dirty="0"/>
           </a:p>
           <a:p>
             <a:pPr marL="127000" indent="0" algn="ctr">
@@ -9055,31 +9056,27 @@
             </a:pPr>
             <a:r>
               <a:rPr lang="en-US" dirty="0">
-                <a:hlinkClick r:id="rId5"/>
+                <a:hlinkClick r:id="rId2"/>
               </a:rPr>
               <a:t>https://replit.com/join/</a:t>
             </a:r>
+            <a:endParaRPr lang="en-US" dirty="0"/>
           </a:p>
           <a:p>
             <a:pPr marL="127000" indent="0">
               <a:buNone/>
             </a:pPr>
             <a:r>
-              <a:rPr lang="en-US" sz="2400" b="1" dirty="0" err="1">
-                <a:hlinkClick r:id="rId5"/>
-              </a:rPr>
-              <a:t>uwktjxhmyx-hylandoutreach</a:t>
+              <a:rPr lang="en-US" sz="2400" b="1" u="sng" dirty="0" err="1"/>
+              <a:t>lncqcuvvdw-hylandoutreach</a:t>
             </a:r>
-            <a:r>
-              <a:rPr lang="en-US" sz="2400" b="1" dirty="0"/>
-              <a:t> </a:t>
-            </a:r>
-          </a:p>
-          <a:p>
-            <a:pPr marL="127000" indent="0">
+            <a:endParaRPr lang="en-US" sz="2400" b="1" u="sng" dirty="0"/>
+          </a:p>
+          <a:p>
+            <a:pPr marL="127000" indent="0" algn="ctr">
               <a:buNone/>
             </a:pPr>
-            <a:endParaRPr lang="en-US" dirty="0"/>
+            <a:endParaRPr lang="en-US" sz="3200" dirty="0"/>
           </a:p>
           <a:p>
             <a:pPr marL="127000" indent="0" algn="ctr">

</xml_diff>

<commit_message>
some updates to not rely on glitch
</commit_message>
<xml_diff>
--- a/Week06/HtmlCssReviewActivity.pptx
+++ b/Week06/HtmlCssReviewActivity.pptx
@@ -51,6 +51,13 @@
       <p:font typeface="Roboto Condensed Light" panose="02000000000000000000" pitchFamily="2" charset="0"/>
       <p:regular r:id="rId26"/>
       <p:italic r:id="rId27"/>
+    </p:embeddedFont>
+    <p:embeddedFont>
+      <p:font typeface="Segoe UI" panose="020B0502040204020203" pitchFamily="34" charset="0"/>
+      <p:regular r:id="rId28"/>
+      <p:bold r:id="rId29"/>
+      <p:italic r:id="rId30"/>
+      <p:boldItalic r:id="rId31"/>
     </p:embeddedFont>
   </p:embeddedFontLst>
   <p:defaultTextStyle>
@@ -4117,7 +4124,7 @@
           <a:p>
             <a:fld id="{5958763E-B898-436D-883D-03711491D54A}" type="datetimeFigureOut">
               <a:rPr lang="en-US" smtClean="0"/>
-              <a:t>1/31/2024</a:t>
+              <a:t>4/9/2025</a:t>
             </a:fld>
             <a:endParaRPr lang="en-US"/>
           </a:p>
@@ -4432,7 +4439,7 @@
             <a:fld id="{1C2D31DE-C454-491C-B5C3-F097855E3DF7}" type="datetime4">
               <a:rPr lang="en-US" smtClean="0"/>
               <a:pPr/>
-              <a:t>January 31, 2024</a:t>
+              <a:t>April 9, 2025</a:t>
             </a:fld>
             <a:endParaRPr lang="en-US" dirty="0"/>
           </a:p>
@@ -11784,7 +11791,7 @@
           <a:p>
             <a:r>
               <a:rPr lang="en-US" sz="2000" dirty="0"/>
-              <a:t>4. List the six elements needed for a table</a:t>
+              <a:t>4. List the four elements needed for a table</a:t>
             </a:r>
           </a:p>
         </p:txBody>
@@ -11802,7 +11809,7 @@
         <p:spPr/>
         <p:txBody>
           <a:bodyPr anchor="t">
-            <a:normAutofit lnSpcReduction="10000"/>
+            <a:normAutofit/>
           </a:bodyPr>
           <a:lstStyle/>
           <a:p>
@@ -11818,46 +11825,6 @@
               </a:rPr>
               <a:t>table</a:t>
             </a:r>
-          </a:p>
-          <a:p>
-            <a:pPr marL="152400" indent="0">
-              <a:buNone/>
-            </a:pPr>
-            <a:r>
-              <a:rPr lang="en-US" sz="3600" dirty="0" err="1">
-                <a:solidFill>
-                  <a:srgbClr val="000000"/>
-                </a:solidFill>
-                <a:latin typeface="Consolas" panose="020B0609020204030204" pitchFamily="49" charset="0"/>
-              </a:rPr>
-              <a:t>thead</a:t>
-            </a:r>
-            <a:endParaRPr lang="en-US" sz="3600" dirty="0">
-              <a:solidFill>
-                <a:srgbClr val="000000"/>
-              </a:solidFill>
-              <a:latin typeface="Consolas" panose="020B0609020204030204" pitchFamily="49" charset="0"/>
-            </a:endParaRPr>
-          </a:p>
-          <a:p>
-            <a:pPr marL="152400" indent="0">
-              <a:buNone/>
-            </a:pPr>
-            <a:r>
-              <a:rPr lang="en-US" sz="3600" dirty="0" err="1">
-                <a:solidFill>
-                  <a:srgbClr val="000000"/>
-                </a:solidFill>
-                <a:latin typeface="Consolas" panose="020B0609020204030204" pitchFamily="49" charset="0"/>
-              </a:rPr>
-              <a:t>tbody</a:t>
-            </a:r>
-            <a:endParaRPr lang="en-US" sz="3600" dirty="0">
-              <a:solidFill>
-                <a:srgbClr val="000000"/>
-              </a:solidFill>
-              <a:latin typeface="Consolas" panose="020B0609020204030204" pitchFamily="49" charset="0"/>
-            </a:endParaRPr>
           </a:p>
           <a:p>
             <a:pPr marL="152400" indent="0">
@@ -12169,128 +12136,6 @@
                                           <p:spTgt spid="3">
                                             <p:txEl>
                                               <p:pRg st="3" end="3"/>
-                                            </p:txEl>
-                                          </p:spTgt>
-                                        </p:tgtEl>
-                                      </p:cBhvr>
-                                    </p:animEffect>
-                                  </p:childTnLst>
-                                </p:cTn>
-                              </p:par>
-                            </p:childTnLst>
-                          </p:cTn>
-                        </p:par>
-                      </p:childTnLst>
-                    </p:cTn>
-                  </p:par>
-                  <p:par>
-                    <p:cTn id="23" fill="hold">
-                      <p:stCondLst>
-                        <p:cond delay="indefinite"/>
-                      </p:stCondLst>
-                      <p:childTnLst>
-                        <p:par>
-                          <p:cTn id="24" fill="hold">
-                            <p:stCondLst>
-                              <p:cond delay="0"/>
-                            </p:stCondLst>
-                            <p:childTnLst>
-                              <p:par>
-                                <p:cTn id="25" presetID="10" presetClass="entr" presetSubtype="0" fill="hold" grpId="0" nodeType="clickEffect">
-                                  <p:stCondLst>
-                                    <p:cond delay="0"/>
-                                  </p:stCondLst>
-                                  <p:childTnLst>
-                                    <p:set>
-                                      <p:cBhvr>
-                                        <p:cTn id="26" dur="1" fill="hold">
-                                          <p:stCondLst>
-                                            <p:cond delay="0"/>
-                                          </p:stCondLst>
-                                        </p:cTn>
-                                        <p:tgtEl>
-                                          <p:spTgt spid="3">
-                                            <p:txEl>
-                                              <p:pRg st="4" end="4"/>
-                                            </p:txEl>
-                                          </p:spTgt>
-                                        </p:tgtEl>
-                                        <p:attrNameLst>
-                                          <p:attrName>style.visibility</p:attrName>
-                                        </p:attrNameLst>
-                                      </p:cBhvr>
-                                      <p:to>
-                                        <p:strVal val="visible"/>
-                                      </p:to>
-                                    </p:set>
-                                    <p:animEffect transition="in" filter="fade">
-                                      <p:cBhvr>
-                                        <p:cTn id="27" dur="500"/>
-                                        <p:tgtEl>
-                                          <p:spTgt spid="3">
-                                            <p:txEl>
-                                              <p:pRg st="4" end="4"/>
-                                            </p:txEl>
-                                          </p:spTgt>
-                                        </p:tgtEl>
-                                      </p:cBhvr>
-                                    </p:animEffect>
-                                  </p:childTnLst>
-                                </p:cTn>
-                              </p:par>
-                            </p:childTnLst>
-                          </p:cTn>
-                        </p:par>
-                      </p:childTnLst>
-                    </p:cTn>
-                  </p:par>
-                  <p:par>
-                    <p:cTn id="28" fill="hold">
-                      <p:stCondLst>
-                        <p:cond delay="indefinite"/>
-                      </p:stCondLst>
-                      <p:childTnLst>
-                        <p:par>
-                          <p:cTn id="29" fill="hold">
-                            <p:stCondLst>
-                              <p:cond delay="0"/>
-                            </p:stCondLst>
-                            <p:childTnLst>
-                              <p:par>
-                                <p:cTn id="30" presetID="10" presetClass="entr" presetSubtype="0" fill="hold" grpId="0" nodeType="clickEffect">
-                                  <p:stCondLst>
-                                    <p:cond delay="0"/>
-                                  </p:stCondLst>
-                                  <p:childTnLst>
-                                    <p:set>
-                                      <p:cBhvr>
-                                        <p:cTn id="31" dur="1" fill="hold">
-                                          <p:stCondLst>
-                                            <p:cond delay="0"/>
-                                          </p:stCondLst>
-                                        </p:cTn>
-                                        <p:tgtEl>
-                                          <p:spTgt spid="3">
-                                            <p:txEl>
-                                              <p:pRg st="5" end="5"/>
-                                            </p:txEl>
-                                          </p:spTgt>
-                                        </p:tgtEl>
-                                        <p:attrNameLst>
-                                          <p:attrName>style.visibility</p:attrName>
-                                        </p:attrNameLst>
-                                      </p:cBhvr>
-                                      <p:to>
-                                        <p:strVal val="visible"/>
-                                      </p:to>
-                                    </p:set>
-                                    <p:animEffect transition="in" filter="fade">
-                                      <p:cBhvr>
-                                        <p:cTn id="32" dur="500"/>
-                                        <p:tgtEl>
-                                          <p:spTgt spid="3">
-                                            <p:txEl>
-                                              <p:pRg st="5" end="5"/>
                                             </p:txEl>
                                           </p:spTgt>
                                         </p:tgtEl>

</xml_diff>

<commit_message>
Update gitbook 2025-04-09 13:06:24
</commit_message>
<xml_diff>
--- a/Week06/HtmlCssReviewActivity.pptx
+++ b/Week06/HtmlCssReviewActivity.pptx
@@ -51,6 +51,13 @@
       <p:font typeface="Roboto Condensed Light" panose="02000000000000000000" pitchFamily="2" charset="0"/>
       <p:regular r:id="rId26"/>
       <p:italic r:id="rId27"/>
+    </p:embeddedFont>
+    <p:embeddedFont>
+      <p:font typeface="Segoe UI" panose="020B0502040204020203" pitchFamily="34" charset="0"/>
+      <p:regular r:id="rId28"/>
+      <p:bold r:id="rId29"/>
+      <p:italic r:id="rId30"/>
+      <p:boldItalic r:id="rId31"/>
     </p:embeddedFont>
   </p:embeddedFontLst>
   <p:defaultTextStyle>
@@ -4117,7 +4124,7 @@
           <a:p>
             <a:fld id="{5958763E-B898-436D-883D-03711491D54A}" type="datetimeFigureOut">
               <a:rPr lang="en-US" smtClean="0"/>
-              <a:t>1/31/2024</a:t>
+              <a:t>4/9/2025</a:t>
             </a:fld>
             <a:endParaRPr lang="en-US"/>
           </a:p>
@@ -4432,7 +4439,7 @@
             <a:fld id="{1C2D31DE-C454-491C-B5C3-F097855E3DF7}" type="datetime4">
               <a:rPr lang="en-US" smtClean="0"/>
               <a:pPr/>
-              <a:t>January 31, 2024</a:t>
+              <a:t>April 9, 2025</a:t>
             </a:fld>
             <a:endParaRPr lang="en-US" dirty="0"/>
           </a:p>
@@ -11784,7 +11791,7 @@
           <a:p>
             <a:r>
               <a:rPr lang="en-US" sz="2000" dirty="0"/>
-              <a:t>4. List the six elements needed for a table</a:t>
+              <a:t>4. List the four elements needed for a table</a:t>
             </a:r>
           </a:p>
         </p:txBody>
@@ -11802,7 +11809,7 @@
         <p:spPr/>
         <p:txBody>
           <a:bodyPr anchor="t">
-            <a:normAutofit lnSpcReduction="10000"/>
+            <a:normAutofit/>
           </a:bodyPr>
           <a:lstStyle/>
           <a:p>
@@ -11818,46 +11825,6 @@
               </a:rPr>
               <a:t>table</a:t>
             </a:r>
-          </a:p>
-          <a:p>
-            <a:pPr marL="152400" indent="0">
-              <a:buNone/>
-            </a:pPr>
-            <a:r>
-              <a:rPr lang="en-US" sz="3600" dirty="0" err="1">
-                <a:solidFill>
-                  <a:srgbClr val="000000"/>
-                </a:solidFill>
-                <a:latin typeface="Consolas" panose="020B0609020204030204" pitchFamily="49" charset="0"/>
-              </a:rPr>
-              <a:t>thead</a:t>
-            </a:r>
-            <a:endParaRPr lang="en-US" sz="3600" dirty="0">
-              <a:solidFill>
-                <a:srgbClr val="000000"/>
-              </a:solidFill>
-              <a:latin typeface="Consolas" panose="020B0609020204030204" pitchFamily="49" charset="0"/>
-            </a:endParaRPr>
-          </a:p>
-          <a:p>
-            <a:pPr marL="152400" indent="0">
-              <a:buNone/>
-            </a:pPr>
-            <a:r>
-              <a:rPr lang="en-US" sz="3600" dirty="0" err="1">
-                <a:solidFill>
-                  <a:srgbClr val="000000"/>
-                </a:solidFill>
-                <a:latin typeface="Consolas" panose="020B0609020204030204" pitchFamily="49" charset="0"/>
-              </a:rPr>
-              <a:t>tbody</a:t>
-            </a:r>
-            <a:endParaRPr lang="en-US" sz="3600" dirty="0">
-              <a:solidFill>
-                <a:srgbClr val="000000"/>
-              </a:solidFill>
-              <a:latin typeface="Consolas" panose="020B0609020204030204" pitchFamily="49" charset="0"/>
-            </a:endParaRPr>
           </a:p>
           <a:p>
             <a:pPr marL="152400" indent="0">
@@ -12169,128 +12136,6 @@
                                           <p:spTgt spid="3">
                                             <p:txEl>
                                               <p:pRg st="3" end="3"/>
-                                            </p:txEl>
-                                          </p:spTgt>
-                                        </p:tgtEl>
-                                      </p:cBhvr>
-                                    </p:animEffect>
-                                  </p:childTnLst>
-                                </p:cTn>
-                              </p:par>
-                            </p:childTnLst>
-                          </p:cTn>
-                        </p:par>
-                      </p:childTnLst>
-                    </p:cTn>
-                  </p:par>
-                  <p:par>
-                    <p:cTn id="23" fill="hold">
-                      <p:stCondLst>
-                        <p:cond delay="indefinite"/>
-                      </p:stCondLst>
-                      <p:childTnLst>
-                        <p:par>
-                          <p:cTn id="24" fill="hold">
-                            <p:stCondLst>
-                              <p:cond delay="0"/>
-                            </p:stCondLst>
-                            <p:childTnLst>
-                              <p:par>
-                                <p:cTn id="25" presetID="10" presetClass="entr" presetSubtype="0" fill="hold" grpId="0" nodeType="clickEffect">
-                                  <p:stCondLst>
-                                    <p:cond delay="0"/>
-                                  </p:stCondLst>
-                                  <p:childTnLst>
-                                    <p:set>
-                                      <p:cBhvr>
-                                        <p:cTn id="26" dur="1" fill="hold">
-                                          <p:stCondLst>
-                                            <p:cond delay="0"/>
-                                          </p:stCondLst>
-                                        </p:cTn>
-                                        <p:tgtEl>
-                                          <p:spTgt spid="3">
-                                            <p:txEl>
-                                              <p:pRg st="4" end="4"/>
-                                            </p:txEl>
-                                          </p:spTgt>
-                                        </p:tgtEl>
-                                        <p:attrNameLst>
-                                          <p:attrName>style.visibility</p:attrName>
-                                        </p:attrNameLst>
-                                      </p:cBhvr>
-                                      <p:to>
-                                        <p:strVal val="visible"/>
-                                      </p:to>
-                                    </p:set>
-                                    <p:animEffect transition="in" filter="fade">
-                                      <p:cBhvr>
-                                        <p:cTn id="27" dur="500"/>
-                                        <p:tgtEl>
-                                          <p:spTgt spid="3">
-                                            <p:txEl>
-                                              <p:pRg st="4" end="4"/>
-                                            </p:txEl>
-                                          </p:spTgt>
-                                        </p:tgtEl>
-                                      </p:cBhvr>
-                                    </p:animEffect>
-                                  </p:childTnLst>
-                                </p:cTn>
-                              </p:par>
-                            </p:childTnLst>
-                          </p:cTn>
-                        </p:par>
-                      </p:childTnLst>
-                    </p:cTn>
-                  </p:par>
-                  <p:par>
-                    <p:cTn id="28" fill="hold">
-                      <p:stCondLst>
-                        <p:cond delay="indefinite"/>
-                      </p:stCondLst>
-                      <p:childTnLst>
-                        <p:par>
-                          <p:cTn id="29" fill="hold">
-                            <p:stCondLst>
-                              <p:cond delay="0"/>
-                            </p:stCondLst>
-                            <p:childTnLst>
-                              <p:par>
-                                <p:cTn id="30" presetID="10" presetClass="entr" presetSubtype="0" fill="hold" grpId="0" nodeType="clickEffect">
-                                  <p:stCondLst>
-                                    <p:cond delay="0"/>
-                                  </p:stCondLst>
-                                  <p:childTnLst>
-                                    <p:set>
-                                      <p:cBhvr>
-                                        <p:cTn id="31" dur="1" fill="hold">
-                                          <p:stCondLst>
-                                            <p:cond delay="0"/>
-                                          </p:stCondLst>
-                                        </p:cTn>
-                                        <p:tgtEl>
-                                          <p:spTgt spid="3">
-                                            <p:txEl>
-                                              <p:pRg st="5" end="5"/>
-                                            </p:txEl>
-                                          </p:spTgt>
-                                        </p:tgtEl>
-                                        <p:attrNameLst>
-                                          <p:attrName>style.visibility</p:attrName>
-                                        </p:attrNameLst>
-                                      </p:cBhvr>
-                                      <p:to>
-                                        <p:strVal val="visible"/>
-                                      </p:to>
-                                    </p:set>
-                                    <p:animEffect transition="in" filter="fade">
-                                      <p:cBhvr>
-                                        <p:cTn id="32" dur="500"/>
-                                        <p:tgtEl>
-                                          <p:spTgt spid="3">
-                                            <p:txEl>
-                                              <p:pRg st="5" end="5"/>
                                             </p:txEl>
                                           </p:spTgt>
                                         </p:tgtEl>

</xml_diff>